<commit_message>
completed diagram with component highlights
</commit_message>
<xml_diff>
--- a/To-Do-App-Illustrations/React To-Do Planning Assignment.pptx
+++ b/To-Do-App-Illustrations/React To-Do Planning Assignment.pptx
@@ -7,6 +7,8 @@
   <p:sldIdLst>
     <p:sldId id="256" r:id="rId2"/>
     <p:sldId id="257" r:id="rId3"/>
+    <p:sldId id="259" r:id="rId4"/>
+    <p:sldId id="258" r:id="rId5"/>
   </p:sldIdLst>
   <p:sldSz cx="12192000" cy="6858000"/>
   <p:notesSz cx="6858000" cy="9144000"/>
@@ -105,6 +107,11 @@
       </a:defRPr>
     </a:lvl9pPr>
   </p:defaultTextStyle>
+  <p:extLst>
+    <p:ext uri="{EFAFB233-063F-42B5-8137-9DF3F51BA10A}">
+      <p15:sldGuideLst xmlns:p15="http://schemas.microsoft.com/office/powerpoint/2012/main"/>
+    </p:ext>
+  </p:extLst>
 </p:presentation>
 </file>
 
@@ -3147,13 +3154,10 @@
           </a:bodyPr>
           <a:lstStyle/>
           <a:p>
+            <a:pPr algn="just"/>
             <a:r>
               <a:rPr lang="en-US" sz="1600" b="1" dirty="0" smtClean="0"/>
-              <a:t>The Main Container of To-Do Task </a:t>
-            </a:r>
-            <a:r>
-              <a:rPr lang="en-US" sz="1600" b="1" dirty="0" smtClean="0"/>
-              <a:t>–</a:t>
+              <a:t>The Main Container of To-Do Task –</a:t>
             </a:r>
             <a:r>
               <a:rPr lang="en-US" sz="1600" dirty="0" smtClean="0"/>
@@ -3233,6 +3237,7 @@
           </a:bodyPr>
           <a:lstStyle/>
           <a:p>
+            <a:pPr algn="just"/>
             <a:r>
               <a:rPr lang="en-US" sz="1600" b="1" dirty="0" smtClean="0"/>
               <a:t>Input Form Component – </a:t>
@@ -3473,7 +3478,7 @@
         </p:nvSpPr>
         <p:spPr>
           <a:xfrm>
-            <a:off x="4721161" y="4602890"/>
+            <a:off x="804155" y="4600415"/>
             <a:ext cx="317770" cy="369650"/>
           </a:xfrm>
           <a:prstGeom prst="rect">
@@ -3496,7 +3501,6 @@
               <a:rPr lang="en-US" dirty="0"/>
               <a:t>3</a:t>
             </a:r>
-            <a:endParaRPr lang="en-US" dirty="0"/>
           </a:p>
         </p:txBody>
       </p:sp>
@@ -3527,17 +3531,14 @@
           </a:bodyPr>
           <a:lstStyle/>
           <a:p>
+            <a:pPr algn="just"/>
             <a:r>
               <a:rPr lang="en-US" sz="1600" b="1" dirty="0" smtClean="0"/>
               <a:t>To-Do </a:t>
             </a:r>
             <a:r>
-              <a:rPr lang="en-US" sz="1600" b="1" smtClean="0"/>
-              <a:t>List Component </a:t>
-            </a:r>
-            <a:r>
               <a:rPr lang="en-US" sz="1600" b="1" dirty="0" smtClean="0"/>
-              <a:t>– </a:t>
+              <a:t>Component – </a:t>
             </a:r>
             <a:r>
               <a:rPr lang="en-US" sz="1600" dirty="0" smtClean="0"/>
@@ -3602,10 +3603,523 @@
           </a:fontRef>
         </p:style>
       </p:cxnSp>
+      <p:sp>
+        <p:nvSpPr>
+          <p:cNvPr id="2" name="Rectangle 1"/>
+          <p:cNvSpPr/>
+          <p:nvPr/>
+        </p:nvSpPr>
+        <p:spPr>
+          <a:xfrm>
+            <a:off x="836579" y="4016949"/>
+            <a:ext cx="4202352" cy="501634"/>
+          </a:xfrm>
+          <a:prstGeom prst="rect">
+            <a:avLst/>
+          </a:prstGeom>
+          <a:noFill/>
+          <a:ln>
+            <a:solidFill>
+              <a:schemeClr val="accent1"/>
+            </a:solidFill>
+          </a:ln>
+        </p:spPr>
+        <p:style>
+          <a:lnRef idx="2">
+            <a:schemeClr val="accent1">
+              <a:shade val="50000"/>
+            </a:schemeClr>
+          </a:lnRef>
+          <a:fillRef idx="1">
+            <a:schemeClr val="accent1"/>
+          </a:fillRef>
+          <a:effectRef idx="0">
+            <a:schemeClr val="accent1"/>
+          </a:effectRef>
+          <a:fontRef idx="minor">
+            <a:schemeClr val="lt1"/>
+          </a:fontRef>
+        </p:style>
+        <p:txBody>
+          <a:bodyPr rtlCol="0" anchor="ctr"/>
+          <a:lstStyle/>
+          <a:p>
+            <a:pPr algn="ctr"/>
+            <a:endParaRPr lang="en-US"/>
+          </a:p>
+        </p:txBody>
+      </p:sp>
+      <p:sp>
+        <p:nvSpPr>
+          <p:cNvPr id="16" name="TextBox 15"/>
+          <p:cNvSpPr txBox="1"/>
+          <p:nvPr/>
+        </p:nvSpPr>
+        <p:spPr>
+          <a:xfrm>
+            <a:off x="3252282" y="4082941"/>
+            <a:ext cx="317770" cy="369650"/>
+          </a:xfrm>
+          <a:prstGeom prst="rect">
+            <a:avLst/>
+          </a:prstGeom>
+          <a:solidFill>
+            <a:schemeClr val="accent1">
+              <a:lumMod val="40000"/>
+              <a:lumOff val="60000"/>
+            </a:schemeClr>
+          </a:solidFill>
+        </p:spPr>
+        <p:txBody>
+          <a:bodyPr wrap="square" rtlCol="0">
+            <a:spAutoFit/>
+          </a:bodyPr>
+          <a:lstStyle/>
+          <a:p>
+            <a:r>
+              <a:rPr lang="en-US" dirty="0"/>
+              <a:t>4</a:t>
+            </a:r>
+            <a:endParaRPr lang="en-US" dirty="0"/>
+          </a:p>
+        </p:txBody>
+      </p:sp>
+      <p:sp>
+        <p:nvSpPr>
+          <p:cNvPr id="17" name="TextBox 16"/>
+          <p:cNvSpPr txBox="1"/>
+          <p:nvPr/>
+        </p:nvSpPr>
+        <p:spPr>
+          <a:xfrm>
+            <a:off x="5823623" y="3657471"/>
+            <a:ext cx="6186791" cy="1569660"/>
+          </a:xfrm>
+          <a:prstGeom prst="rect">
+            <a:avLst/>
+          </a:prstGeom>
+          <a:solidFill>
+            <a:schemeClr val="accent1">
+              <a:lumMod val="40000"/>
+              <a:lumOff val="60000"/>
+            </a:schemeClr>
+          </a:solidFill>
+        </p:spPr>
+        <p:txBody>
+          <a:bodyPr wrap="square" rtlCol="0">
+            <a:spAutoFit/>
+          </a:bodyPr>
+          <a:lstStyle/>
+          <a:p>
+            <a:pPr algn="just"/>
+            <a:r>
+              <a:rPr lang="en-US" sz="1600" b="1" dirty="0" smtClean="0"/>
+              <a:t>To-Do List </a:t>
+            </a:r>
+            <a:r>
+              <a:rPr lang="en-US" sz="1600" b="1" dirty="0" smtClean="0"/>
+              <a:t>Component: </a:t>
+            </a:r>
+          </a:p>
+          <a:p>
+            <a:pPr marL="285750" indent="-285750" algn="just">
+              <a:buFont typeface="Arial" panose="020B0604020202020204" pitchFamily="34" charset="0"/>
+              <a:buChar char="•"/>
+            </a:pPr>
+            <a:r>
+              <a:rPr lang="en-US" sz="1600" dirty="0" smtClean="0"/>
+              <a:t>The “Delete” property is an even handler that will be called when the item is clicked. </a:t>
+            </a:r>
+            <a:r>
+              <a:rPr lang="en-US" sz="1600" dirty="0" smtClean="0"/>
+              <a:t>The purpose is to delete a task when it is click. This will be taken care of in the container component (</a:t>
+            </a:r>
+            <a:r>
+              <a:rPr lang="en-US" sz="1600" dirty="0" err="1" smtClean="0"/>
+              <a:t>Nwamba</a:t>
+            </a:r>
+            <a:r>
+              <a:rPr lang="en-US" sz="1600" dirty="0" smtClean="0"/>
+              <a:t>, 2016). </a:t>
+            </a:r>
+          </a:p>
+          <a:p>
+            <a:pPr marL="285750" indent="-285750" algn="just">
+              <a:buFont typeface="Arial" panose="020B0604020202020204" pitchFamily="34" charset="0"/>
+              <a:buChar char="•"/>
+            </a:pPr>
+            <a:r>
+              <a:rPr lang="en-US" sz="1600" dirty="0" smtClean="0"/>
+              <a:t>The only the “delete” property can be passed in to it’s to the </a:t>
+            </a:r>
+            <a:r>
+              <a:rPr lang="en-US" sz="1600" b="1" dirty="0" smtClean="0"/>
+              <a:t>To-Do Component </a:t>
+            </a:r>
+            <a:r>
+              <a:rPr lang="en-US" sz="1600" dirty="0" smtClean="0"/>
+              <a:t>via it’s parent (</a:t>
+            </a:r>
+            <a:r>
+              <a:rPr lang="en-US" sz="1600" dirty="0" err="1" smtClean="0"/>
+              <a:t>Nwamba</a:t>
+            </a:r>
+            <a:r>
+              <a:rPr lang="en-US" sz="1600" dirty="0"/>
+              <a:t> </a:t>
+            </a:r>
+            <a:r>
+              <a:rPr lang="en-US" sz="1600" dirty="0" smtClean="0"/>
+              <a:t>2016).</a:t>
+            </a:r>
+            <a:endParaRPr lang="en-US" sz="1600" dirty="0"/>
+          </a:p>
+        </p:txBody>
+      </p:sp>
+      <p:cxnSp>
+        <p:nvCxnSpPr>
+          <p:cNvPr id="5" name="Elbow Connector 4"/>
+          <p:cNvCxnSpPr>
+            <a:stCxn id="2" idx="3"/>
+            <a:endCxn id="17" idx="1"/>
+          </p:cNvCxnSpPr>
+          <p:nvPr/>
+        </p:nvCxnSpPr>
+        <p:spPr>
+          <a:xfrm>
+            <a:off x="5038931" y="4267766"/>
+            <a:ext cx="784692" cy="174535"/>
+          </a:xfrm>
+          <a:prstGeom prst="bentConnector3">
+            <a:avLst/>
+          </a:prstGeom>
+          <a:ln>
+            <a:solidFill>
+              <a:schemeClr val="tx1"/>
+            </a:solidFill>
+            <a:tailEnd type="triangle"/>
+          </a:ln>
+        </p:spPr>
+        <p:style>
+          <a:lnRef idx="1">
+            <a:schemeClr val="accent1"/>
+          </a:lnRef>
+          <a:fillRef idx="0">
+            <a:schemeClr val="accent1"/>
+          </a:fillRef>
+          <a:effectRef idx="0">
+            <a:schemeClr val="accent1"/>
+          </a:effectRef>
+          <a:fontRef idx="minor">
+            <a:schemeClr val="tx1"/>
+          </a:fontRef>
+        </p:style>
+      </p:cxnSp>
+      <p:sp>
+        <p:nvSpPr>
+          <p:cNvPr id="7" name="Rectangle 6"/>
+          <p:cNvSpPr/>
+          <p:nvPr/>
+        </p:nvSpPr>
+        <p:spPr>
+          <a:xfrm>
+            <a:off x="894945" y="4082941"/>
+            <a:ext cx="1906621" cy="359360"/>
+          </a:xfrm>
+          <a:prstGeom prst="rect">
+            <a:avLst/>
+          </a:prstGeom>
+          <a:noFill/>
+          <a:ln>
+            <a:solidFill>
+              <a:schemeClr val="accent1"/>
+            </a:solidFill>
+          </a:ln>
+        </p:spPr>
+        <p:style>
+          <a:lnRef idx="2">
+            <a:schemeClr val="accent1">
+              <a:shade val="50000"/>
+            </a:schemeClr>
+          </a:lnRef>
+          <a:fillRef idx="1">
+            <a:schemeClr val="accent1"/>
+          </a:fillRef>
+          <a:effectRef idx="0">
+            <a:schemeClr val="accent1"/>
+          </a:effectRef>
+          <a:fontRef idx="minor">
+            <a:schemeClr val="lt1"/>
+          </a:fontRef>
+        </p:style>
+        <p:txBody>
+          <a:bodyPr rtlCol="0" anchor="ctr"/>
+          <a:lstStyle/>
+          <a:p>
+            <a:pPr algn="ctr"/>
+            <a:endParaRPr lang="en-US"/>
+          </a:p>
+        </p:txBody>
+      </p:sp>
+      <p:sp>
+        <p:nvSpPr>
+          <p:cNvPr id="22" name="TextBox 21"/>
+          <p:cNvSpPr txBox="1"/>
+          <p:nvPr/>
+        </p:nvSpPr>
+        <p:spPr>
+          <a:xfrm>
+            <a:off x="5823622" y="5477948"/>
+            <a:ext cx="6186791" cy="830997"/>
+          </a:xfrm>
+          <a:prstGeom prst="rect">
+            <a:avLst/>
+          </a:prstGeom>
+          <a:solidFill>
+            <a:schemeClr val="accent1">
+              <a:lumMod val="40000"/>
+              <a:lumOff val="60000"/>
+            </a:schemeClr>
+          </a:solidFill>
+        </p:spPr>
+        <p:txBody>
+          <a:bodyPr wrap="square" rtlCol="0">
+            <a:spAutoFit/>
+          </a:bodyPr>
+          <a:lstStyle/>
+          <a:p>
+            <a:r>
+              <a:rPr lang="en-US" sz="1600" b="1" dirty="0" smtClean="0"/>
+              <a:t>Completed Component </a:t>
+            </a:r>
+            <a:r>
+              <a:rPr lang="en-US" sz="1600" dirty="0" smtClean="0"/>
+              <a:t>– This should be a simple component to hold true or false to determine whether it has been completed or not (MDN, 2020). </a:t>
+            </a:r>
+            <a:endParaRPr lang="en-US" sz="1600" dirty="0"/>
+          </a:p>
+        </p:txBody>
+      </p:sp>
+      <p:cxnSp>
+        <p:nvCxnSpPr>
+          <p:cNvPr id="10" name="Elbow Connector 9"/>
+          <p:cNvCxnSpPr>
+            <a:stCxn id="7" idx="3"/>
+            <a:endCxn id="22" idx="1"/>
+          </p:cNvCxnSpPr>
+          <p:nvPr/>
+        </p:nvCxnSpPr>
+        <p:spPr>
+          <a:xfrm>
+            <a:off x="2801566" y="4262621"/>
+            <a:ext cx="3022056" cy="1630826"/>
+          </a:xfrm>
+          <a:prstGeom prst="bentConnector3">
+            <a:avLst>
+              <a:gd name="adj1" fmla="val 6652"/>
+            </a:avLst>
+          </a:prstGeom>
+          <a:ln>
+            <a:solidFill>
+              <a:schemeClr val="tx1"/>
+            </a:solidFill>
+            <a:tailEnd type="triangle"/>
+          </a:ln>
+        </p:spPr>
+        <p:style>
+          <a:lnRef idx="1">
+            <a:schemeClr val="accent1"/>
+          </a:lnRef>
+          <a:fillRef idx="0">
+            <a:schemeClr val="accent1"/>
+          </a:fillRef>
+          <a:effectRef idx="0">
+            <a:schemeClr val="accent1"/>
+          </a:effectRef>
+          <a:fontRef idx="minor">
+            <a:schemeClr val="tx1"/>
+          </a:fontRef>
+        </p:style>
+      </p:cxnSp>
+      <p:sp>
+        <p:nvSpPr>
+          <p:cNvPr id="28" name="TextBox 27"/>
+          <p:cNvSpPr txBox="1"/>
+          <p:nvPr/>
+        </p:nvSpPr>
+        <p:spPr>
+          <a:xfrm>
+            <a:off x="2470819" y="4131816"/>
+            <a:ext cx="259408" cy="261610"/>
+          </a:xfrm>
+          <a:prstGeom prst="rect">
+            <a:avLst/>
+          </a:prstGeom>
+          <a:solidFill>
+            <a:schemeClr val="accent1">
+              <a:lumMod val="40000"/>
+              <a:lumOff val="60000"/>
+            </a:schemeClr>
+          </a:solidFill>
+        </p:spPr>
+        <p:txBody>
+          <a:bodyPr wrap="square" rtlCol="0">
+            <a:spAutoFit/>
+          </a:bodyPr>
+          <a:lstStyle/>
+          <a:p>
+            <a:r>
+              <a:rPr lang="en-US" sz="1100" dirty="0" smtClean="0"/>
+              <a:t>5</a:t>
+            </a:r>
+            <a:endParaRPr lang="en-US" sz="1100" dirty="0"/>
+          </a:p>
+        </p:txBody>
+      </p:sp>
     </p:spTree>
     <p:extLst>
       <p:ext uri="{BB962C8B-B14F-4D97-AF65-F5344CB8AC3E}">
         <p14:creationId xmlns:p14="http://schemas.microsoft.com/office/powerpoint/2010/main" val="331807710"/>
+      </p:ext>
+    </p:extLst>
+  </p:cSld>
+  <p:clrMapOvr>
+    <a:masterClrMapping/>
+  </p:clrMapOvr>
+</p:sld>
+</file>
+
+<file path=ppt/slides/slide3.xml><?xml version="1.0" encoding="utf-8"?>
+<p:sld xmlns:a="http://schemas.openxmlformats.org/drawingml/2006/main" xmlns:r="http://schemas.openxmlformats.org/officeDocument/2006/relationships" xmlns:p="http://schemas.openxmlformats.org/presentationml/2006/main">
+  <p:cSld>
+    <p:spTree>
+      <p:nvGrpSpPr>
+        <p:cNvPr id="1" name=""/>
+        <p:cNvGrpSpPr/>
+        <p:nvPr/>
+      </p:nvGrpSpPr>
+      <p:grpSpPr>
+        <a:xfrm>
+          <a:off x="0" y="0"/>
+          <a:ext cx="0" cy="0"/>
+          <a:chOff x="0" y="0"/>
+          <a:chExt cx="0" cy="0"/>
+        </a:xfrm>
+      </p:grpSpPr>
+      <p:sp>
+        <p:nvSpPr>
+          <p:cNvPr id="2" name="Title 1"/>
+          <p:cNvSpPr>
+            <a:spLocks noGrp="1"/>
+          </p:cNvSpPr>
+          <p:nvPr>
+            <p:ph type="title"/>
+          </p:nvPr>
+        </p:nvSpPr>
+        <p:spPr/>
+        <p:txBody>
+          <a:bodyPr/>
+          <a:lstStyle/>
+          <a:p>
+            <a:endParaRPr lang="en-US" dirty="0"/>
+          </a:p>
+        </p:txBody>
+      </p:sp>
+      <p:sp>
+        <p:nvSpPr>
+          <p:cNvPr id="3" name="Content Placeholder 2"/>
+          <p:cNvSpPr>
+            <a:spLocks noGrp="1"/>
+          </p:cNvSpPr>
+          <p:nvPr>
+            <p:ph idx="1"/>
+          </p:nvPr>
+        </p:nvSpPr>
+        <p:spPr/>
+        <p:txBody>
+          <a:bodyPr/>
+          <a:lstStyle/>
+          <a:p>
+            <a:endParaRPr lang="en-US" dirty="0"/>
+          </a:p>
+        </p:txBody>
+      </p:sp>
+    </p:spTree>
+    <p:extLst>
+      <p:ext uri="{BB962C8B-B14F-4D97-AF65-F5344CB8AC3E}">
+        <p14:creationId xmlns:p14="http://schemas.microsoft.com/office/powerpoint/2010/main" val="116127418"/>
+      </p:ext>
+    </p:extLst>
+  </p:cSld>
+  <p:clrMapOvr>
+    <a:masterClrMapping/>
+  </p:clrMapOvr>
+</p:sld>
+</file>
+
+<file path=ppt/slides/slide4.xml><?xml version="1.0" encoding="utf-8"?>
+<p:sld xmlns:a="http://schemas.openxmlformats.org/drawingml/2006/main" xmlns:r="http://schemas.openxmlformats.org/officeDocument/2006/relationships" xmlns:p="http://schemas.openxmlformats.org/presentationml/2006/main">
+  <p:cSld>
+    <p:spTree>
+      <p:nvGrpSpPr>
+        <p:cNvPr id="1" name=""/>
+        <p:cNvGrpSpPr/>
+        <p:nvPr/>
+      </p:nvGrpSpPr>
+      <p:grpSpPr>
+        <a:xfrm>
+          <a:off x="0" y="0"/>
+          <a:ext cx="0" cy="0"/>
+          <a:chOff x="0" y="0"/>
+          <a:chExt cx="0" cy="0"/>
+        </a:xfrm>
+      </p:grpSpPr>
+      <p:sp>
+        <p:nvSpPr>
+          <p:cNvPr id="2" name="Title 1"/>
+          <p:cNvSpPr>
+            <a:spLocks noGrp="1"/>
+          </p:cNvSpPr>
+          <p:nvPr>
+            <p:ph type="title"/>
+          </p:nvPr>
+        </p:nvSpPr>
+        <p:spPr/>
+        <p:txBody>
+          <a:bodyPr/>
+          <a:lstStyle/>
+          <a:p>
+            <a:r>
+              <a:rPr lang="en-US" dirty="0" smtClean="0"/>
+              <a:t>Breakdowns (Pseudocode)</a:t>
+            </a:r>
+            <a:endParaRPr lang="en-US" dirty="0"/>
+          </a:p>
+        </p:txBody>
+      </p:sp>
+      <p:sp>
+        <p:nvSpPr>
+          <p:cNvPr id="3" name="Content Placeholder 2"/>
+          <p:cNvSpPr>
+            <a:spLocks noGrp="1"/>
+          </p:cNvSpPr>
+          <p:nvPr>
+            <p:ph idx="1"/>
+          </p:nvPr>
+        </p:nvSpPr>
+        <p:spPr/>
+        <p:txBody>
+          <a:bodyPr/>
+          <a:lstStyle/>
+          <a:p>
+            <a:endParaRPr lang="en-US"/>
+          </a:p>
+        </p:txBody>
+      </p:sp>
+    </p:spTree>
+    <p:extLst>
+      <p:ext uri="{BB962C8B-B14F-4D97-AF65-F5344CB8AC3E}">
+        <p14:creationId xmlns:p14="http://schemas.microsoft.com/office/powerpoint/2010/main" val="3966638509"/>
       </p:ext>
     </p:extLst>
   </p:cSld>

</xml_diff>

<commit_message>
getting ready to add mozilla to do app for react
</commit_message>
<xml_diff>
--- a/To-Do-App-Illustrations/React To-Do Planning Assignment.pptx
+++ b/To-Do-App-Illustrations/React To-Do Planning Assignment.pptx
@@ -7,8 +7,10 @@
   <p:sldIdLst>
     <p:sldId id="256" r:id="rId2"/>
     <p:sldId id="257" r:id="rId3"/>
-    <p:sldId id="259" r:id="rId4"/>
-    <p:sldId id="258" r:id="rId5"/>
+    <p:sldId id="261" r:id="rId4"/>
+    <p:sldId id="260" r:id="rId5"/>
+    <p:sldId id="259" r:id="rId6"/>
+    <p:sldId id="258" r:id="rId7"/>
   </p:sldIdLst>
   <p:sldSz cx="12192000" cy="6858000"/>
   <p:notesSz cx="6858000" cy="9144000"/>
@@ -3534,11 +3536,7 @@
             <a:pPr algn="just"/>
             <a:r>
               <a:rPr lang="en-US" sz="1600" b="1" dirty="0" smtClean="0"/>
-              <a:t>To-Do </a:t>
-            </a:r>
-            <a:r>
-              <a:rPr lang="en-US" sz="1600" b="1" dirty="0" smtClean="0"/>
-              <a:t>Component – </a:t>
+              <a:t>To-Do Component – </a:t>
             </a:r>
             <a:r>
               <a:rPr lang="en-US" sz="1600" dirty="0" smtClean="0"/>
@@ -3680,7 +3678,6 @@
               <a:rPr lang="en-US" dirty="0"/>
               <a:t>4</a:t>
             </a:r>
-            <a:endParaRPr lang="en-US" dirty="0"/>
           </a:p>
         </p:txBody>
       </p:sp>
@@ -3714,11 +3711,7 @@
             <a:pPr algn="just"/>
             <a:r>
               <a:rPr lang="en-US" sz="1600" b="1" dirty="0" smtClean="0"/>
-              <a:t>To-Do List </a:t>
-            </a:r>
-            <a:r>
-              <a:rPr lang="en-US" sz="1600" b="1" dirty="0" smtClean="0"/>
-              <a:t>Component: </a:t>
+              <a:t>To-Do List Component: </a:t>
             </a:r>
           </a:p>
           <a:p>
@@ -3728,11 +3721,7 @@
             </a:pPr>
             <a:r>
               <a:rPr lang="en-US" sz="1600" dirty="0" smtClean="0"/>
-              <a:t>The “Delete” property is an even handler that will be called when the item is clicked. </a:t>
-            </a:r>
-            <a:r>
-              <a:rPr lang="en-US" sz="1600" dirty="0" smtClean="0"/>
-              <a:t>The purpose is to delete a task when it is click. This will be taken care of in the container component (</a:t>
+              <a:t>The “Delete” property is an even handler that will be called when the item is clicked. The purpose is to delete a task when it is click. This will be taken care of in the container component (</a:t>
             </a:r>
             <a:r>
               <a:rPr lang="en-US" sz="1600" dirty="0" err="1" smtClean="0"/>
@@ -3894,7 +3883,11 @@
             </a:r>
             <a:r>
               <a:rPr lang="en-US" sz="1600" dirty="0" smtClean="0"/>
-              <a:t>– This should be a simple component to hold true or false to determine whether it has been completed or not (MDN, 2020). </a:t>
+              <a:t>– This should be a simple component to hold true or false to determine whether it has been completed or not (MDN, </a:t>
+            </a:r>
+            <a:r>
+              <a:rPr lang="en-US" sz="1600" dirty="0" smtClean="0"/>
+              <a:t>2020a). </a:t>
             </a:r>
             <a:endParaRPr lang="en-US" sz="1600" dirty="0"/>
           </a:p>
@@ -4021,6 +4014,10 @@
           <a:bodyPr/>
           <a:lstStyle/>
           <a:p>
+            <a:r>
+              <a:rPr lang="en-US" dirty="0" smtClean="0"/>
+              <a:t>Initializing my To-Do app (MDN, 2020b).</a:t>
+            </a:r>
             <a:endParaRPr lang="en-US" dirty="0"/>
           </a:p>
         </p:txBody>
@@ -4040,7 +4037,317 @@
           <a:bodyPr/>
           <a:lstStyle/>
           <a:p>
+            <a:pPr marL="0" indent="0">
+              <a:buNone/>
+            </a:pPr>
             <a:endParaRPr lang="en-US" dirty="0"/>
+          </a:p>
+        </p:txBody>
+      </p:sp>
+    </p:spTree>
+    <p:extLst>
+      <p:ext uri="{BB962C8B-B14F-4D97-AF65-F5344CB8AC3E}">
+        <p14:creationId xmlns:p14="http://schemas.microsoft.com/office/powerpoint/2010/main" val="541559058"/>
+      </p:ext>
+    </p:extLst>
+  </p:cSld>
+  <p:clrMapOvr>
+    <a:masterClrMapping/>
+  </p:clrMapOvr>
+</p:sld>
+</file>
+
+<file path=ppt/slides/slide4.xml><?xml version="1.0" encoding="utf-8"?>
+<p:sld xmlns:a="http://schemas.openxmlformats.org/drawingml/2006/main" xmlns:r="http://schemas.openxmlformats.org/officeDocument/2006/relationships" xmlns:p="http://schemas.openxmlformats.org/presentationml/2006/main">
+  <p:cSld>
+    <p:spTree>
+      <p:nvGrpSpPr>
+        <p:cNvPr id="1" name=""/>
+        <p:cNvGrpSpPr/>
+        <p:nvPr/>
+      </p:nvGrpSpPr>
+      <p:grpSpPr>
+        <a:xfrm>
+          <a:off x="0" y="0"/>
+          <a:ext cx="0" cy="0"/>
+          <a:chOff x="0" y="0"/>
+          <a:chExt cx="0" cy="0"/>
+        </a:xfrm>
+      </p:grpSpPr>
+      <p:sp>
+        <p:nvSpPr>
+          <p:cNvPr id="2" name="Title 1"/>
+          <p:cNvSpPr>
+            <a:spLocks noGrp="1"/>
+          </p:cNvSpPr>
+          <p:nvPr>
+            <p:ph type="ctrTitle"/>
+          </p:nvPr>
+        </p:nvSpPr>
+        <p:spPr/>
+        <p:txBody>
+          <a:bodyPr/>
+          <a:lstStyle/>
+          <a:p>
+            <a:r>
+              <a:rPr lang="en-US" dirty="0" smtClean="0"/>
+              <a:t>How Each Components are Linked</a:t>
+            </a:r>
+            <a:endParaRPr lang="en-US" dirty="0"/>
+          </a:p>
+        </p:txBody>
+      </p:sp>
+      <p:sp>
+        <p:nvSpPr>
+          <p:cNvPr id="3" name="Subtitle 2"/>
+          <p:cNvSpPr>
+            <a:spLocks noGrp="1"/>
+          </p:cNvSpPr>
+          <p:nvPr>
+            <p:ph type="subTitle" idx="1"/>
+          </p:nvPr>
+        </p:nvSpPr>
+        <p:spPr/>
+        <p:txBody>
+          <a:bodyPr/>
+          <a:lstStyle/>
+          <a:p>
+            <a:r>
+              <a:rPr lang="en-US" dirty="0" smtClean="0"/>
+              <a:t>A visual description of a functioning To-Do application using arrows and pseudocode. </a:t>
+            </a:r>
+            <a:endParaRPr lang="en-US" dirty="0"/>
+          </a:p>
+        </p:txBody>
+      </p:sp>
+    </p:spTree>
+    <p:extLst>
+      <p:ext uri="{BB962C8B-B14F-4D97-AF65-F5344CB8AC3E}">
+        <p14:creationId xmlns:p14="http://schemas.microsoft.com/office/powerpoint/2010/main" val="453486192"/>
+      </p:ext>
+    </p:extLst>
+  </p:cSld>
+  <p:clrMapOvr>
+    <a:masterClrMapping/>
+  </p:clrMapOvr>
+</p:sld>
+</file>
+
+<file path=ppt/slides/slide5.xml><?xml version="1.0" encoding="utf-8"?>
+<p:sld xmlns:a="http://schemas.openxmlformats.org/drawingml/2006/main" xmlns:r="http://schemas.openxmlformats.org/officeDocument/2006/relationships" xmlns:p="http://schemas.openxmlformats.org/presentationml/2006/main">
+  <p:cSld>
+    <p:spTree>
+      <p:nvGrpSpPr>
+        <p:cNvPr id="1" name=""/>
+        <p:cNvGrpSpPr/>
+        <p:nvPr/>
+      </p:nvGrpSpPr>
+      <p:grpSpPr>
+        <a:xfrm>
+          <a:off x="0" y="0"/>
+          <a:ext cx="0" cy="0"/>
+          <a:chOff x="0" y="0"/>
+          <a:chExt cx="0" cy="0"/>
+        </a:xfrm>
+      </p:grpSpPr>
+      <p:sp>
+        <p:nvSpPr>
+          <p:cNvPr id="2" name="Title 1"/>
+          <p:cNvSpPr>
+            <a:spLocks noGrp="1"/>
+          </p:cNvSpPr>
+          <p:nvPr>
+            <p:ph type="title"/>
+          </p:nvPr>
+        </p:nvSpPr>
+        <p:spPr>
+          <a:xfrm>
+            <a:off x="5051897" y="360598"/>
+            <a:ext cx="6621294" cy="534348"/>
+          </a:xfrm>
+          <a:solidFill>
+            <a:schemeClr val="accent1">
+              <a:lumMod val="40000"/>
+              <a:lumOff val="60000"/>
+            </a:schemeClr>
+          </a:solidFill>
+        </p:spPr>
+        <p:txBody>
+          <a:bodyPr>
+            <a:normAutofit fontScale="90000"/>
+          </a:bodyPr>
+          <a:lstStyle/>
+          <a:p>
+            <a:r>
+              <a:rPr lang="en-US" sz="3600" dirty="0" smtClean="0"/>
+              <a:t>Step 1: User input. </a:t>
+            </a:r>
+            <a:endParaRPr lang="en-US" sz="3600" dirty="0"/>
+          </a:p>
+        </p:txBody>
+      </p:sp>
+      <p:pic>
+        <p:nvPicPr>
+          <p:cNvPr id="4" name="Content Placeholder 3"/>
+          <p:cNvPicPr>
+            <a:picLocks noGrp="1" noChangeAspect="1"/>
+          </p:cNvPicPr>
+          <p:nvPr>
+            <p:ph idx="1"/>
+          </p:nvPr>
+        </p:nvPicPr>
+        <p:blipFill>
+          <a:blip r:embed="rId2">
+            <a:extLst>
+              <a:ext uri="{28A0092B-C50C-407E-A947-70E740481C1C}">
+                <a14:useLocalDpi xmlns:a14="http://schemas.microsoft.com/office/drawing/2010/main" val="0"/>
+              </a:ext>
+            </a:extLst>
+          </a:blip>
+          <a:stretch>
+            <a:fillRect/>
+          </a:stretch>
+        </p:blipFill>
+        <p:spPr>
+          <a:xfrm>
+            <a:off x="488651" y="365124"/>
+            <a:ext cx="4290535" cy="5147215"/>
+          </a:xfrm>
+        </p:spPr>
+      </p:pic>
+      <p:sp>
+        <p:nvSpPr>
+          <p:cNvPr id="5" name="TextBox 4"/>
+          <p:cNvSpPr txBox="1"/>
+          <p:nvPr/>
+        </p:nvSpPr>
+        <p:spPr>
+          <a:xfrm>
+            <a:off x="5069711" y="1177366"/>
+            <a:ext cx="6603480" cy="923330"/>
+          </a:xfrm>
+          <a:prstGeom prst="rect">
+            <a:avLst/>
+          </a:prstGeom>
+          <a:noFill/>
+        </p:spPr>
+        <p:txBody>
+          <a:bodyPr wrap="square" rtlCol="0">
+            <a:spAutoFit/>
+          </a:bodyPr>
+          <a:lstStyle/>
+          <a:p>
+            <a:pPr marL="342900" indent="-342900">
+              <a:buAutoNum type="arabicPeriod"/>
+            </a:pPr>
+            <a:r>
+              <a:rPr lang="en-US" dirty="0" smtClean="0"/>
+              <a:t>User input task such as “eat”, “sleep”, “grooming”, etc. </a:t>
+            </a:r>
+          </a:p>
+          <a:p>
+            <a:pPr marL="342900" indent="-342900">
+              <a:buAutoNum type="arabicPeriod"/>
+            </a:pPr>
+            <a:endParaRPr lang="en-US" dirty="0" smtClean="0"/>
+          </a:p>
+          <a:p>
+            <a:pPr marL="342900" indent="-342900">
+              <a:buAutoNum type="arabicPeriod"/>
+            </a:pPr>
+            <a:endParaRPr lang="en-US" dirty="0" smtClean="0"/>
+          </a:p>
+        </p:txBody>
+      </p:sp>
+      <p:sp>
+        <p:nvSpPr>
+          <p:cNvPr id="6" name="Rectangle 5"/>
+          <p:cNvSpPr/>
+          <p:nvPr/>
+        </p:nvSpPr>
+        <p:spPr>
+          <a:xfrm>
+            <a:off x="779177" y="1546698"/>
+            <a:ext cx="3709481" cy="560962"/>
+          </a:xfrm>
+          <a:prstGeom prst="rect">
+            <a:avLst/>
+          </a:prstGeom>
+          <a:noFill/>
+          <a:ln>
+            <a:solidFill>
+              <a:schemeClr val="accent1"/>
+            </a:solidFill>
+          </a:ln>
+        </p:spPr>
+        <p:style>
+          <a:lnRef idx="2">
+            <a:schemeClr val="accent1">
+              <a:shade val="50000"/>
+            </a:schemeClr>
+          </a:lnRef>
+          <a:fillRef idx="1">
+            <a:schemeClr val="accent1"/>
+          </a:fillRef>
+          <a:effectRef idx="0">
+            <a:schemeClr val="accent1"/>
+          </a:effectRef>
+          <a:fontRef idx="minor">
+            <a:schemeClr val="lt1"/>
+          </a:fontRef>
+        </p:style>
+        <p:txBody>
+          <a:bodyPr rtlCol="0" anchor="ctr"/>
+          <a:lstStyle/>
+          <a:p>
+            <a:pPr algn="ctr"/>
+            <a:endParaRPr lang="en-US"/>
+          </a:p>
+        </p:txBody>
+      </p:sp>
+      <p:sp>
+        <p:nvSpPr>
+          <p:cNvPr id="8" name="Rectangle 7"/>
+          <p:cNvSpPr/>
+          <p:nvPr/>
+        </p:nvSpPr>
+        <p:spPr>
+          <a:xfrm>
+            <a:off x="779176" y="985736"/>
+            <a:ext cx="3709481" cy="560962"/>
+          </a:xfrm>
+          <a:prstGeom prst="rect">
+            <a:avLst/>
+          </a:prstGeom>
+          <a:noFill/>
+          <a:ln>
+            <a:solidFill>
+              <a:schemeClr val="accent1"/>
+            </a:solidFill>
+          </a:ln>
+        </p:spPr>
+        <p:style>
+          <a:lnRef idx="2">
+            <a:schemeClr val="accent1">
+              <a:shade val="50000"/>
+            </a:schemeClr>
+          </a:lnRef>
+          <a:fillRef idx="1">
+            <a:schemeClr val="accent1"/>
+          </a:fillRef>
+          <a:effectRef idx="0">
+            <a:schemeClr val="accent1"/>
+          </a:effectRef>
+          <a:fontRef idx="minor">
+            <a:schemeClr val="lt1"/>
+          </a:fontRef>
+        </p:style>
+        <p:txBody>
+          <a:bodyPr rtlCol="0" anchor="ctr"/>
+          <a:lstStyle/>
+          <a:p>
+            <a:pPr algn="ctr"/>
+            <a:endParaRPr lang="en-US"/>
           </a:p>
         </p:txBody>
       </p:sp>
@@ -4057,7 +4364,7 @@
 </p:sld>
 </file>
 
-<file path=ppt/slides/slide4.xml><?xml version="1.0" encoding="utf-8"?>
+<file path=ppt/slides/slide6.xml><?xml version="1.0" encoding="utf-8"?>
 <p:sld xmlns:a="http://schemas.openxmlformats.org/drawingml/2006/main" xmlns:r="http://schemas.openxmlformats.org/officeDocument/2006/relationships" xmlns:p="http://schemas.openxmlformats.org/presentationml/2006/main">
   <p:cSld>
     <p:spTree>

</xml_diff>

<commit_message>
mozilla react app added
</commit_message>
<xml_diff>
--- a/To-Do-App-Illustrations/React To-Do Planning Assignment.pptx
+++ b/To-Do-App-Illustrations/React To-Do Planning Assignment.pptx
@@ -2996,7 +2996,7 @@
         </p:blipFill>
         <p:spPr>
           <a:xfrm>
-            <a:off x="3378740" y="1259955"/>
+            <a:off x="833947" y="1199570"/>
             <a:ext cx="4441942" cy="5328852"/>
           </a:xfrm>
           <a:prstGeom prst="rect">
@@ -3016,8 +3016,8 @@
         </p:nvSpPr>
         <p:spPr>
           <a:xfrm>
-            <a:off x="1154170" y="343711"/>
-            <a:ext cx="8891081" cy="733898"/>
+            <a:off x="833947" y="317832"/>
+            <a:ext cx="10432150" cy="733898"/>
           </a:xfrm>
         </p:spPr>
         <p:txBody>
@@ -3031,6 +3031,47 @@
               <a:t>React To-Do Planning Assignment</a:t>
             </a:r>
             <a:endParaRPr lang="en-US" sz="4000" dirty="0"/>
+          </a:p>
+        </p:txBody>
+      </p:sp>
+      <p:sp>
+        <p:nvSpPr>
+          <p:cNvPr id="2" name="TextBox 1"/>
+          <p:cNvSpPr txBox="1"/>
+          <p:nvPr/>
+        </p:nvSpPr>
+        <p:spPr>
+          <a:xfrm>
+            <a:off x="5512280" y="1199570"/>
+            <a:ext cx="5753817" cy="646331"/>
+          </a:xfrm>
+          <a:prstGeom prst="rect">
+            <a:avLst/>
+          </a:prstGeom>
+          <a:noFill/>
+        </p:spPr>
+        <p:txBody>
+          <a:bodyPr wrap="square" rtlCol="0">
+            <a:spAutoFit/>
+          </a:bodyPr>
+          <a:lstStyle/>
+          <a:p>
+            <a:pPr marL="285750" indent="-285750">
+              <a:buFont typeface="Arial" panose="020B0604020202020204" pitchFamily="34" charset="0"/>
+              <a:buChar char="•"/>
+            </a:pPr>
+            <a:r>
+              <a:rPr lang="en-US" dirty="0" smtClean="0"/>
+              <a:t>In React, a </a:t>
+            </a:r>
+            <a:r>
+              <a:rPr lang="en-US" b="1" dirty="0" smtClean="0"/>
+              <a:t>component </a:t>
+            </a:r>
+            <a:r>
+              <a:rPr lang="en-US" dirty="0" smtClean="0"/>
+              <a:t>is a reusable module that renders a part of our app.</a:t>
+            </a:r>
           </a:p>
         </p:txBody>
       </p:sp>
@@ -3883,11 +3924,7 @@
             </a:r>
             <a:r>
               <a:rPr lang="en-US" sz="1600" dirty="0" smtClean="0"/>
-              <a:t>– This should be a simple component to hold true or false to determine whether it has been completed or not (MDN, </a:t>
-            </a:r>
-            <a:r>
-              <a:rPr lang="en-US" sz="1600" dirty="0" smtClean="0"/>
-              <a:t>2020a). </a:t>
+              <a:t>– This should be a simple component to hold true or false to determine whether it has been completed or not (MDN, 2020a). </a:t>
             </a:r>
             <a:endParaRPr lang="en-US" sz="1600" dirty="0"/>
           </a:p>
@@ -4037,10 +4074,113 @@
           <a:bodyPr/>
           <a:lstStyle/>
           <a:p>
-            <a:pPr marL="0" indent="0">
-              <a:buNone/>
+            <a:pPr marL="514350" indent="-514350">
+              <a:buAutoNum type="arabicPeriod"/>
             </a:pPr>
-            <a:endParaRPr lang="en-US" dirty="0"/>
+            <a:r>
+              <a:rPr lang="en-US" sz="2000" dirty="0" smtClean="0"/>
+              <a:t>Install </a:t>
+            </a:r>
+            <a:r>
+              <a:rPr lang="en-US" sz="2000" dirty="0" err="1" smtClean="0"/>
+              <a:t>npm</a:t>
+            </a:r>
+            <a:r>
+              <a:rPr lang="en-US" sz="2000" dirty="0" smtClean="0"/>
+              <a:t> packages such as </a:t>
+            </a:r>
+            <a:r>
+              <a:rPr lang="en-US" sz="2000" dirty="0" err="1" smtClean="0">
+                <a:latin typeface="Courier New" panose="02070309020205020404" pitchFamily="49" charset="0"/>
+                <a:cs typeface="Courier New" panose="02070309020205020404" pitchFamily="49" charset="0"/>
+              </a:rPr>
+              <a:t>npx</a:t>
+            </a:r>
+            <a:r>
+              <a:rPr lang="en-US" sz="2000" dirty="0" smtClean="0">
+                <a:latin typeface="Courier New" panose="02070309020205020404" pitchFamily="49" charset="0"/>
+                <a:cs typeface="Courier New" panose="02070309020205020404" pitchFamily="49" charset="0"/>
+              </a:rPr>
+              <a:t> create-react-app </a:t>
+            </a:r>
+            <a:r>
+              <a:rPr lang="en-US" sz="2000" dirty="0" err="1" smtClean="0">
+                <a:latin typeface="Courier New" panose="02070309020205020404" pitchFamily="49" charset="0"/>
+                <a:cs typeface="Courier New" panose="02070309020205020404" pitchFamily="49" charset="0"/>
+              </a:rPr>
+              <a:t>moz</a:t>
+            </a:r>
+            <a:r>
+              <a:rPr lang="en-US" sz="2000" dirty="0" smtClean="0">
+                <a:latin typeface="Courier New" panose="02070309020205020404" pitchFamily="49" charset="0"/>
+                <a:cs typeface="Courier New" panose="02070309020205020404" pitchFamily="49" charset="0"/>
+              </a:rPr>
+              <a:t>-</a:t>
+            </a:r>
+            <a:r>
+              <a:rPr lang="en-US" sz="2000" dirty="0" err="1" smtClean="0">
+                <a:latin typeface="Courier New" panose="02070309020205020404" pitchFamily="49" charset="0"/>
+                <a:cs typeface="Courier New" panose="02070309020205020404" pitchFamily="49" charset="0"/>
+              </a:rPr>
+              <a:t>todo</a:t>
+            </a:r>
+            <a:r>
+              <a:rPr lang="en-US" sz="2000" dirty="0" smtClean="0">
+                <a:latin typeface="Courier New" panose="02070309020205020404" pitchFamily="49" charset="0"/>
+                <a:cs typeface="Courier New" panose="02070309020205020404" pitchFamily="49" charset="0"/>
+              </a:rPr>
+              <a:t>-react</a:t>
+            </a:r>
+            <a:r>
+              <a:rPr lang="en-US" sz="2000" dirty="0" smtClean="0"/>
+              <a:t>.</a:t>
+            </a:r>
+          </a:p>
+          <a:p>
+            <a:pPr marL="514350" indent="-514350">
+              <a:buAutoNum type="arabicPeriod"/>
+            </a:pPr>
+            <a:r>
+              <a:rPr lang="en-US" sz="2000" dirty="0" smtClean="0"/>
+              <a:t>Initialize </a:t>
+            </a:r>
+            <a:r>
+              <a:rPr lang="en-US" sz="2000" dirty="0" err="1" smtClean="0">
+                <a:latin typeface="Courier New" panose="02070309020205020404" pitchFamily="49" charset="0"/>
+                <a:cs typeface="Courier New" panose="02070309020205020404" pitchFamily="49" charset="0"/>
+              </a:rPr>
+              <a:t>npm</a:t>
+            </a:r>
+            <a:r>
+              <a:rPr lang="en-US" sz="2000" dirty="0" smtClean="0">
+                <a:latin typeface="Courier New" panose="02070309020205020404" pitchFamily="49" charset="0"/>
+                <a:cs typeface="Courier New" panose="02070309020205020404" pitchFamily="49" charset="0"/>
+              </a:rPr>
+              <a:t> start.</a:t>
+            </a:r>
+          </a:p>
+          <a:p>
+            <a:pPr marL="514350" indent="-514350">
+              <a:buAutoNum type="arabicPeriod"/>
+            </a:pPr>
+            <a:endParaRPr lang="en-US" sz="2000" dirty="0" smtClean="0">
+              <a:cs typeface="Courier New" panose="02070309020205020404" pitchFamily="49" charset="0"/>
+            </a:endParaRPr>
+          </a:p>
+          <a:p>
+            <a:pPr marL="514350" indent="-514350">
+              <a:buAutoNum type="arabicPeriod"/>
+            </a:pPr>
+            <a:endParaRPr lang="en-US" sz="2000" dirty="0">
+              <a:latin typeface="Courier New" panose="02070309020205020404" pitchFamily="49" charset="0"/>
+              <a:cs typeface="Courier New" panose="02070309020205020404" pitchFamily="49" charset="0"/>
+            </a:endParaRPr>
+          </a:p>
+          <a:p>
+            <a:pPr marL="514350" indent="-514350">
+              <a:buAutoNum type="arabicPeriod"/>
+            </a:pPr>
+            <a:endParaRPr lang="en-US" sz="2000" dirty="0" smtClean="0"/>
           </a:p>
         </p:txBody>
       </p:sp>

</xml_diff>

<commit_message>
added skeleton to the app.js sheet
</commit_message>
<xml_diff>
--- a/To-Do-App-Illustrations/React To-Do Planning Assignment.pptx
+++ b/To-Do-App-Illustrations/React To-Do Planning Assignment.pptx
@@ -10,7 +10,8 @@
     <p:sldId id="261" r:id="rId4"/>
     <p:sldId id="260" r:id="rId5"/>
     <p:sldId id="259" r:id="rId6"/>
-    <p:sldId id="258" r:id="rId7"/>
+    <p:sldId id="262" r:id="rId7"/>
+    <p:sldId id="258" r:id="rId8"/>
   </p:sldIdLst>
   <p:sldSz cx="12192000" cy="6858000"/>
   <p:notesSz cx="6858000" cy="9144000"/>
@@ -3043,7 +3044,7 @@
         <p:spPr>
           <a:xfrm>
             <a:off x="5512280" y="1199570"/>
-            <a:ext cx="5753817" cy="646331"/>
+            <a:ext cx="5753817" cy="3416320"/>
           </a:xfrm>
           <a:prstGeom prst="rect">
             <a:avLst/>
@@ -3070,8 +3071,130 @@
             </a:r>
             <a:r>
               <a:rPr lang="en-US" dirty="0" smtClean="0"/>
-              <a:t>is a reusable module that renders a part of our app.</a:t>
-            </a:r>
+              <a:t>is a reusable module that renders a part of our </a:t>
+            </a:r>
+            <a:r>
+              <a:rPr lang="en-US" dirty="0" smtClean="0"/>
+              <a:t>app (MDN, 2020b).</a:t>
+            </a:r>
+          </a:p>
+          <a:p>
+            <a:pPr marL="285750" indent="-285750">
+              <a:buFont typeface="Arial" panose="020B0604020202020204" pitchFamily="34" charset="0"/>
+              <a:buChar char="•"/>
+            </a:pPr>
+            <a:r>
+              <a:rPr lang="en-US" dirty="0" smtClean="0"/>
+              <a:t>A </a:t>
+            </a:r>
+            <a:r>
+              <a:rPr lang="en-US" b="1" dirty="0" smtClean="0"/>
+              <a:t>prop</a:t>
+            </a:r>
+            <a:r>
+              <a:rPr lang="en-US" dirty="0" smtClean="0"/>
+              <a:t> is any data passed into a React component (MDN, 2020b). </a:t>
+            </a:r>
+          </a:p>
+          <a:p>
+            <a:pPr marL="742950" lvl="1" indent="-285750">
+              <a:buFont typeface="Arial" panose="020B0604020202020204" pitchFamily="34" charset="0"/>
+              <a:buChar char="•"/>
+            </a:pPr>
+            <a:r>
+              <a:rPr lang="en-US" b="1" dirty="0" smtClean="0"/>
+              <a:t>Props</a:t>
+            </a:r>
+            <a:r>
+              <a:rPr lang="en-US" dirty="0" smtClean="0"/>
+              <a:t> are written inside component calls, and use the same syntax as HTML attributes – </a:t>
+            </a:r>
+            <a:r>
+              <a:rPr lang="en-US" dirty="0" smtClean="0">
+                <a:latin typeface="Courier New" panose="02070309020205020404" pitchFamily="49" charset="0"/>
+                <a:cs typeface="Courier New" panose="02070309020205020404" pitchFamily="49" charset="0"/>
+              </a:rPr>
+              <a:t>prop=“value”.</a:t>
+            </a:r>
+            <a:endParaRPr lang="en-US" dirty="0">
+              <a:latin typeface="Courier New" panose="02070309020205020404" pitchFamily="49" charset="0"/>
+              <a:cs typeface="Courier New" panose="02070309020205020404" pitchFamily="49" charset="0"/>
+            </a:endParaRPr>
+          </a:p>
+          <a:p>
+            <a:pPr marL="285750" indent="-285750">
+              <a:buFont typeface="Arial" panose="020B0604020202020204" pitchFamily="34" charset="0"/>
+              <a:buChar char="•"/>
+            </a:pPr>
+            <a:r>
+              <a:rPr lang="en-US" dirty="0" smtClean="0">
+                <a:cs typeface="Courier New" panose="02070309020205020404" pitchFamily="49" charset="0"/>
+              </a:rPr>
+              <a:t>Consider Parsley’s user choice (MDN, 2020b):</a:t>
+            </a:r>
+          </a:p>
+          <a:p>
+            <a:pPr marL="742950" lvl="1" indent="-285750">
+              <a:buFont typeface="Arial" panose="020B0604020202020204" pitchFamily="34" charset="0"/>
+              <a:buChar char="•"/>
+            </a:pPr>
+            <a:r>
+              <a:rPr lang="en-US" dirty="0" smtClean="0">
+                <a:cs typeface="Courier New" panose="02070309020205020404" pitchFamily="49" charset="0"/>
+              </a:rPr>
+              <a:t>read a lists of tasks.</a:t>
+            </a:r>
+          </a:p>
+          <a:p>
+            <a:pPr marL="742950" lvl="1" indent="-285750">
+              <a:buFont typeface="Arial" panose="020B0604020202020204" pitchFamily="34" charset="0"/>
+              <a:buChar char="•"/>
+            </a:pPr>
+            <a:r>
+              <a:rPr lang="en-US" dirty="0">
+                <a:cs typeface="Courier New" panose="02070309020205020404" pitchFamily="49" charset="0"/>
+              </a:rPr>
+              <a:t>a</a:t>
+            </a:r>
+            <a:r>
+              <a:rPr lang="en-US" dirty="0" smtClean="0">
+                <a:cs typeface="Courier New" panose="02070309020205020404" pitchFamily="49" charset="0"/>
+              </a:rPr>
+              <a:t>dd a tasks using the mouse/keyboard.</a:t>
+            </a:r>
+          </a:p>
+          <a:p>
+            <a:pPr marL="742950" lvl="1" indent="-285750">
+              <a:buFont typeface="Arial" panose="020B0604020202020204" pitchFamily="34" charset="0"/>
+              <a:buChar char="•"/>
+            </a:pPr>
+            <a:r>
+              <a:rPr lang="en-US" dirty="0">
+                <a:cs typeface="Courier New" panose="02070309020205020404" pitchFamily="49" charset="0"/>
+              </a:rPr>
+              <a:t>m</a:t>
+            </a:r>
+            <a:r>
+              <a:rPr lang="en-US" dirty="0" smtClean="0">
+                <a:cs typeface="Courier New" panose="02070309020205020404" pitchFamily="49" charset="0"/>
+              </a:rPr>
+              <a:t>ark any task as completed using mouse/keyboard.</a:t>
+            </a:r>
+          </a:p>
+          <a:p>
+            <a:pPr marL="742950" lvl="1" indent="-285750">
+              <a:buFont typeface="Arial" panose="020B0604020202020204" pitchFamily="34" charset="0"/>
+              <a:buChar char="•"/>
+            </a:pPr>
+            <a:r>
+              <a:rPr lang="en-US" dirty="0" smtClean="0">
+                <a:cs typeface="Courier New" panose="02070309020205020404" pitchFamily="49" charset="0"/>
+              </a:rPr>
+              <a:t>delete any task using mouse/keyboard. </a:t>
+            </a:r>
+            <a:endParaRPr lang="en-US" dirty="0" smtClean="0">
+              <a:cs typeface="Courier New" panose="02070309020205020404" pitchFamily="49" charset="0"/>
+            </a:endParaRPr>
           </a:p>
         </p:txBody>
       </p:sp>
@@ -3731,7 +3854,7 @@
         <p:spPr>
           <a:xfrm>
             <a:off x="5823623" y="3657471"/>
-            <a:ext cx="6186791" cy="1569660"/>
+            <a:ext cx="6186791" cy="1815882"/>
           </a:xfrm>
           <a:prstGeom prst="rect">
             <a:avLst/>
@@ -3762,7 +3885,15 @@
             </a:pPr>
             <a:r>
               <a:rPr lang="en-US" sz="1600" dirty="0" smtClean="0"/>
-              <a:t>The “Delete” property is an even handler that will be called when the item is clicked. The purpose is to delete a task when it is click. This will be taken care of in the container component (</a:t>
+              <a:t>The “Delete” property is an </a:t>
+            </a:r>
+            <a:r>
+              <a:rPr lang="en-US" sz="1600" dirty="0" smtClean="0"/>
+              <a:t>event </a:t>
+            </a:r>
+            <a:r>
+              <a:rPr lang="en-US" sz="1600" dirty="0" smtClean="0"/>
+              <a:t>handler that will be called when the item is clicked. The purpose is to delete a task when it is click. This will be taken care of in the container component (</a:t>
             </a:r>
             <a:r>
               <a:rPr lang="en-US" sz="1600" dirty="0" err="1" smtClean="0"/>
@@ -3818,7 +3949,7 @@
         <p:spPr>
           <a:xfrm>
             <a:off x="5038931" y="4267766"/>
-            <a:ext cx="784692" cy="174535"/>
+            <a:ext cx="784692" cy="297646"/>
           </a:xfrm>
           <a:prstGeom prst="bentConnector3">
             <a:avLst/>
@@ -3899,7 +4030,7 @@
         </p:nvSpPr>
         <p:spPr>
           <a:xfrm>
-            <a:off x="5823622" y="5477948"/>
+            <a:off x="5823623" y="5645469"/>
             <a:ext cx="6186791" cy="830997"/>
           </a:xfrm>
           <a:prstGeom prst="rect">
@@ -3942,11 +4073,11 @@
         <p:spPr>
           <a:xfrm>
             <a:off x="2801566" y="4262621"/>
-            <a:ext cx="3022056" cy="1630826"/>
+            <a:ext cx="3022057" cy="1798347"/>
           </a:xfrm>
           <a:prstGeom prst="bentConnector3">
             <a:avLst>
-              <a:gd name="adj1" fmla="val 6652"/>
+              <a:gd name="adj1" fmla="val 10209"/>
             </a:avLst>
           </a:prstGeom>
           <a:ln>
@@ -4156,8 +4287,111 @@
                 <a:latin typeface="Courier New" panose="02070309020205020404" pitchFamily="49" charset="0"/>
                 <a:cs typeface="Courier New" panose="02070309020205020404" pitchFamily="49" charset="0"/>
               </a:rPr>
-              <a:t> start.</a:t>
-            </a:r>
+              <a:t> start</a:t>
+            </a:r>
+            <a:r>
+              <a:rPr lang="en-US" sz="2000" dirty="0" smtClean="0">
+                <a:latin typeface="Courier New" panose="02070309020205020404" pitchFamily="49" charset="0"/>
+                <a:cs typeface="Courier New" panose="02070309020205020404" pitchFamily="49" charset="0"/>
+              </a:rPr>
+              <a:t>.</a:t>
+            </a:r>
+          </a:p>
+          <a:p>
+            <a:pPr marL="514350" indent="-514350">
+              <a:buAutoNum type="arabicPeriod"/>
+            </a:pPr>
+            <a:r>
+              <a:rPr lang="en-US" sz="2000" dirty="0" smtClean="0">
+                <a:cs typeface="Courier New" panose="02070309020205020404" pitchFamily="49" charset="0"/>
+              </a:rPr>
+              <a:t>Review app.js and understand </a:t>
+            </a:r>
+            <a:r>
+              <a:rPr lang="en-US" sz="2000" dirty="0" smtClean="0">
+                <a:latin typeface="Courier New" panose="02070309020205020404" pitchFamily="49" charset="0"/>
+                <a:cs typeface="Courier New" panose="02070309020205020404" pitchFamily="49" charset="0"/>
+              </a:rPr>
+              <a:t>import</a:t>
+            </a:r>
+            <a:r>
+              <a:rPr lang="en-US" sz="2000" dirty="0" smtClean="0">
+                <a:cs typeface="Courier New" panose="02070309020205020404" pitchFamily="49" charset="0"/>
+              </a:rPr>
+              <a:t> statements, app component in the middle, </a:t>
+            </a:r>
+            <a:r>
+              <a:rPr lang="en-US" sz="2000" dirty="0" smtClean="0">
+                <a:latin typeface="Courier New" panose="02070309020205020404" pitchFamily="49" charset="0"/>
+                <a:cs typeface="Courier New" panose="02070309020205020404" pitchFamily="49" charset="0"/>
+              </a:rPr>
+              <a:t>export</a:t>
+            </a:r>
+            <a:r>
+              <a:rPr lang="en-US" sz="2000" dirty="0" smtClean="0">
+                <a:cs typeface="Courier New" panose="02070309020205020404" pitchFamily="49" charset="0"/>
+              </a:rPr>
+              <a:t> statement at the bottom. </a:t>
+            </a:r>
+          </a:p>
+          <a:p>
+            <a:pPr marL="514350" indent="-514350">
+              <a:buAutoNum type="arabicPeriod"/>
+            </a:pPr>
+            <a:r>
+              <a:rPr lang="en-US" sz="2000" dirty="0" smtClean="0">
+                <a:cs typeface="Courier New" panose="02070309020205020404" pitchFamily="49" charset="0"/>
+              </a:rPr>
+              <a:t>Pre-project house keeping. Since we are not doing any styling (assume we have a design department</a:t>
+            </a:r>
+            <a:r>
+              <a:rPr lang="en-US" sz="2000" dirty="0">
+                <a:cs typeface="Courier New" panose="02070309020205020404" pitchFamily="49" charset="0"/>
+              </a:rPr>
+              <a:t>), </a:t>
+            </a:r>
+            <a:r>
+              <a:rPr lang="en-US" sz="2000" dirty="0">
+                <a:latin typeface="Courier New" panose="02070309020205020404" pitchFamily="49" charset="0"/>
+                <a:cs typeface="Courier New" panose="02070309020205020404" pitchFamily="49" charset="0"/>
+              </a:rPr>
+              <a:t>App.test.js App.css </a:t>
+            </a:r>
+            <a:r>
+              <a:rPr lang="en-US" sz="2000" dirty="0" err="1">
+                <a:latin typeface="Courier New" panose="02070309020205020404" pitchFamily="49" charset="0"/>
+                <a:cs typeface="Courier New" panose="02070309020205020404" pitchFamily="49" charset="0"/>
+              </a:rPr>
+              <a:t>logo.svg</a:t>
+            </a:r>
+            <a:r>
+              <a:rPr lang="en-US" sz="2000" dirty="0">
+                <a:latin typeface="Courier New" panose="02070309020205020404" pitchFamily="49" charset="0"/>
+                <a:cs typeface="Courier New" panose="02070309020205020404" pitchFamily="49" charset="0"/>
+              </a:rPr>
+              <a:t> serviceWorker.js </a:t>
+            </a:r>
+            <a:r>
+              <a:rPr lang="en-US" sz="2000" dirty="0" smtClean="0">
+                <a:latin typeface="Courier New" panose="02070309020205020404" pitchFamily="49" charset="0"/>
+                <a:cs typeface="Courier New" panose="02070309020205020404" pitchFamily="49" charset="0"/>
+              </a:rPr>
+              <a:t>setupTests.js</a:t>
+            </a:r>
+            <a:r>
+              <a:rPr lang="en-US" sz="2000" dirty="0" smtClean="0">
+                <a:cs typeface="Courier New" panose="02070309020205020404" pitchFamily="49" charset="0"/>
+              </a:rPr>
+              <a:t>. Additionally, we also removed the unrelated links to styles sheet and script sheet.</a:t>
+            </a:r>
+          </a:p>
+          <a:p>
+            <a:pPr marL="514350" indent="-514350">
+              <a:buAutoNum type="arabicPeriod"/>
+            </a:pPr>
+            <a:endParaRPr lang="en-US" sz="2000" dirty="0" smtClean="0">
+              <a:cs typeface="Courier New" panose="02070309020205020404" pitchFamily="49" charset="0"/>
+            </a:endParaRPr>
           </a:p>
           <a:p>
             <a:pPr marL="514350" indent="-514350">
@@ -4302,8 +4536,8 @@
         </p:nvSpPr>
         <p:spPr>
           <a:xfrm>
-            <a:off x="5051897" y="360598"/>
-            <a:ext cx="6621294" cy="534348"/>
+            <a:off x="5051897" y="360597"/>
+            <a:ext cx="6621294" cy="917057"/>
           </a:xfrm>
           <a:solidFill>
             <a:schemeClr val="accent1">
@@ -4320,7 +4554,23 @@
           <a:p>
             <a:r>
               <a:rPr lang="en-US" sz="3600" dirty="0" smtClean="0"/>
-              <a:t>Step 1: User input. </a:t>
+              <a:t>Step </a:t>
+            </a:r>
+            <a:r>
+              <a:rPr lang="en-US" sz="3600" dirty="0"/>
+              <a:t>1</a:t>
+            </a:r>
+            <a:r>
+              <a:rPr lang="en-US" sz="3600" dirty="0" smtClean="0"/>
+              <a:t>: </a:t>
+            </a:r>
+            <a:r>
+              <a:rPr lang="en-US" sz="3600" dirty="0"/>
+              <a:t>The Main Container of To-Do Task </a:t>
+            </a:r>
+            <a:r>
+              <a:rPr lang="en-US" sz="3600" dirty="0" smtClean="0"/>
+              <a:t>(MDN, 2020b).</a:t>
             </a:r>
             <a:endParaRPr lang="en-US" sz="3600" dirty="0"/>
           </a:p>
@@ -4350,26 +4600,31 @@
         </p:blipFill>
         <p:spPr>
           <a:xfrm>
-            <a:off x="488651" y="365124"/>
+            <a:off x="488649" y="360597"/>
             <a:ext cx="4290535" cy="5147215"/>
           </a:xfrm>
         </p:spPr>
       </p:pic>
       <p:sp>
         <p:nvSpPr>
-          <p:cNvPr id="5" name="TextBox 4"/>
+          <p:cNvPr id="7" name="TextBox 6"/>
           <p:cNvSpPr txBox="1"/>
           <p:nvPr/>
         </p:nvSpPr>
         <p:spPr>
           <a:xfrm>
-            <a:off x="5069711" y="1177366"/>
-            <a:ext cx="6603480" cy="923330"/>
+            <a:off x="4196219" y="631234"/>
+            <a:ext cx="375781" cy="375781"/>
           </a:xfrm>
           <a:prstGeom prst="rect">
             <a:avLst/>
           </a:prstGeom>
-          <a:noFill/>
+          <a:solidFill>
+            <a:schemeClr val="accent1">
+              <a:lumMod val="40000"/>
+              <a:lumOff val="60000"/>
+            </a:schemeClr>
+          </a:solidFill>
         </p:spPr>
         <p:txBody>
           <a:bodyPr wrap="square" rtlCol="0">
@@ -4377,38 +4632,24 @@
           </a:bodyPr>
           <a:lstStyle/>
           <a:p>
-            <a:pPr marL="342900" indent="-342900">
-              <a:buAutoNum type="arabicPeriod"/>
-            </a:pPr>
             <a:r>
               <a:rPr lang="en-US" dirty="0" smtClean="0"/>
-              <a:t>User input task such as “eat”, “sleep”, “grooming”, etc. </a:t>
-            </a:r>
-          </a:p>
-          <a:p>
-            <a:pPr marL="342900" indent="-342900">
-              <a:buAutoNum type="arabicPeriod"/>
-            </a:pPr>
-            <a:endParaRPr lang="en-US" dirty="0" smtClean="0"/>
-          </a:p>
-          <a:p>
-            <a:pPr marL="342900" indent="-342900">
-              <a:buAutoNum type="arabicPeriod"/>
-            </a:pPr>
-            <a:endParaRPr lang="en-US" dirty="0" smtClean="0"/>
-          </a:p>
-        </p:txBody>
-      </p:sp>
-      <p:sp>
-        <p:nvSpPr>
-          <p:cNvPr id="6" name="Rectangle 5"/>
+              <a:t>1</a:t>
+            </a:r>
+            <a:endParaRPr lang="en-US" dirty="0"/>
+          </a:p>
+        </p:txBody>
+      </p:sp>
+      <p:sp>
+        <p:nvSpPr>
+          <p:cNvPr id="9" name="Rectangle 8"/>
           <p:cNvSpPr/>
           <p:nvPr/>
         </p:nvSpPr>
         <p:spPr>
           <a:xfrm>
-            <a:off x="779177" y="1546698"/>
-            <a:ext cx="3709481" cy="560962"/>
+            <a:off x="610962" y="475989"/>
+            <a:ext cx="4045907" cy="4614511"/>
           </a:xfrm>
           <a:prstGeom prst="rect">
             <a:avLst/>
@@ -4416,7 +4657,9 @@
           <a:noFill/>
           <a:ln>
             <a:solidFill>
-              <a:schemeClr val="accent1"/>
+              <a:schemeClr val="accent1">
+                <a:lumMod val="75000"/>
+              </a:schemeClr>
             </a:solidFill>
           </a:ln>
         </p:spPr>
@@ -4445,15 +4688,407 @@
           </a:p>
         </p:txBody>
       </p:sp>
-      <p:sp>
-        <p:nvSpPr>
-          <p:cNvPr id="8" name="Rectangle 7"/>
+      <p:cxnSp>
+        <p:nvCxnSpPr>
+          <p:cNvPr id="13" name="Elbow Connector 12"/>
+          <p:cNvCxnSpPr/>
+          <p:nvPr/>
+        </p:nvCxnSpPr>
+        <p:spPr>
+          <a:xfrm flipV="1">
+            <a:off x="4624105" y="819124"/>
+            <a:ext cx="395028" cy="1964119"/>
+          </a:xfrm>
+          <a:prstGeom prst="bentConnector3">
+            <a:avLst/>
+          </a:prstGeom>
+          <a:ln>
+            <a:solidFill>
+              <a:schemeClr val="tx1"/>
+            </a:solidFill>
+            <a:tailEnd type="triangle"/>
+          </a:ln>
+        </p:spPr>
+        <p:style>
+          <a:lnRef idx="1">
+            <a:schemeClr val="accent1"/>
+          </a:lnRef>
+          <a:fillRef idx="0">
+            <a:schemeClr val="accent1"/>
+          </a:fillRef>
+          <a:effectRef idx="0">
+            <a:schemeClr val="accent1"/>
+          </a:effectRef>
+          <a:fontRef idx="minor">
+            <a:schemeClr val="tx1"/>
+          </a:fontRef>
+        </p:style>
+      </p:cxnSp>
+      <p:sp>
+        <p:nvSpPr>
+          <p:cNvPr id="14" name="TextBox 13"/>
+          <p:cNvSpPr txBox="1"/>
+          <p:nvPr/>
+        </p:nvSpPr>
+        <p:spPr>
+          <a:xfrm>
+            <a:off x="5051897" y="1578279"/>
+            <a:ext cx="6459522" cy="3693319"/>
+          </a:xfrm>
+          <a:prstGeom prst="rect">
+            <a:avLst/>
+          </a:prstGeom>
+          <a:noFill/>
+        </p:spPr>
+        <p:txBody>
+          <a:bodyPr wrap="square" rtlCol="0">
+            <a:spAutoFit/>
+          </a:bodyPr>
+          <a:lstStyle/>
+          <a:p>
+            <a:pPr marL="342900" indent="-342900">
+              <a:buAutoNum type="arabicPeriod"/>
+            </a:pPr>
+            <a:r>
+              <a:rPr lang="en-US" dirty="0" smtClean="0"/>
+              <a:t>Create a skeleton</a:t>
+            </a:r>
+            <a:r>
+              <a:rPr lang="en-US" dirty="0" smtClean="0">
+                <a:latin typeface="Courier New" panose="02070309020205020404" pitchFamily="49" charset="0"/>
+                <a:cs typeface="Courier New" panose="02070309020205020404" pitchFamily="49" charset="0"/>
+              </a:rPr>
+              <a:t> App(function</a:t>
+            </a:r>
+            <a:r>
+              <a:rPr lang="en-US" dirty="0" smtClean="0"/>
+              <a:t>)  and paste to the App.js that creates the:</a:t>
+            </a:r>
+          </a:p>
+          <a:p>
+            <a:pPr marL="800100" lvl="1" indent="-342900">
+              <a:buFont typeface="+mj-lt"/>
+              <a:buAutoNum type="alphaLcParenR"/>
+            </a:pPr>
+            <a:r>
+              <a:rPr lang="en-US" dirty="0" smtClean="0"/>
+              <a:t>Title: Parsley’s To Do List</a:t>
+            </a:r>
+          </a:p>
+          <a:p>
+            <a:pPr marL="800100" lvl="1" indent="-342900">
+              <a:buFont typeface="+mj-lt"/>
+              <a:buAutoNum type="alphaLcParenR"/>
+            </a:pPr>
+            <a:r>
+              <a:rPr lang="en-US" dirty="0" smtClean="0"/>
+              <a:t>Input Form:  create </a:t>
+            </a:r>
+            <a:r>
+              <a:rPr lang="en-US" dirty="0" smtClean="0">
+                <a:latin typeface="Courier New" panose="02070309020205020404" pitchFamily="49" charset="0"/>
+                <a:cs typeface="Courier New" panose="02070309020205020404" pitchFamily="49" charset="0"/>
+              </a:rPr>
+              <a:t>&lt;form&gt; </a:t>
+            </a:r>
+            <a:r>
+              <a:rPr lang="en-US" dirty="0" smtClean="0"/>
+              <a:t>element to make a skeleton of an input form user can type.</a:t>
+            </a:r>
+          </a:p>
+          <a:p>
+            <a:pPr marL="800100" lvl="1" indent="-342900">
+              <a:buFont typeface="+mj-lt"/>
+              <a:buAutoNum type="alphaLcParenR"/>
+            </a:pPr>
+            <a:r>
+              <a:rPr lang="en-US" dirty="0" smtClean="0"/>
+              <a:t>Button: create a button </a:t>
+            </a:r>
+            <a:r>
+              <a:rPr lang="en-US" dirty="0" smtClean="0">
+                <a:latin typeface="Courier New" panose="02070309020205020404" pitchFamily="49" charset="0"/>
+                <a:cs typeface="Courier New" panose="02070309020205020404" pitchFamily="49" charset="0"/>
+              </a:rPr>
+              <a:t>type=“submit”.</a:t>
+            </a:r>
+          </a:p>
+          <a:p>
+            <a:pPr marL="800100" lvl="1" indent="-342900">
+              <a:buFont typeface="+mj-lt"/>
+              <a:buAutoNum type="alphaLcParenR"/>
+            </a:pPr>
+            <a:r>
+              <a:rPr lang="en-US" dirty="0" smtClean="0">
+                <a:cs typeface="Arial" panose="020B0604020202020204" pitchFamily="34" charset="0"/>
+              </a:rPr>
+              <a:t>Create three unordered list </a:t>
+            </a:r>
+            <a:r>
+              <a:rPr lang="en-US" dirty="0" smtClean="0">
+                <a:latin typeface="Courier New" panose="02070309020205020404" pitchFamily="49" charset="0"/>
+                <a:cs typeface="Courier New" panose="02070309020205020404" pitchFamily="49" charset="0"/>
+              </a:rPr>
+              <a:t>&lt;</a:t>
+            </a:r>
+            <a:r>
+              <a:rPr lang="en-US" dirty="0" err="1" smtClean="0">
+                <a:latin typeface="Courier New" panose="02070309020205020404" pitchFamily="49" charset="0"/>
+                <a:cs typeface="Courier New" panose="02070309020205020404" pitchFamily="49" charset="0"/>
+              </a:rPr>
+              <a:t>ul</a:t>
+            </a:r>
+            <a:r>
+              <a:rPr lang="en-US" dirty="0" smtClean="0">
+                <a:latin typeface="Courier New" panose="02070309020205020404" pitchFamily="49" charset="0"/>
+                <a:cs typeface="Courier New" panose="02070309020205020404" pitchFamily="49" charset="0"/>
+              </a:rPr>
+              <a:t>&gt; </a:t>
+            </a:r>
+            <a:r>
+              <a:rPr lang="en-US" dirty="0" smtClean="0">
+                <a:cs typeface="Arial" panose="020B0604020202020204" pitchFamily="34" charset="0"/>
+              </a:rPr>
+              <a:t>and </a:t>
+            </a:r>
+            <a:r>
+              <a:rPr lang="en-US" dirty="0" smtClean="0">
+                <a:latin typeface="Courier New" panose="02070309020205020404" pitchFamily="49" charset="0"/>
+                <a:cs typeface="Courier New" panose="02070309020205020404" pitchFamily="49" charset="0"/>
+              </a:rPr>
+              <a:t>&lt;li&gt; </a:t>
+            </a:r>
+            <a:r>
+              <a:rPr lang="en-US" dirty="0" smtClean="0">
+                <a:cs typeface="Arial" panose="020B0604020202020204" pitchFamily="34" charset="0"/>
+              </a:rPr>
+              <a:t>as shown as eat, sleep, and watch birds</a:t>
+            </a:r>
+            <a:r>
+              <a:rPr lang="en-US" dirty="0" smtClean="0">
+                <a:latin typeface="Arial" panose="020B0604020202020204" pitchFamily="34" charset="0"/>
+                <a:cs typeface="Arial" panose="020B0604020202020204" pitchFamily="34" charset="0"/>
+              </a:rPr>
+              <a:t>. </a:t>
+            </a:r>
+          </a:p>
+          <a:p>
+            <a:pPr marL="800100" lvl="1" indent="-342900">
+              <a:buFont typeface="+mj-lt"/>
+              <a:buAutoNum type="alphaLcParenR"/>
+            </a:pPr>
+            <a:r>
+              <a:rPr lang="en-US" dirty="0" smtClean="0">
+                <a:cs typeface="Arial" panose="020B0604020202020204" pitchFamily="34" charset="0"/>
+              </a:rPr>
+              <a:t>Check box is represented by </a:t>
+            </a:r>
+            <a:r>
+              <a:rPr lang="en-US" dirty="0">
+                <a:cs typeface="Arial" panose="020B0604020202020204" pitchFamily="34" charset="0"/>
+              </a:rPr>
+              <a:t> </a:t>
+            </a:r>
+            <a:r>
+              <a:rPr lang="en-US" dirty="0">
+                <a:latin typeface="Courier New" panose="02070309020205020404" pitchFamily="49" charset="0"/>
+                <a:cs typeface="Courier New" panose="02070309020205020404" pitchFamily="49" charset="0"/>
+              </a:rPr>
+              <a:t>&lt;</a:t>
+            </a:r>
+            <a:r>
+              <a:rPr lang="en-US" dirty="0" smtClean="0">
+                <a:latin typeface="Courier New" panose="02070309020205020404" pitchFamily="49" charset="0"/>
+                <a:cs typeface="Courier New" panose="02070309020205020404" pitchFamily="49" charset="0"/>
+              </a:rPr>
+              <a:t>input</a:t>
+            </a:r>
+            <a:r>
+              <a:rPr lang="en-US" dirty="0">
+                <a:latin typeface="Courier New" panose="02070309020205020404" pitchFamily="49" charset="0"/>
+                <a:cs typeface="Courier New" panose="02070309020205020404" pitchFamily="49" charset="0"/>
+              </a:rPr>
+              <a:t> type="checkbox" </a:t>
+            </a:r>
+            <a:r>
+              <a:rPr lang="en-US" dirty="0" err="1">
+                <a:latin typeface="Courier New" panose="02070309020205020404" pitchFamily="49" charset="0"/>
+                <a:cs typeface="Courier New" panose="02070309020205020404" pitchFamily="49" charset="0"/>
+              </a:rPr>
+              <a:t>defaultChecked</a:t>
+            </a:r>
+            <a:r>
+              <a:rPr lang="en-US" dirty="0">
+                <a:latin typeface="Courier New" panose="02070309020205020404" pitchFamily="49" charset="0"/>
+                <a:cs typeface="Courier New" panose="02070309020205020404" pitchFamily="49" charset="0"/>
+              </a:rPr>
+              <a:t>={true} /&gt;</a:t>
+            </a:r>
+          </a:p>
+          <a:p>
+            <a:pPr marL="800100" lvl="1" indent="-342900">
+              <a:buFont typeface="+mj-lt"/>
+              <a:buAutoNum type="alphaLcParenR"/>
+            </a:pPr>
+            <a:r>
+              <a:rPr lang="en-US" dirty="0" smtClean="0">
+                <a:cs typeface="Arial" panose="020B0604020202020204" pitchFamily="34" charset="0"/>
+              </a:rPr>
+              <a:t>Delete button is represented with a button element to remove the specific listed task. </a:t>
+            </a:r>
+          </a:p>
+        </p:txBody>
+      </p:sp>
+    </p:spTree>
+    <p:extLst>
+      <p:ext uri="{BB962C8B-B14F-4D97-AF65-F5344CB8AC3E}">
+        <p14:creationId xmlns:p14="http://schemas.microsoft.com/office/powerpoint/2010/main" val="116127418"/>
+      </p:ext>
+    </p:extLst>
+  </p:cSld>
+  <p:clrMapOvr>
+    <a:masterClrMapping/>
+  </p:clrMapOvr>
+</p:sld>
+</file>
+
+<file path=ppt/slides/slide6.xml><?xml version="1.0" encoding="utf-8"?>
+<p:sld xmlns:a="http://schemas.openxmlformats.org/drawingml/2006/main" xmlns:r="http://schemas.openxmlformats.org/officeDocument/2006/relationships" xmlns:p="http://schemas.openxmlformats.org/presentationml/2006/main">
+  <p:cSld>
+    <p:spTree>
+      <p:nvGrpSpPr>
+        <p:cNvPr id="1" name=""/>
+        <p:cNvGrpSpPr/>
+        <p:nvPr/>
+      </p:nvGrpSpPr>
+      <p:grpSpPr>
+        <a:xfrm>
+          <a:off x="0" y="0"/>
+          <a:ext cx="0" cy="0"/>
+          <a:chOff x="0" y="0"/>
+          <a:chExt cx="0" cy="0"/>
+        </a:xfrm>
+      </p:grpSpPr>
+      <p:sp>
+        <p:nvSpPr>
+          <p:cNvPr id="2" name="Title 1"/>
+          <p:cNvSpPr>
+            <a:spLocks noGrp="1"/>
+          </p:cNvSpPr>
+          <p:nvPr>
+            <p:ph type="title"/>
+          </p:nvPr>
+        </p:nvSpPr>
+        <p:spPr>
+          <a:xfrm>
+            <a:off x="5051897" y="360598"/>
+            <a:ext cx="6621294" cy="534348"/>
+          </a:xfrm>
+          <a:solidFill>
+            <a:schemeClr val="accent1">
+              <a:lumMod val="40000"/>
+              <a:lumOff val="60000"/>
+            </a:schemeClr>
+          </a:solidFill>
+        </p:spPr>
+        <p:txBody>
+          <a:bodyPr>
+            <a:normAutofit fontScale="90000"/>
+          </a:bodyPr>
+          <a:lstStyle/>
+          <a:p>
+            <a:r>
+              <a:rPr lang="en-US" sz="3600" dirty="0" smtClean="0"/>
+              <a:t>Step </a:t>
+            </a:r>
+            <a:r>
+              <a:rPr lang="en-US" sz="3600" dirty="0" smtClean="0"/>
+              <a:t>2: </a:t>
+            </a:r>
+            <a:r>
+              <a:rPr lang="en-US" sz="3600" dirty="0"/>
+              <a:t>The Main Container of To-Do Task </a:t>
+            </a:r>
+            <a:endParaRPr lang="en-US" sz="3600" dirty="0"/>
+          </a:p>
+        </p:txBody>
+      </p:sp>
+      <p:pic>
+        <p:nvPicPr>
+          <p:cNvPr id="4" name="Content Placeholder 3"/>
+          <p:cNvPicPr>
+            <a:picLocks noGrp="1" noChangeAspect="1"/>
+          </p:cNvPicPr>
+          <p:nvPr>
+            <p:ph idx="1"/>
+          </p:nvPr>
+        </p:nvPicPr>
+        <p:blipFill>
+          <a:blip r:embed="rId2">
+            <a:extLst>
+              <a:ext uri="{28A0092B-C50C-407E-A947-70E740481C1C}">
+                <a14:useLocalDpi xmlns:a14="http://schemas.microsoft.com/office/drawing/2010/main" val="0"/>
+              </a:ext>
+            </a:extLst>
+          </a:blip>
+          <a:stretch>
+            <a:fillRect/>
+          </a:stretch>
+        </p:blipFill>
+        <p:spPr>
+          <a:xfrm>
+            <a:off x="488651" y="365124"/>
+            <a:ext cx="4290535" cy="5147215"/>
+          </a:xfrm>
+        </p:spPr>
+      </p:pic>
+      <p:sp>
+        <p:nvSpPr>
+          <p:cNvPr id="5" name="TextBox 4"/>
+          <p:cNvSpPr txBox="1"/>
+          <p:nvPr/>
+        </p:nvSpPr>
+        <p:spPr>
+          <a:xfrm>
+            <a:off x="5069711" y="1177366"/>
+            <a:ext cx="6603480" cy="646331"/>
+          </a:xfrm>
+          <a:prstGeom prst="rect">
+            <a:avLst/>
+          </a:prstGeom>
+          <a:noFill/>
+        </p:spPr>
+        <p:txBody>
+          <a:bodyPr wrap="square" rtlCol="0">
+            <a:spAutoFit/>
+          </a:bodyPr>
+          <a:lstStyle/>
+          <a:p>
+            <a:pPr marL="342900" indent="-342900">
+              <a:buAutoNum type="arabicPeriod"/>
+            </a:pPr>
+            <a:r>
+              <a:rPr lang="en-US" dirty="0" smtClean="0"/>
+              <a:t>User input task such as “eat”, “sleep”, “grooming”, etc. </a:t>
+            </a:r>
+          </a:p>
+          <a:p>
+            <a:pPr marL="342900" indent="-342900">
+              <a:buAutoNum type="arabicPeriod"/>
+            </a:pPr>
+            <a:endParaRPr lang="en-US" dirty="0" smtClean="0"/>
+          </a:p>
+        </p:txBody>
+      </p:sp>
+      <p:sp>
+        <p:nvSpPr>
+          <p:cNvPr id="6" name="Rectangle 5"/>
           <p:cNvSpPr/>
           <p:nvPr/>
         </p:nvSpPr>
         <p:spPr>
           <a:xfrm>
-            <a:off x="779176" y="985736"/>
+            <a:off x="779177" y="1546698"/>
             <a:ext cx="3709481" cy="560962"/>
           </a:xfrm>
           <a:prstGeom prst="rect">
@@ -4491,10 +5126,56 @@
           </a:p>
         </p:txBody>
       </p:sp>
+      <p:sp>
+        <p:nvSpPr>
+          <p:cNvPr id="8" name="Rectangle 7"/>
+          <p:cNvSpPr/>
+          <p:nvPr/>
+        </p:nvSpPr>
+        <p:spPr>
+          <a:xfrm>
+            <a:off x="779176" y="985736"/>
+            <a:ext cx="3709481" cy="560962"/>
+          </a:xfrm>
+          <a:prstGeom prst="rect">
+            <a:avLst/>
+          </a:prstGeom>
+          <a:noFill/>
+          <a:ln>
+            <a:solidFill>
+              <a:schemeClr val="accent1"/>
+            </a:solidFill>
+          </a:ln>
+        </p:spPr>
+        <p:style>
+          <a:lnRef idx="2">
+            <a:schemeClr val="accent1">
+              <a:shade val="50000"/>
+            </a:schemeClr>
+          </a:lnRef>
+          <a:fillRef idx="1">
+            <a:schemeClr val="accent1"/>
+          </a:fillRef>
+          <a:effectRef idx="0">
+            <a:schemeClr val="accent1"/>
+          </a:effectRef>
+          <a:fontRef idx="minor">
+            <a:schemeClr val="lt1"/>
+          </a:fontRef>
+        </p:style>
+        <p:txBody>
+          <a:bodyPr rtlCol="0" anchor="ctr"/>
+          <a:lstStyle/>
+          <a:p>
+            <a:pPr algn="ctr"/>
+            <a:endParaRPr lang="en-US"/>
+          </a:p>
+        </p:txBody>
+      </p:sp>
     </p:spTree>
     <p:extLst>
       <p:ext uri="{BB962C8B-B14F-4D97-AF65-F5344CB8AC3E}">
-        <p14:creationId xmlns:p14="http://schemas.microsoft.com/office/powerpoint/2010/main" val="116127418"/>
+        <p14:creationId xmlns:p14="http://schemas.microsoft.com/office/powerpoint/2010/main" val="345095300"/>
       </p:ext>
     </p:extLst>
   </p:cSld>
@@ -4504,7 +5185,7 @@
 </p:sld>
 </file>
 
-<file path=ppt/slides/slide6.xml><?xml version="1.0" encoding="utf-8"?>
+<file path=ppt/slides/slide7.xml><?xml version="1.0" encoding="utf-8"?>
 <p:sld xmlns:a="http://schemas.openxmlformats.org/drawingml/2006/main" xmlns:r="http://schemas.openxmlformats.org/officeDocument/2006/relationships" xmlns:p="http://schemas.openxmlformats.org/presentationml/2006/main">
   <p:cSld>
     <p:spTree>

</xml_diff>

<commit_message>
completed PowerPoint how each component is linked to one another to create a fully functional application
</commit_message>
<xml_diff>
--- a/To-Do-App-Illustrations/React To-Do Planning Assignment.pptx
+++ b/To-Do-App-Illustrations/React To-Do Planning Assignment.pptx
@@ -7,11 +7,12 @@
   <p:sldIdLst>
     <p:sldId id="256" r:id="rId2"/>
     <p:sldId id="257" r:id="rId3"/>
-    <p:sldId id="261" r:id="rId4"/>
-    <p:sldId id="260" r:id="rId5"/>
-    <p:sldId id="259" r:id="rId6"/>
-    <p:sldId id="262" r:id="rId7"/>
-    <p:sldId id="258" r:id="rId8"/>
+    <p:sldId id="263" r:id="rId4"/>
+    <p:sldId id="261" r:id="rId5"/>
+    <p:sldId id="260" r:id="rId6"/>
+    <p:sldId id="259" r:id="rId7"/>
+    <p:sldId id="262" r:id="rId8"/>
+    <p:sldId id="258" r:id="rId9"/>
   </p:sldIdLst>
   <p:sldSz cx="12192000" cy="6858000"/>
   <p:notesSz cx="6858000" cy="9144000"/>
@@ -3071,11 +3072,7 @@
             </a:r>
             <a:r>
               <a:rPr lang="en-US" dirty="0" smtClean="0"/>
-              <a:t>is a reusable module that renders a part of our </a:t>
-            </a:r>
-            <a:r>
-              <a:rPr lang="en-US" dirty="0" smtClean="0"/>
-              <a:t>app (MDN, 2020b).</a:t>
+              <a:t>is a reusable module that renders a part of our app (MDN, 2020b).</a:t>
             </a:r>
           </a:p>
           <a:p>
@@ -3192,9 +3189,6 @@
               </a:rPr>
               <a:t>delete any task using mouse/keyboard. </a:t>
             </a:r>
-            <a:endParaRPr lang="en-US" dirty="0" smtClean="0">
-              <a:cs typeface="Courier New" panose="02070309020205020404" pitchFamily="49" charset="0"/>
-            </a:endParaRPr>
           </a:p>
         </p:txBody>
       </p:sp>
@@ -3208,6 +3202,13 @@
   <p:clrMapOvr>
     <a:masterClrMapping/>
   </p:clrMapOvr>
+  <p:timing>
+    <p:tnLst>
+      <p:par>
+        <p:cTn id="1" dur="indefinite" restart="never" nodeType="tmRoot"/>
+      </p:par>
+    </p:tnLst>
+  </p:timing>
 </p:sld>
 </file>
 
@@ -3301,8 +3302,8 @@
         </p:nvSpPr>
         <p:spPr>
           <a:xfrm>
-            <a:off x="5823625" y="502284"/>
-            <a:ext cx="6186791" cy="830997"/>
+            <a:off x="5836595" y="533834"/>
+            <a:ext cx="6186791" cy="1077218"/>
           </a:xfrm>
           <a:prstGeom prst="rect">
             <a:avLst/>
@@ -3323,11 +3324,19 @@
             <a:pPr algn="just"/>
             <a:r>
               <a:rPr lang="en-US" sz="1600" b="1" dirty="0" smtClean="0"/>
-              <a:t>The Main Container of To-Do Task –</a:t>
+              <a:t>The Main Container of To-Do Task </a:t>
+            </a:r>
+            <a:r>
+              <a:rPr lang="en-US" sz="1600" b="1" dirty="0" smtClean="0"/>
+              <a:t>Component –</a:t>
             </a:r>
             <a:r>
               <a:rPr lang="en-US" sz="1600" dirty="0" smtClean="0"/>
-              <a:t>  This container component will show page for the user. This container include components: input task form, add task button, task list, delete buttons (</a:t>
+              <a:t>  </a:t>
+            </a:r>
+            <a:r>
+              <a:rPr lang="en-US" sz="1600" dirty="0" smtClean="0"/>
+              <a:t>This container component will show page for the user. This container include components: input task form, add task button, task list, delete buttons (</a:t>
             </a:r>
             <a:r>
               <a:rPr lang="en-US" sz="1600" dirty="0" err="1" smtClean="0"/>
@@ -3384,7 +3393,7 @@
         </p:nvSpPr>
         <p:spPr>
           <a:xfrm>
-            <a:off x="5823624" y="1518106"/>
+            <a:off x="5814919" y="1718853"/>
             <a:ext cx="6186791" cy="1077218"/>
           </a:xfrm>
           <a:prstGeom prst="rect">
@@ -3434,8 +3443,8 @@
         </p:nvCxnSpPr>
         <p:spPr>
           <a:xfrm>
-            <a:off x="5201057" y="813881"/>
-            <a:ext cx="622568" cy="103902"/>
+            <a:off x="5214027" y="845431"/>
+            <a:ext cx="622568" cy="227012"/>
           </a:xfrm>
           <a:prstGeom prst="bentConnector3">
             <a:avLst/>
@@ -3518,14 +3527,15 @@
         <p:nvCxnSpPr>
           <p:cNvPr id="35" name="Elbow Connector 34"/>
           <p:cNvCxnSpPr>
+            <a:stCxn id="33" idx="3"/>
             <a:endCxn id="21" idx="1"/>
           </p:cNvCxnSpPr>
           <p:nvPr/>
         </p:nvCxnSpPr>
         <p:spPr>
           <a:xfrm>
-            <a:off x="5155660" y="1913108"/>
-            <a:ext cx="667964" cy="143607"/>
+            <a:off x="5136204" y="1919592"/>
+            <a:ext cx="678715" cy="337870"/>
           </a:xfrm>
           <a:prstGeom prst="bentConnector3">
             <a:avLst/>
@@ -3854,7 +3864,7 @@
         <p:spPr>
           <a:xfrm>
             <a:off x="5823623" y="3657471"/>
-            <a:ext cx="6186791" cy="1815882"/>
+            <a:ext cx="6186791" cy="1569660"/>
           </a:xfrm>
           <a:prstGeom prst="rect">
             <a:avLst/>
@@ -3885,15 +3895,11 @@
             </a:pPr>
             <a:r>
               <a:rPr lang="en-US" sz="1600" dirty="0" smtClean="0"/>
-              <a:t>The “Delete” property is an </a:t>
+              <a:t>The “Delete” property is an event handler that will be called when the item is clicked. The purpose is to delete a task when it is click</a:t>
             </a:r>
             <a:r>
               <a:rPr lang="en-US" sz="1600" dirty="0" smtClean="0"/>
-              <a:t>event </a:t>
-            </a:r>
-            <a:r>
-              <a:rPr lang="en-US" sz="1600" dirty="0" smtClean="0"/>
-              <a:t>handler that will be called when the item is clicked. The purpose is to delete a task when it is click. This will be taken care of in the container component (</a:t>
+              <a:t>. (</a:t>
             </a:r>
             <a:r>
               <a:rPr lang="en-US" sz="1600" dirty="0" err="1" smtClean="0"/>
@@ -3949,7 +3955,7 @@
         <p:spPr>
           <a:xfrm>
             <a:off x="5038931" y="4267766"/>
-            <a:ext cx="784692" cy="297646"/>
+            <a:ext cx="784692" cy="174535"/>
           </a:xfrm>
           <a:prstGeom prst="bentConnector3">
             <a:avLst/>
@@ -4147,6 +4153,13 @@
   <p:clrMapOvr>
     <a:masterClrMapping/>
   </p:clrMapOvr>
+  <p:timing>
+    <p:tnLst>
+      <p:par>
+        <p:cTn id="1" dur="indefinite" restart="never" nodeType="tmRoot"/>
+      </p:par>
+    </p:tnLst>
+  </p:timing>
 </p:sld>
 </file>
 
@@ -4167,24 +4180,137 @@
           <a:chExt cx="0" cy="0"/>
         </a:xfrm>
       </p:grpSpPr>
-      <p:sp>
-        <p:nvSpPr>
-          <p:cNvPr id="2" name="Title 1"/>
+      <p:pic>
+        <p:nvPicPr>
+          <p:cNvPr id="4" name="Picture 3"/>
+          <p:cNvPicPr>
+            <a:picLocks noChangeAspect="1"/>
+          </p:cNvPicPr>
+          <p:nvPr/>
+        </p:nvPicPr>
+        <p:blipFill>
+          <a:blip r:embed="rId2">
+            <a:extLst>
+              <a:ext uri="{28A0092B-C50C-407E-A947-70E740481C1C}">
+                <a14:useLocalDpi xmlns:a14="http://schemas.microsoft.com/office/drawing/2010/main" val="0"/>
+              </a:ext>
+            </a:extLst>
+          </a:blip>
+          <a:stretch>
+            <a:fillRect/>
+          </a:stretch>
+        </p:blipFill>
+        <p:spPr>
+          <a:xfrm>
+            <a:off x="833947" y="1199570"/>
+            <a:ext cx="4441942" cy="5328852"/>
+          </a:xfrm>
+          <a:prstGeom prst="rect">
+            <a:avLst/>
+          </a:prstGeom>
+        </p:spPr>
+      </p:pic>
+      <p:sp>
+        <p:nvSpPr>
+          <p:cNvPr id="5" name="Title 4"/>
           <p:cNvSpPr>
             <a:spLocks noGrp="1"/>
           </p:cNvSpPr>
           <p:nvPr>
-            <p:ph type="title"/>
-          </p:nvPr>
-        </p:nvSpPr>
-        <p:spPr/>
-        <p:txBody>
-          <a:bodyPr/>
+            <p:ph type="ctrTitle"/>
+          </p:nvPr>
+        </p:nvSpPr>
+        <p:spPr>
+          <a:xfrm>
+            <a:off x="846473" y="344792"/>
+            <a:ext cx="10432150" cy="733898"/>
+          </a:xfrm>
+        </p:spPr>
+        <p:txBody>
+          <a:bodyPr>
+            <a:normAutofit/>
+          </a:bodyPr>
+          <a:lstStyle/>
+          <a:p>
+            <a:r>
+              <a:rPr lang="en-US" sz="4000" dirty="0" smtClean="0"/>
+              <a:t>How Components Relates: A Visual Guide</a:t>
+            </a:r>
+            <a:endParaRPr lang="en-US" sz="4000" dirty="0"/>
+          </a:p>
+        </p:txBody>
+      </p:sp>
+      <p:sp>
+        <p:nvSpPr>
+          <p:cNvPr id="3" name="Rectangle 2"/>
+          <p:cNvSpPr/>
+          <p:nvPr/>
+        </p:nvSpPr>
+        <p:spPr>
+          <a:xfrm>
+            <a:off x="977030" y="1327758"/>
+            <a:ext cx="4146115" cy="4885151"/>
+          </a:xfrm>
+          <a:prstGeom prst="rect">
+            <a:avLst/>
+          </a:prstGeom>
+          <a:noFill/>
+        </p:spPr>
+        <p:style>
+          <a:lnRef idx="2">
+            <a:schemeClr val="accent1">
+              <a:shade val="50000"/>
+            </a:schemeClr>
+          </a:lnRef>
+          <a:fillRef idx="1">
+            <a:schemeClr val="accent1"/>
+          </a:fillRef>
+          <a:effectRef idx="0">
+            <a:schemeClr val="accent1"/>
+          </a:effectRef>
+          <a:fontRef idx="minor">
+            <a:schemeClr val="lt1"/>
+          </a:fontRef>
+        </p:style>
+        <p:txBody>
+          <a:bodyPr rtlCol="0" anchor="ctr"/>
+          <a:lstStyle/>
+          <a:p>
+            <a:pPr algn="ctr"/>
+            <a:endParaRPr lang="en-US"/>
+          </a:p>
+        </p:txBody>
+      </p:sp>
+      <p:sp>
+        <p:nvSpPr>
+          <p:cNvPr id="6" name="TextBox 5"/>
+          <p:cNvSpPr txBox="1"/>
+          <p:nvPr/>
+        </p:nvSpPr>
+        <p:spPr>
+          <a:xfrm>
+            <a:off x="5642040" y="1835019"/>
+            <a:ext cx="3043825" cy="369332"/>
+          </a:xfrm>
+          <a:prstGeom prst="rect">
+            <a:avLst/>
+          </a:prstGeom>
+          <a:solidFill>
+            <a:schemeClr val="accent1">
+              <a:lumMod val="40000"/>
+              <a:lumOff val="60000"/>
+            </a:schemeClr>
+          </a:solidFill>
+        </p:spPr>
+        <p:txBody>
+          <a:bodyPr wrap="square" rtlCol="0">
+            <a:spAutoFit/>
+          </a:bodyPr>
           <a:lstStyle/>
           <a:p>
             <a:r>
               <a:rPr lang="en-US" dirty="0" smtClean="0"/>
-              <a:t>Initializing my To-Do app (MDN, 2020b).</a:t>
+              <a:t>1. Main Container Component</a:t>
             </a:r>
             <a:endParaRPr lang="en-US" dirty="0"/>
           </a:p>
@@ -4192,236 +4318,1449 @@
       </p:sp>
       <p:sp>
         <p:nvSpPr>
-          <p:cNvPr id="3" name="Content Placeholder 2"/>
-          <p:cNvSpPr>
-            <a:spLocks noGrp="1"/>
-          </p:cNvSpPr>
-          <p:nvPr>
-            <p:ph idx="1"/>
-          </p:nvPr>
-        </p:nvSpPr>
-        <p:spPr/>
-        <p:txBody>
-          <a:bodyPr/>
-          <a:lstStyle/>
-          <a:p>
-            <a:pPr marL="514350" indent="-514350">
-              <a:buAutoNum type="arabicPeriod"/>
-            </a:pPr>
-            <a:r>
-              <a:rPr lang="en-US" sz="2000" dirty="0" smtClean="0"/>
-              <a:t>Install </a:t>
-            </a:r>
-            <a:r>
-              <a:rPr lang="en-US" sz="2000" dirty="0" err="1" smtClean="0"/>
-              <a:t>npm</a:t>
-            </a:r>
-            <a:r>
-              <a:rPr lang="en-US" sz="2000" dirty="0" smtClean="0"/>
-              <a:t> packages such as </a:t>
-            </a:r>
-            <a:r>
-              <a:rPr lang="en-US" sz="2000" dirty="0" err="1" smtClean="0">
-                <a:latin typeface="Courier New" panose="02070309020205020404" pitchFamily="49" charset="0"/>
-                <a:cs typeface="Courier New" panose="02070309020205020404" pitchFamily="49" charset="0"/>
-              </a:rPr>
-              <a:t>npx</a:t>
-            </a:r>
-            <a:r>
-              <a:rPr lang="en-US" sz="2000" dirty="0" smtClean="0">
-                <a:latin typeface="Courier New" panose="02070309020205020404" pitchFamily="49" charset="0"/>
-                <a:cs typeface="Courier New" panose="02070309020205020404" pitchFamily="49" charset="0"/>
-              </a:rPr>
-              <a:t> create-react-app </a:t>
-            </a:r>
-            <a:r>
-              <a:rPr lang="en-US" sz="2000" dirty="0" err="1" smtClean="0">
-                <a:latin typeface="Courier New" panose="02070309020205020404" pitchFamily="49" charset="0"/>
-                <a:cs typeface="Courier New" panose="02070309020205020404" pitchFamily="49" charset="0"/>
-              </a:rPr>
-              <a:t>moz</a:t>
-            </a:r>
-            <a:r>
-              <a:rPr lang="en-US" sz="2000" dirty="0" smtClean="0">
-                <a:latin typeface="Courier New" panose="02070309020205020404" pitchFamily="49" charset="0"/>
-                <a:cs typeface="Courier New" panose="02070309020205020404" pitchFamily="49" charset="0"/>
-              </a:rPr>
-              <a:t>-</a:t>
-            </a:r>
-            <a:r>
-              <a:rPr lang="en-US" sz="2000" dirty="0" err="1" smtClean="0">
-                <a:latin typeface="Courier New" panose="02070309020205020404" pitchFamily="49" charset="0"/>
-                <a:cs typeface="Courier New" panose="02070309020205020404" pitchFamily="49" charset="0"/>
-              </a:rPr>
-              <a:t>todo</a:t>
-            </a:r>
-            <a:r>
-              <a:rPr lang="en-US" sz="2000" dirty="0" smtClean="0">
-                <a:latin typeface="Courier New" panose="02070309020205020404" pitchFamily="49" charset="0"/>
-                <a:cs typeface="Courier New" panose="02070309020205020404" pitchFamily="49" charset="0"/>
-              </a:rPr>
-              <a:t>-react</a:t>
-            </a:r>
-            <a:r>
-              <a:rPr lang="en-US" sz="2000" dirty="0" smtClean="0"/>
-              <a:t>.</a:t>
-            </a:r>
-          </a:p>
-          <a:p>
-            <a:pPr marL="514350" indent="-514350">
-              <a:buAutoNum type="arabicPeriod"/>
-            </a:pPr>
-            <a:r>
-              <a:rPr lang="en-US" sz="2000" dirty="0" smtClean="0"/>
-              <a:t>Initialize </a:t>
-            </a:r>
-            <a:r>
-              <a:rPr lang="en-US" sz="2000" dirty="0" err="1" smtClean="0">
-                <a:latin typeface="Courier New" panose="02070309020205020404" pitchFamily="49" charset="0"/>
-                <a:cs typeface="Courier New" panose="02070309020205020404" pitchFamily="49" charset="0"/>
-              </a:rPr>
-              <a:t>npm</a:t>
-            </a:r>
-            <a:r>
-              <a:rPr lang="en-US" sz="2000" dirty="0" smtClean="0">
-                <a:latin typeface="Courier New" panose="02070309020205020404" pitchFamily="49" charset="0"/>
-                <a:cs typeface="Courier New" panose="02070309020205020404" pitchFamily="49" charset="0"/>
-              </a:rPr>
-              <a:t> start</a:t>
-            </a:r>
-            <a:r>
-              <a:rPr lang="en-US" sz="2000" dirty="0" smtClean="0">
-                <a:latin typeface="Courier New" panose="02070309020205020404" pitchFamily="49" charset="0"/>
-                <a:cs typeface="Courier New" panose="02070309020205020404" pitchFamily="49" charset="0"/>
-              </a:rPr>
-              <a:t>.</a:t>
-            </a:r>
-          </a:p>
-          <a:p>
-            <a:pPr marL="514350" indent="-514350">
-              <a:buAutoNum type="arabicPeriod"/>
-            </a:pPr>
-            <a:r>
-              <a:rPr lang="en-US" sz="2000" dirty="0" smtClean="0">
-                <a:cs typeface="Courier New" panose="02070309020205020404" pitchFamily="49" charset="0"/>
-              </a:rPr>
-              <a:t>Review app.js and understand </a:t>
-            </a:r>
-            <a:r>
-              <a:rPr lang="en-US" sz="2000" dirty="0" smtClean="0">
-                <a:latin typeface="Courier New" panose="02070309020205020404" pitchFamily="49" charset="0"/>
-                <a:cs typeface="Courier New" panose="02070309020205020404" pitchFamily="49" charset="0"/>
-              </a:rPr>
-              <a:t>import</a:t>
-            </a:r>
-            <a:r>
-              <a:rPr lang="en-US" sz="2000" dirty="0" smtClean="0">
-                <a:cs typeface="Courier New" panose="02070309020205020404" pitchFamily="49" charset="0"/>
-              </a:rPr>
-              <a:t> statements, app component in the middle, </a:t>
-            </a:r>
-            <a:r>
-              <a:rPr lang="en-US" sz="2000" dirty="0" smtClean="0">
-                <a:latin typeface="Courier New" panose="02070309020205020404" pitchFamily="49" charset="0"/>
-                <a:cs typeface="Courier New" panose="02070309020205020404" pitchFamily="49" charset="0"/>
-              </a:rPr>
-              <a:t>export</a:t>
-            </a:r>
-            <a:r>
-              <a:rPr lang="en-US" sz="2000" dirty="0" smtClean="0">
-                <a:cs typeface="Courier New" panose="02070309020205020404" pitchFamily="49" charset="0"/>
-              </a:rPr>
-              <a:t> statement at the bottom. </a:t>
-            </a:r>
-          </a:p>
-          <a:p>
-            <a:pPr marL="514350" indent="-514350">
-              <a:buAutoNum type="arabicPeriod"/>
-            </a:pPr>
-            <a:r>
-              <a:rPr lang="en-US" sz="2000" dirty="0" smtClean="0">
-                <a:cs typeface="Courier New" panose="02070309020205020404" pitchFamily="49" charset="0"/>
-              </a:rPr>
-              <a:t>Pre-project house keeping. Since we are not doing any styling (assume we have a design department</a:t>
-            </a:r>
-            <a:r>
-              <a:rPr lang="en-US" sz="2000" dirty="0">
-                <a:cs typeface="Courier New" panose="02070309020205020404" pitchFamily="49" charset="0"/>
-              </a:rPr>
-              <a:t>), </a:t>
-            </a:r>
-            <a:r>
-              <a:rPr lang="en-US" sz="2000" dirty="0">
-                <a:latin typeface="Courier New" panose="02070309020205020404" pitchFamily="49" charset="0"/>
-                <a:cs typeface="Courier New" panose="02070309020205020404" pitchFamily="49" charset="0"/>
-              </a:rPr>
-              <a:t>App.test.js App.css </a:t>
-            </a:r>
-            <a:r>
-              <a:rPr lang="en-US" sz="2000" dirty="0" err="1">
-                <a:latin typeface="Courier New" panose="02070309020205020404" pitchFamily="49" charset="0"/>
-                <a:cs typeface="Courier New" panose="02070309020205020404" pitchFamily="49" charset="0"/>
-              </a:rPr>
-              <a:t>logo.svg</a:t>
-            </a:r>
-            <a:r>
-              <a:rPr lang="en-US" sz="2000" dirty="0">
-                <a:latin typeface="Courier New" panose="02070309020205020404" pitchFamily="49" charset="0"/>
-                <a:cs typeface="Courier New" panose="02070309020205020404" pitchFamily="49" charset="0"/>
-              </a:rPr>
-              <a:t> serviceWorker.js </a:t>
-            </a:r>
-            <a:r>
-              <a:rPr lang="en-US" sz="2000" dirty="0" smtClean="0">
-                <a:latin typeface="Courier New" panose="02070309020205020404" pitchFamily="49" charset="0"/>
-                <a:cs typeface="Courier New" panose="02070309020205020404" pitchFamily="49" charset="0"/>
-              </a:rPr>
-              <a:t>setupTests.js</a:t>
-            </a:r>
-            <a:r>
-              <a:rPr lang="en-US" sz="2000" dirty="0" smtClean="0">
-                <a:cs typeface="Courier New" panose="02070309020205020404" pitchFamily="49" charset="0"/>
-              </a:rPr>
-              <a:t>. Additionally, we also removed the unrelated links to styles sheet and script sheet.</a:t>
-            </a:r>
-          </a:p>
-          <a:p>
-            <a:pPr marL="514350" indent="-514350">
-              <a:buAutoNum type="arabicPeriod"/>
-            </a:pPr>
-            <a:endParaRPr lang="en-US" sz="2000" dirty="0" smtClean="0">
-              <a:cs typeface="Courier New" panose="02070309020205020404" pitchFamily="49" charset="0"/>
-            </a:endParaRPr>
-          </a:p>
-          <a:p>
-            <a:pPr marL="514350" indent="-514350">
-              <a:buAutoNum type="arabicPeriod"/>
-            </a:pPr>
-            <a:endParaRPr lang="en-US" sz="2000" dirty="0" smtClean="0">
-              <a:cs typeface="Courier New" panose="02070309020205020404" pitchFamily="49" charset="0"/>
-            </a:endParaRPr>
-          </a:p>
-          <a:p>
-            <a:pPr marL="514350" indent="-514350">
-              <a:buAutoNum type="arabicPeriod"/>
-            </a:pPr>
-            <a:endParaRPr lang="en-US" sz="2000" dirty="0">
-              <a:latin typeface="Courier New" panose="02070309020205020404" pitchFamily="49" charset="0"/>
-              <a:cs typeface="Courier New" panose="02070309020205020404" pitchFamily="49" charset="0"/>
-            </a:endParaRPr>
-          </a:p>
-          <a:p>
-            <a:pPr marL="514350" indent="-514350">
-              <a:buAutoNum type="arabicPeriod"/>
-            </a:pPr>
-            <a:endParaRPr lang="en-US" sz="2000" dirty="0" smtClean="0"/>
-          </a:p>
-        </p:txBody>
-      </p:sp>
+          <p:cNvPr id="8" name="TextBox 7"/>
+          <p:cNvSpPr txBox="1"/>
+          <p:nvPr/>
+        </p:nvSpPr>
+        <p:spPr>
+          <a:xfrm>
+            <a:off x="5642040" y="2420633"/>
+            <a:ext cx="2575034" cy="646331"/>
+          </a:xfrm>
+          <a:prstGeom prst="rect">
+            <a:avLst/>
+          </a:prstGeom>
+          <a:solidFill>
+            <a:schemeClr val="bg1">
+              <a:lumMod val="85000"/>
+            </a:schemeClr>
+          </a:solidFill>
+        </p:spPr>
+        <p:txBody>
+          <a:bodyPr wrap="square" rtlCol="0">
+            <a:spAutoFit/>
+          </a:bodyPr>
+          <a:lstStyle/>
+          <a:p>
+            <a:r>
+              <a:rPr lang="en-US" dirty="0" smtClean="0"/>
+              <a:t>User input task, followed by clicking add task. </a:t>
+            </a:r>
+            <a:endParaRPr lang="en-US" dirty="0"/>
+          </a:p>
+        </p:txBody>
+      </p:sp>
+      <p:sp>
+        <p:nvSpPr>
+          <p:cNvPr id="11" name="TextBox 10"/>
+          <p:cNvSpPr txBox="1"/>
+          <p:nvPr/>
+        </p:nvSpPr>
+        <p:spPr>
+          <a:xfrm>
+            <a:off x="9449953" y="1185351"/>
+            <a:ext cx="2309587" cy="378709"/>
+          </a:xfrm>
+          <a:prstGeom prst="rect">
+            <a:avLst/>
+          </a:prstGeom>
+          <a:solidFill>
+            <a:schemeClr val="bg1">
+              <a:lumMod val="85000"/>
+            </a:schemeClr>
+          </a:solidFill>
+        </p:spPr>
+        <p:txBody>
+          <a:bodyPr wrap="square" rtlCol="0">
+            <a:spAutoFit/>
+          </a:bodyPr>
+          <a:lstStyle/>
+          <a:p>
+            <a:r>
+              <a:rPr lang="en-US" dirty="0" smtClean="0"/>
+              <a:t>User accessed the app</a:t>
+            </a:r>
+            <a:endParaRPr lang="en-US" dirty="0"/>
+          </a:p>
+        </p:txBody>
+      </p:sp>
+      <p:sp>
+        <p:nvSpPr>
+          <p:cNvPr id="14" name="TextBox 13"/>
+          <p:cNvSpPr txBox="1"/>
+          <p:nvPr/>
+        </p:nvSpPr>
+        <p:spPr>
+          <a:xfrm>
+            <a:off x="10314119" y="1853764"/>
+            <a:ext cx="951978" cy="369332"/>
+          </a:xfrm>
+          <a:prstGeom prst="rect">
+            <a:avLst/>
+          </a:prstGeom>
+          <a:solidFill>
+            <a:schemeClr val="bg1">
+              <a:lumMod val="85000"/>
+            </a:schemeClr>
+          </a:solidFill>
+          <a:ln>
+            <a:noFill/>
+          </a:ln>
+        </p:spPr>
+        <p:txBody>
+          <a:bodyPr wrap="square" rtlCol="0">
+            <a:spAutoFit/>
+          </a:bodyPr>
+          <a:lstStyle/>
+          <a:p>
+            <a:r>
+              <a:rPr lang="en-US" dirty="0" smtClean="0"/>
+              <a:t>loaded</a:t>
+            </a:r>
+            <a:endParaRPr lang="en-US" dirty="0"/>
+          </a:p>
+        </p:txBody>
+      </p:sp>
+      <p:cxnSp>
+        <p:nvCxnSpPr>
+          <p:cNvPr id="16" name="Straight Connector 15"/>
+          <p:cNvCxnSpPr>
+            <a:stCxn id="11" idx="2"/>
+          </p:cNvCxnSpPr>
+          <p:nvPr/>
+        </p:nvCxnSpPr>
+        <p:spPr>
+          <a:xfrm flipH="1">
+            <a:off x="10604746" y="1564060"/>
+            <a:ext cx="1" cy="270959"/>
+          </a:xfrm>
+          <a:prstGeom prst="line">
+            <a:avLst/>
+          </a:prstGeom>
+          <a:ln>
+            <a:solidFill>
+              <a:schemeClr val="tx1"/>
+            </a:solidFill>
+          </a:ln>
+        </p:spPr>
+        <p:style>
+          <a:lnRef idx="1">
+            <a:schemeClr val="accent1"/>
+          </a:lnRef>
+          <a:fillRef idx="0">
+            <a:schemeClr val="accent1"/>
+          </a:fillRef>
+          <a:effectRef idx="0">
+            <a:schemeClr val="accent1"/>
+          </a:effectRef>
+          <a:fontRef idx="minor">
+            <a:schemeClr val="tx1"/>
+          </a:fontRef>
+        </p:style>
+      </p:cxnSp>
+      <p:cxnSp>
+        <p:nvCxnSpPr>
+          <p:cNvPr id="18" name="Straight Arrow Connector 17"/>
+          <p:cNvCxnSpPr>
+            <a:stCxn id="14" idx="1"/>
+            <a:endCxn id="6" idx="3"/>
+          </p:cNvCxnSpPr>
+          <p:nvPr/>
+        </p:nvCxnSpPr>
+        <p:spPr>
+          <a:xfrm flipH="1" flipV="1">
+            <a:off x="8685865" y="2019685"/>
+            <a:ext cx="1628254" cy="18745"/>
+          </a:xfrm>
+          <a:prstGeom prst="straightConnector1">
+            <a:avLst/>
+          </a:prstGeom>
+          <a:ln>
+            <a:solidFill>
+              <a:schemeClr val="tx1"/>
+            </a:solidFill>
+            <a:tailEnd type="triangle"/>
+          </a:ln>
+        </p:spPr>
+        <p:style>
+          <a:lnRef idx="1">
+            <a:schemeClr val="accent1"/>
+          </a:lnRef>
+          <a:fillRef idx="0">
+            <a:schemeClr val="accent1"/>
+          </a:fillRef>
+          <a:effectRef idx="0">
+            <a:schemeClr val="accent1"/>
+          </a:effectRef>
+          <a:fontRef idx="minor">
+            <a:schemeClr val="tx1"/>
+          </a:fontRef>
+        </p:style>
+      </p:cxnSp>
+      <p:cxnSp>
+        <p:nvCxnSpPr>
+          <p:cNvPr id="20" name="Elbow Connector 19"/>
+          <p:cNvCxnSpPr/>
+          <p:nvPr/>
+        </p:nvCxnSpPr>
+        <p:spPr>
+          <a:xfrm rot="10800000">
+            <a:off x="5134487" y="1699539"/>
+            <a:ext cx="507555" cy="320146"/>
+          </a:xfrm>
+          <a:prstGeom prst="bentConnector3">
+            <a:avLst/>
+          </a:prstGeom>
+          <a:ln>
+            <a:solidFill>
+              <a:schemeClr val="tx1"/>
+            </a:solidFill>
+            <a:tailEnd type="triangle"/>
+          </a:ln>
+        </p:spPr>
+        <p:style>
+          <a:lnRef idx="1">
+            <a:schemeClr val="accent1"/>
+          </a:lnRef>
+          <a:fillRef idx="0">
+            <a:schemeClr val="accent1"/>
+          </a:fillRef>
+          <a:effectRef idx="0">
+            <a:schemeClr val="accent1"/>
+          </a:effectRef>
+          <a:fontRef idx="minor">
+            <a:schemeClr val="tx1"/>
+          </a:fontRef>
+        </p:style>
+      </p:cxnSp>
+      <p:sp>
+        <p:nvSpPr>
+          <p:cNvPr id="24" name="Rectangle 23"/>
+          <p:cNvSpPr/>
+          <p:nvPr/>
+        </p:nvSpPr>
+        <p:spPr>
+          <a:xfrm>
+            <a:off x="1089764" y="1835019"/>
+            <a:ext cx="3920647" cy="1171228"/>
+          </a:xfrm>
+          <a:prstGeom prst="rect">
+            <a:avLst/>
+          </a:prstGeom>
+          <a:noFill/>
+          <a:ln>
+            <a:solidFill>
+              <a:schemeClr val="accent1">
+                <a:lumMod val="75000"/>
+              </a:schemeClr>
+            </a:solidFill>
+          </a:ln>
+        </p:spPr>
+        <p:style>
+          <a:lnRef idx="2">
+            <a:schemeClr val="accent1">
+              <a:shade val="50000"/>
+            </a:schemeClr>
+          </a:lnRef>
+          <a:fillRef idx="1">
+            <a:schemeClr val="accent1"/>
+          </a:fillRef>
+          <a:effectRef idx="0">
+            <a:schemeClr val="accent1"/>
+          </a:effectRef>
+          <a:fontRef idx="minor">
+            <a:schemeClr val="lt1"/>
+          </a:fontRef>
+        </p:style>
+        <p:txBody>
+          <a:bodyPr rtlCol="0" anchor="ctr"/>
+          <a:lstStyle/>
+          <a:p>
+            <a:pPr algn="ctr"/>
+            <a:endParaRPr lang="en-US"/>
+          </a:p>
+        </p:txBody>
+      </p:sp>
+      <p:cxnSp>
+        <p:nvCxnSpPr>
+          <p:cNvPr id="26" name="Elbow Connector 25"/>
+          <p:cNvCxnSpPr>
+            <a:stCxn id="24" idx="3"/>
+            <a:endCxn id="8" idx="1"/>
+          </p:cNvCxnSpPr>
+          <p:nvPr/>
+        </p:nvCxnSpPr>
+        <p:spPr>
+          <a:xfrm>
+            <a:off x="5010411" y="2420633"/>
+            <a:ext cx="631629" cy="323166"/>
+          </a:xfrm>
+          <a:prstGeom prst="bentConnector3">
+            <a:avLst/>
+          </a:prstGeom>
+          <a:ln>
+            <a:solidFill>
+              <a:schemeClr val="tx1"/>
+            </a:solidFill>
+            <a:tailEnd type="triangle"/>
+          </a:ln>
+        </p:spPr>
+        <p:style>
+          <a:lnRef idx="1">
+            <a:schemeClr val="accent1"/>
+          </a:lnRef>
+          <a:fillRef idx="0">
+            <a:schemeClr val="accent1"/>
+          </a:fillRef>
+          <a:effectRef idx="0">
+            <a:schemeClr val="accent1"/>
+          </a:effectRef>
+          <a:fontRef idx="minor">
+            <a:schemeClr val="tx1"/>
+          </a:fontRef>
+        </p:style>
+      </p:cxnSp>
+      <p:sp>
+        <p:nvSpPr>
+          <p:cNvPr id="27" name="TextBox 26"/>
+          <p:cNvSpPr txBox="1"/>
+          <p:nvPr/>
+        </p:nvSpPr>
+        <p:spPr>
+          <a:xfrm>
+            <a:off x="10226255" y="2420633"/>
+            <a:ext cx="1533285" cy="646331"/>
+          </a:xfrm>
+          <a:prstGeom prst="rect">
+            <a:avLst/>
+          </a:prstGeom>
+          <a:solidFill>
+            <a:schemeClr val="accent1">
+              <a:lumMod val="40000"/>
+              <a:lumOff val="60000"/>
+            </a:schemeClr>
+          </a:solidFill>
+        </p:spPr>
+        <p:txBody>
+          <a:bodyPr wrap="square" rtlCol="0">
+            <a:spAutoFit/>
+          </a:bodyPr>
+          <a:lstStyle/>
+          <a:p>
+            <a:r>
+              <a:rPr lang="en-US" dirty="0"/>
+              <a:t>2</a:t>
+            </a:r>
+            <a:r>
+              <a:rPr lang="en-US" dirty="0" smtClean="0"/>
+              <a:t>. Input Form Component</a:t>
+            </a:r>
+            <a:endParaRPr lang="en-US" dirty="0"/>
+          </a:p>
+        </p:txBody>
+      </p:sp>
+      <p:sp>
+        <p:nvSpPr>
+          <p:cNvPr id="28" name="TextBox 27"/>
+          <p:cNvSpPr txBox="1"/>
+          <p:nvPr/>
+        </p:nvSpPr>
+        <p:spPr>
+          <a:xfrm>
+            <a:off x="8583225" y="2420633"/>
+            <a:ext cx="1147066" cy="646331"/>
+          </a:xfrm>
+          <a:prstGeom prst="rect">
+            <a:avLst/>
+          </a:prstGeom>
+          <a:solidFill>
+            <a:schemeClr val="bg1">
+              <a:lumMod val="85000"/>
+            </a:schemeClr>
+          </a:solidFill>
+          <a:ln>
+            <a:noFill/>
+          </a:ln>
+        </p:spPr>
+        <p:txBody>
+          <a:bodyPr wrap="square" rtlCol="0">
+            <a:spAutoFit/>
+          </a:bodyPr>
+          <a:lstStyle/>
+          <a:p>
+            <a:r>
+              <a:rPr lang="en-US" dirty="0" smtClean="0"/>
+              <a:t>User data accepted</a:t>
+            </a:r>
+            <a:endParaRPr lang="en-US" dirty="0"/>
+          </a:p>
+        </p:txBody>
+      </p:sp>
+      <p:cxnSp>
+        <p:nvCxnSpPr>
+          <p:cNvPr id="30" name="Straight Connector 29"/>
+          <p:cNvCxnSpPr>
+            <a:stCxn id="8" idx="3"/>
+            <a:endCxn id="28" idx="1"/>
+          </p:cNvCxnSpPr>
+          <p:nvPr/>
+        </p:nvCxnSpPr>
+        <p:spPr>
+          <a:xfrm>
+            <a:off x="8217074" y="2743799"/>
+            <a:ext cx="366151" cy="0"/>
+          </a:xfrm>
+          <a:prstGeom prst="line">
+            <a:avLst/>
+          </a:prstGeom>
+          <a:ln>
+            <a:solidFill>
+              <a:schemeClr val="tx1"/>
+            </a:solidFill>
+          </a:ln>
+        </p:spPr>
+        <p:style>
+          <a:lnRef idx="1">
+            <a:schemeClr val="accent1"/>
+          </a:lnRef>
+          <a:fillRef idx="0">
+            <a:schemeClr val="accent1"/>
+          </a:fillRef>
+          <a:effectRef idx="0">
+            <a:schemeClr val="accent1"/>
+          </a:effectRef>
+          <a:fontRef idx="minor">
+            <a:schemeClr val="tx1"/>
+          </a:fontRef>
+        </p:style>
+      </p:cxnSp>
+      <p:cxnSp>
+        <p:nvCxnSpPr>
+          <p:cNvPr id="32" name="Straight Arrow Connector 31"/>
+          <p:cNvCxnSpPr>
+            <a:stCxn id="28" idx="3"/>
+            <a:endCxn id="27" idx="1"/>
+          </p:cNvCxnSpPr>
+          <p:nvPr/>
+        </p:nvCxnSpPr>
+        <p:spPr>
+          <a:xfrm>
+            <a:off x="9730291" y="2743799"/>
+            <a:ext cx="495964" cy="0"/>
+          </a:xfrm>
+          <a:prstGeom prst="straightConnector1">
+            <a:avLst/>
+          </a:prstGeom>
+          <a:ln>
+            <a:solidFill>
+              <a:schemeClr val="tx1"/>
+            </a:solidFill>
+            <a:tailEnd type="triangle"/>
+          </a:ln>
+        </p:spPr>
+        <p:style>
+          <a:lnRef idx="1">
+            <a:schemeClr val="accent1"/>
+          </a:lnRef>
+          <a:fillRef idx="0">
+            <a:schemeClr val="accent1"/>
+          </a:fillRef>
+          <a:effectRef idx="0">
+            <a:schemeClr val="accent1"/>
+          </a:effectRef>
+          <a:fontRef idx="minor">
+            <a:schemeClr val="tx1"/>
+          </a:fontRef>
+        </p:style>
+      </p:cxnSp>
+      <p:sp>
+        <p:nvSpPr>
+          <p:cNvPr id="34" name="Rectangle 33"/>
+          <p:cNvSpPr/>
+          <p:nvPr/>
+        </p:nvSpPr>
+        <p:spPr>
+          <a:xfrm>
+            <a:off x="1089764" y="3134435"/>
+            <a:ext cx="3920647" cy="1875976"/>
+          </a:xfrm>
+          <a:prstGeom prst="rect">
+            <a:avLst/>
+          </a:prstGeom>
+          <a:noFill/>
+          <a:ln>
+            <a:solidFill>
+              <a:schemeClr val="accent1">
+                <a:lumMod val="75000"/>
+              </a:schemeClr>
+            </a:solidFill>
+          </a:ln>
+        </p:spPr>
+        <p:style>
+          <a:lnRef idx="2">
+            <a:schemeClr val="accent1">
+              <a:shade val="50000"/>
+            </a:schemeClr>
+          </a:lnRef>
+          <a:fillRef idx="1">
+            <a:schemeClr val="accent1"/>
+          </a:fillRef>
+          <a:effectRef idx="0">
+            <a:schemeClr val="accent1"/>
+          </a:effectRef>
+          <a:fontRef idx="minor">
+            <a:schemeClr val="lt1"/>
+          </a:fontRef>
+        </p:style>
+        <p:txBody>
+          <a:bodyPr rtlCol="0" anchor="ctr"/>
+          <a:lstStyle/>
+          <a:p>
+            <a:pPr algn="ctr"/>
+            <a:endParaRPr lang="en-US"/>
+          </a:p>
+        </p:txBody>
+      </p:sp>
+      <p:sp>
+        <p:nvSpPr>
+          <p:cNvPr id="35" name="TextBox 34"/>
+          <p:cNvSpPr txBox="1"/>
+          <p:nvPr/>
+        </p:nvSpPr>
+        <p:spPr>
+          <a:xfrm>
+            <a:off x="9236791" y="4013988"/>
+            <a:ext cx="2131732" cy="369332"/>
+          </a:xfrm>
+          <a:prstGeom prst="rect">
+            <a:avLst/>
+          </a:prstGeom>
+          <a:solidFill>
+            <a:schemeClr val="accent1">
+              <a:lumMod val="40000"/>
+              <a:lumOff val="60000"/>
+            </a:schemeClr>
+          </a:solidFill>
+          <a:ln>
+            <a:noFill/>
+          </a:ln>
+        </p:spPr>
+        <p:txBody>
+          <a:bodyPr wrap="square" rtlCol="0">
+            <a:spAutoFit/>
+          </a:bodyPr>
+          <a:lstStyle/>
+          <a:p>
+            <a:r>
+              <a:rPr lang="en-US" dirty="0" smtClean="0"/>
+              <a:t>3. To-Do Component</a:t>
+            </a:r>
+            <a:endParaRPr lang="en-US" dirty="0"/>
+          </a:p>
+        </p:txBody>
+      </p:sp>
+      <p:sp>
+        <p:nvSpPr>
+          <p:cNvPr id="36" name="TextBox 35"/>
+          <p:cNvSpPr txBox="1"/>
+          <p:nvPr/>
+        </p:nvSpPr>
+        <p:spPr>
+          <a:xfrm>
+            <a:off x="9077771" y="3403001"/>
+            <a:ext cx="2547955" cy="369332"/>
+          </a:xfrm>
+          <a:prstGeom prst="rect">
+            <a:avLst/>
+          </a:prstGeom>
+          <a:solidFill>
+            <a:schemeClr val="bg1">
+              <a:lumMod val="85000"/>
+            </a:schemeClr>
+          </a:solidFill>
+        </p:spPr>
+        <p:txBody>
+          <a:bodyPr wrap="square" rtlCol="0">
+            <a:spAutoFit/>
+          </a:bodyPr>
+          <a:lstStyle/>
+          <a:p>
+            <a:r>
+              <a:rPr lang="en-US" dirty="0" smtClean="0"/>
+              <a:t>Rendered user input data</a:t>
+            </a:r>
+            <a:endParaRPr lang="en-US" dirty="0"/>
+          </a:p>
+        </p:txBody>
+      </p:sp>
+      <p:cxnSp>
+        <p:nvCxnSpPr>
+          <p:cNvPr id="42" name="Straight Connector 41"/>
+          <p:cNvCxnSpPr/>
+          <p:nvPr/>
+        </p:nvCxnSpPr>
+        <p:spPr>
+          <a:xfrm>
+            <a:off x="5956351" y="-2292263"/>
+            <a:ext cx="73840" cy="0"/>
+          </a:xfrm>
+          <a:prstGeom prst="line">
+            <a:avLst/>
+          </a:prstGeom>
+        </p:spPr>
+        <p:style>
+          <a:lnRef idx="1">
+            <a:schemeClr val="accent1"/>
+          </a:lnRef>
+          <a:fillRef idx="0">
+            <a:schemeClr val="accent1"/>
+          </a:fillRef>
+          <a:effectRef idx="0">
+            <a:schemeClr val="accent1"/>
+          </a:effectRef>
+          <a:fontRef idx="minor">
+            <a:schemeClr val="tx1"/>
+          </a:fontRef>
+        </p:style>
+      </p:cxnSp>
+      <p:cxnSp>
+        <p:nvCxnSpPr>
+          <p:cNvPr id="44" name="Elbow Connector 43"/>
+          <p:cNvCxnSpPr>
+            <a:stCxn id="27" idx="2"/>
+            <a:endCxn id="36" idx="0"/>
+          </p:cNvCxnSpPr>
+          <p:nvPr/>
+        </p:nvCxnSpPr>
+        <p:spPr>
+          <a:xfrm rot="5400000">
+            <a:off x="10504306" y="2914408"/>
+            <a:ext cx="336037" cy="641149"/>
+          </a:xfrm>
+          <a:prstGeom prst="bentConnector3">
+            <a:avLst>
+              <a:gd name="adj1" fmla="val 50000"/>
+            </a:avLst>
+          </a:prstGeom>
+          <a:ln>
+            <a:solidFill>
+              <a:schemeClr val="tx1"/>
+            </a:solidFill>
+          </a:ln>
+        </p:spPr>
+        <p:style>
+          <a:lnRef idx="1">
+            <a:schemeClr val="accent1"/>
+          </a:lnRef>
+          <a:fillRef idx="0">
+            <a:schemeClr val="accent1"/>
+          </a:fillRef>
+          <a:effectRef idx="0">
+            <a:schemeClr val="accent1"/>
+          </a:effectRef>
+          <a:fontRef idx="minor">
+            <a:schemeClr val="tx1"/>
+          </a:fontRef>
+        </p:style>
+      </p:cxnSp>
+      <p:sp>
+        <p:nvSpPr>
+          <p:cNvPr id="52" name="Rectangle 51"/>
+          <p:cNvSpPr/>
+          <p:nvPr/>
+        </p:nvSpPr>
+        <p:spPr>
+          <a:xfrm>
+            <a:off x="1121311" y="4434213"/>
+            <a:ext cx="3770335" cy="400834"/>
+          </a:xfrm>
+          <a:prstGeom prst="rect">
+            <a:avLst/>
+          </a:prstGeom>
+          <a:noFill/>
+          <a:ln>
+            <a:solidFill>
+              <a:schemeClr val="accent1">
+                <a:lumMod val="75000"/>
+              </a:schemeClr>
+            </a:solidFill>
+          </a:ln>
+        </p:spPr>
+        <p:style>
+          <a:lnRef idx="2">
+            <a:schemeClr val="accent1">
+              <a:shade val="50000"/>
+            </a:schemeClr>
+          </a:lnRef>
+          <a:fillRef idx="1">
+            <a:schemeClr val="accent1"/>
+          </a:fillRef>
+          <a:effectRef idx="0">
+            <a:schemeClr val="accent1"/>
+          </a:effectRef>
+          <a:fontRef idx="minor">
+            <a:schemeClr val="lt1"/>
+          </a:fontRef>
+        </p:style>
+        <p:txBody>
+          <a:bodyPr rtlCol="0" anchor="ctr"/>
+          <a:lstStyle/>
+          <a:p>
+            <a:pPr algn="ctr"/>
+            <a:endParaRPr lang="en-US"/>
+          </a:p>
+        </p:txBody>
+      </p:sp>
+      <p:sp>
+        <p:nvSpPr>
+          <p:cNvPr id="53" name="TextBox 52"/>
+          <p:cNvSpPr txBox="1"/>
+          <p:nvPr/>
+        </p:nvSpPr>
+        <p:spPr>
+          <a:xfrm>
+            <a:off x="5993271" y="3421747"/>
+            <a:ext cx="2589954" cy="369332"/>
+          </a:xfrm>
+          <a:prstGeom prst="rect">
+            <a:avLst/>
+          </a:prstGeom>
+          <a:solidFill>
+            <a:schemeClr val="accent1">
+              <a:lumMod val="40000"/>
+              <a:lumOff val="60000"/>
+            </a:schemeClr>
+          </a:solidFill>
+        </p:spPr>
+        <p:txBody>
+          <a:bodyPr wrap="square" rtlCol="0">
+            <a:spAutoFit/>
+          </a:bodyPr>
+          <a:lstStyle/>
+          <a:p>
+            <a:r>
+              <a:rPr lang="en-US" dirty="0" smtClean="0"/>
+              <a:t>4. To-Do List Component</a:t>
+            </a:r>
+            <a:endParaRPr lang="en-US" dirty="0"/>
+          </a:p>
+        </p:txBody>
+      </p:sp>
+      <p:sp>
+        <p:nvSpPr>
+          <p:cNvPr id="69" name="Rectangle 68"/>
+          <p:cNvSpPr/>
+          <p:nvPr/>
+        </p:nvSpPr>
+        <p:spPr>
+          <a:xfrm>
+            <a:off x="1121311" y="4044891"/>
+            <a:ext cx="3770335" cy="389322"/>
+          </a:xfrm>
+          <a:prstGeom prst="rect">
+            <a:avLst/>
+          </a:prstGeom>
+          <a:noFill/>
+          <a:ln>
+            <a:solidFill>
+              <a:schemeClr val="accent1">
+                <a:lumMod val="75000"/>
+              </a:schemeClr>
+            </a:solidFill>
+          </a:ln>
+        </p:spPr>
+        <p:style>
+          <a:lnRef idx="2">
+            <a:schemeClr val="accent1">
+              <a:shade val="50000"/>
+            </a:schemeClr>
+          </a:lnRef>
+          <a:fillRef idx="1">
+            <a:schemeClr val="accent1"/>
+          </a:fillRef>
+          <a:effectRef idx="0">
+            <a:schemeClr val="accent1"/>
+          </a:effectRef>
+          <a:fontRef idx="minor">
+            <a:schemeClr val="lt1"/>
+          </a:fontRef>
+        </p:style>
+        <p:txBody>
+          <a:bodyPr rtlCol="0" anchor="ctr"/>
+          <a:lstStyle/>
+          <a:p>
+            <a:pPr algn="ctr"/>
+            <a:endParaRPr lang="en-US"/>
+          </a:p>
+        </p:txBody>
+      </p:sp>
+      <p:sp>
+        <p:nvSpPr>
+          <p:cNvPr id="70" name="Rectangle 69"/>
+          <p:cNvSpPr/>
+          <p:nvPr/>
+        </p:nvSpPr>
+        <p:spPr>
+          <a:xfrm>
+            <a:off x="1121311" y="3683101"/>
+            <a:ext cx="3770335" cy="361790"/>
+          </a:xfrm>
+          <a:prstGeom prst="rect">
+            <a:avLst/>
+          </a:prstGeom>
+          <a:noFill/>
+          <a:ln>
+            <a:solidFill>
+              <a:schemeClr val="accent1">
+                <a:lumMod val="75000"/>
+              </a:schemeClr>
+            </a:solidFill>
+          </a:ln>
+        </p:spPr>
+        <p:style>
+          <a:lnRef idx="2">
+            <a:schemeClr val="accent1">
+              <a:shade val="50000"/>
+            </a:schemeClr>
+          </a:lnRef>
+          <a:fillRef idx="1">
+            <a:schemeClr val="accent1"/>
+          </a:fillRef>
+          <a:effectRef idx="0">
+            <a:schemeClr val="accent1"/>
+          </a:effectRef>
+          <a:fontRef idx="minor">
+            <a:schemeClr val="lt1"/>
+          </a:fontRef>
+        </p:style>
+        <p:txBody>
+          <a:bodyPr rtlCol="0" anchor="ctr"/>
+          <a:lstStyle/>
+          <a:p>
+            <a:pPr algn="ctr"/>
+            <a:endParaRPr lang="en-US"/>
+          </a:p>
+        </p:txBody>
+      </p:sp>
+      <p:cxnSp>
+        <p:nvCxnSpPr>
+          <p:cNvPr id="79" name="Elbow Connector 78"/>
+          <p:cNvCxnSpPr>
+            <a:stCxn id="53" idx="1"/>
+            <a:endCxn id="70" idx="0"/>
+          </p:cNvCxnSpPr>
+          <p:nvPr/>
+        </p:nvCxnSpPr>
+        <p:spPr>
+          <a:xfrm rot="10800000" flipV="1">
+            <a:off x="3006479" y="3606413"/>
+            <a:ext cx="2986792" cy="76688"/>
+          </a:xfrm>
+          <a:prstGeom prst="bentConnector2">
+            <a:avLst/>
+          </a:prstGeom>
+          <a:ln>
+            <a:solidFill>
+              <a:schemeClr val="tx1"/>
+            </a:solidFill>
+            <a:tailEnd type="triangle"/>
+          </a:ln>
+        </p:spPr>
+        <p:style>
+          <a:lnRef idx="1">
+            <a:schemeClr val="accent1"/>
+          </a:lnRef>
+          <a:fillRef idx="0">
+            <a:schemeClr val="accent1"/>
+          </a:fillRef>
+          <a:effectRef idx="0">
+            <a:schemeClr val="accent1"/>
+          </a:effectRef>
+          <a:fontRef idx="minor">
+            <a:schemeClr val="tx1"/>
+          </a:fontRef>
+        </p:style>
+      </p:cxnSp>
+      <p:cxnSp>
+        <p:nvCxnSpPr>
+          <p:cNvPr id="125" name="Straight Arrow Connector 124"/>
+          <p:cNvCxnSpPr>
+            <a:stCxn id="36" idx="1"/>
+            <a:endCxn id="53" idx="3"/>
+          </p:cNvCxnSpPr>
+          <p:nvPr/>
+        </p:nvCxnSpPr>
+        <p:spPr>
+          <a:xfrm flipH="1">
+            <a:off x="8583225" y="3587667"/>
+            <a:ext cx="494546" cy="18746"/>
+          </a:xfrm>
+          <a:prstGeom prst="straightConnector1">
+            <a:avLst/>
+          </a:prstGeom>
+          <a:ln>
+            <a:solidFill>
+              <a:schemeClr val="tx1"/>
+            </a:solidFill>
+            <a:tailEnd type="triangle"/>
+          </a:ln>
+        </p:spPr>
+        <p:style>
+          <a:lnRef idx="1">
+            <a:schemeClr val="accent1"/>
+          </a:lnRef>
+          <a:fillRef idx="0">
+            <a:schemeClr val="accent1"/>
+          </a:fillRef>
+          <a:effectRef idx="0">
+            <a:schemeClr val="accent1"/>
+          </a:effectRef>
+          <a:fontRef idx="minor">
+            <a:schemeClr val="tx1"/>
+          </a:fontRef>
+        </p:style>
+      </p:cxnSp>
+      <p:sp>
+        <p:nvSpPr>
+          <p:cNvPr id="141" name="TextBox 140"/>
+          <p:cNvSpPr txBox="1"/>
+          <p:nvPr/>
+        </p:nvSpPr>
+        <p:spPr>
+          <a:xfrm>
+            <a:off x="9066797" y="4687245"/>
+            <a:ext cx="2494644" cy="646331"/>
+          </a:xfrm>
+          <a:prstGeom prst="rect">
+            <a:avLst/>
+          </a:prstGeom>
+          <a:solidFill>
+            <a:schemeClr val="bg1">
+              <a:lumMod val="85000"/>
+            </a:schemeClr>
+          </a:solidFill>
+        </p:spPr>
+        <p:txBody>
+          <a:bodyPr wrap="square" rtlCol="0">
+            <a:spAutoFit/>
+          </a:bodyPr>
+          <a:lstStyle/>
+          <a:p>
+            <a:r>
+              <a:rPr lang="en-US" dirty="0" smtClean="0"/>
+              <a:t>Show user their task is now rendered into a list</a:t>
+            </a:r>
+            <a:endParaRPr lang="en-US" dirty="0"/>
+          </a:p>
+        </p:txBody>
+      </p:sp>
+      <p:sp>
+        <p:nvSpPr>
+          <p:cNvPr id="143" name="TextBox 142"/>
+          <p:cNvSpPr txBox="1"/>
+          <p:nvPr/>
+        </p:nvSpPr>
+        <p:spPr>
+          <a:xfrm>
+            <a:off x="5993271" y="4137137"/>
+            <a:ext cx="2616149" cy="646331"/>
+          </a:xfrm>
+          <a:prstGeom prst="rect">
+            <a:avLst/>
+          </a:prstGeom>
+          <a:solidFill>
+            <a:schemeClr val="bg1">
+              <a:lumMod val="85000"/>
+            </a:schemeClr>
+          </a:solidFill>
+        </p:spPr>
+        <p:txBody>
+          <a:bodyPr wrap="square" rtlCol="0">
+            <a:spAutoFit/>
+          </a:bodyPr>
+          <a:lstStyle/>
+          <a:p>
+            <a:r>
+              <a:rPr lang="en-US" dirty="0" smtClean="0"/>
+              <a:t>Append the tasks input into a list</a:t>
+            </a:r>
+            <a:endParaRPr lang="en-US" dirty="0"/>
+          </a:p>
+        </p:txBody>
+      </p:sp>
+      <p:cxnSp>
+        <p:nvCxnSpPr>
+          <p:cNvPr id="147" name="Straight Arrow Connector 146"/>
+          <p:cNvCxnSpPr>
+            <a:stCxn id="143" idx="3"/>
+            <a:endCxn id="35" idx="1"/>
+          </p:cNvCxnSpPr>
+          <p:nvPr/>
+        </p:nvCxnSpPr>
+        <p:spPr>
+          <a:xfrm flipV="1">
+            <a:off x="8609420" y="4198654"/>
+            <a:ext cx="627371" cy="261649"/>
+          </a:xfrm>
+          <a:prstGeom prst="straightConnector1">
+            <a:avLst/>
+          </a:prstGeom>
+          <a:ln>
+            <a:solidFill>
+              <a:schemeClr val="tx1"/>
+            </a:solidFill>
+            <a:tailEnd type="triangle"/>
+          </a:ln>
+        </p:spPr>
+        <p:style>
+          <a:lnRef idx="1">
+            <a:schemeClr val="accent1"/>
+          </a:lnRef>
+          <a:fillRef idx="0">
+            <a:schemeClr val="accent1"/>
+          </a:fillRef>
+          <a:effectRef idx="0">
+            <a:schemeClr val="accent1"/>
+          </a:effectRef>
+          <a:fontRef idx="minor">
+            <a:schemeClr val="tx1"/>
+          </a:fontRef>
+        </p:style>
+      </p:cxnSp>
+      <p:cxnSp>
+        <p:nvCxnSpPr>
+          <p:cNvPr id="152" name="Straight Arrow Connector 151"/>
+          <p:cNvCxnSpPr>
+            <a:stCxn id="35" idx="2"/>
+            <a:endCxn id="141" idx="0"/>
+          </p:cNvCxnSpPr>
+          <p:nvPr/>
+        </p:nvCxnSpPr>
+        <p:spPr>
+          <a:xfrm>
+            <a:off x="10302657" y="4383320"/>
+            <a:ext cx="11462" cy="303925"/>
+          </a:xfrm>
+          <a:prstGeom prst="straightConnector1">
+            <a:avLst/>
+          </a:prstGeom>
+          <a:ln>
+            <a:solidFill>
+              <a:schemeClr val="tx1"/>
+            </a:solidFill>
+            <a:tailEnd type="triangle"/>
+          </a:ln>
+        </p:spPr>
+        <p:style>
+          <a:lnRef idx="1">
+            <a:schemeClr val="accent1"/>
+          </a:lnRef>
+          <a:fillRef idx="0">
+            <a:schemeClr val="accent1"/>
+          </a:fillRef>
+          <a:effectRef idx="0">
+            <a:schemeClr val="accent1"/>
+          </a:effectRef>
+          <a:fontRef idx="minor">
+            <a:schemeClr val="tx1"/>
+          </a:fontRef>
+        </p:style>
+      </p:cxnSp>
+      <p:cxnSp>
+        <p:nvCxnSpPr>
+          <p:cNvPr id="182" name="Straight Arrow Connector 181"/>
+          <p:cNvCxnSpPr>
+            <a:stCxn id="53" idx="2"/>
+            <a:endCxn id="143" idx="0"/>
+          </p:cNvCxnSpPr>
+          <p:nvPr/>
+        </p:nvCxnSpPr>
+        <p:spPr>
+          <a:xfrm>
+            <a:off x="7288248" y="3791079"/>
+            <a:ext cx="13098" cy="346058"/>
+          </a:xfrm>
+          <a:prstGeom prst="straightConnector1">
+            <a:avLst/>
+          </a:prstGeom>
+          <a:ln>
+            <a:solidFill>
+              <a:schemeClr val="tx1"/>
+            </a:solidFill>
+            <a:tailEnd type="triangle"/>
+          </a:ln>
+        </p:spPr>
+        <p:style>
+          <a:lnRef idx="1">
+            <a:schemeClr val="accent1"/>
+          </a:lnRef>
+          <a:fillRef idx="0">
+            <a:schemeClr val="accent1"/>
+          </a:fillRef>
+          <a:effectRef idx="0">
+            <a:schemeClr val="accent1"/>
+          </a:effectRef>
+          <a:fontRef idx="minor">
+            <a:schemeClr val="tx1"/>
+          </a:fontRef>
+        </p:style>
+      </p:cxnSp>
+      <p:cxnSp>
+        <p:nvCxnSpPr>
+          <p:cNvPr id="187" name="Elbow Connector 186"/>
+          <p:cNvCxnSpPr>
+            <a:stCxn id="141" idx="1"/>
+          </p:cNvCxnSpPr>
+          <p:nvPr/>
+        </p:nvCxnSpPr>
+        <p:spPr>
+          <a:xfrm rot="10800000">
+            <a:off x="5010411" y="4193441"/>
+            <a:ext cx="4056386" cy="816971"/>
+          </a:xfrm>
+          <a:prstGeom prst="bentConnector3">
+            <a:avLst>
+              <a:gd name="adj1" fmla="val 80682"/>
+            </a:avLst>
+          </a:prstGeom>
+          <a:ln>
+            <a:solidFill>
+              <a:schemeClr val="tx1"/>
+            </a:solidFill>
+            <a:tailEnd type="triangle"/>
+          </a:ln>
+        </p:spPr>
+        <p:style>
+          <a:lnRef idx="1">
+            <a:schemeClr val="accent1"/>
+          </a:lnRef>
+          <a:fillRef idx="0">
+            <a:schemeClr val="accent1"/>
+          </a:fillRef>
+          <a:effectRef idx="0">
+            <a:schemeClr val="accent1"/>
+          </a:effectRef>
+          <a:fontRef idx="minor">
+            <a:schemeClr val="tx1"/>
+          </a:fontRef>
+        </p:style>
+      </p:cxnSp>
+      <p:sp>
+        <p:nvSpPr>
+          <p:cNvPr id="190" name="Rectangle 189"/>
+          <p:cNvSpPr/>
+          <p:nvPr/>
+        </p:nvSpPr>
+        <p:spPr>
+          <a:xfrm>
+            <a:off x="1121311" y="4500355"/>
+            <a:ext cx="1885167" cy="284448"/>
+          </a:xfrm>
+          <a:prstGeom prst="rect">
+            <a:avLst/>
+          </a:prstGeom>
+          <a:noFill/>
+        </p:spPr>
+        <p:style>
+          <a:lnRef idx="2">
+            <a:schemeClr val="accent1">
+              <a:shade val="50000"/>
+            </a:schemeClr>
+          </a:lnRef>
+          <a:fillRef idx="1">
+            <a:schemeClr val="accent1"/>
+          </a:fillRef>
+          <a:effectRef idx="0">
+            <a:schemeClr val="accent1"/>
+          </a:effectRef>
+          <a:fontRef idx="minor">
+            <a:schemeClr val="lt1"/>
+          </a:fontRef>
+        </p:style>
+        <p:txBody>
+          <a:bodyPr rtlCol="0" anchor="ctr"/>
+          <a:lstStyle/>
+          <a:p>
+            <a:pPr algn="ctr"/>
+            <a:endParaRPr lang="en-US"/>
+          </a:p>
+        </p:txBody>
+      </p:sp>
+      <p:sp>
+        <p:nvSpPr>
+          <p:cNvPr id="192" name="TextBox 191"/>
+          <p:cNvSpPr txBox="1"/>
+          <p:nvPr/>
+        </p:nvSpPr>
+        <p:spPr>
+          <a:xfrm>
+            <a:off x="5995800" y="5103140"/>
+            <a:ext cx="2616149" cy="923330"/>
+          </a:xfrm>
+          <a:prstGeom prst="rect">
+            <a:avLst/>
+          </a:prstGeom>
+          <a:solidFill>
+            <a:schemeClr val="bg1">
+              <a:lumMod val="85000"/>
+            </a:schemeClr>
+          </a:solidFill>
+        </p:spPr>
+        <p:txBody>
+          <a:bodyPr wrap="square" rtlCol="0">
+            <a:spAutoFit/>
+          </a:bodyPr>
+          <a:lstStyle/>
+          <a:p>
+            <a:r>
+              <a:rPr lang="en-US" dirty="0" smtClean="0"/>
+              <a:t>Receive user input regarding checked box to indicate completed task</a:t>
+            </a:r>
+            <a:endParaRPr lang="en-US" dirty="0"/>
+          </a:p>
+        </p:txBody>
+      </p:sp>
+      <p:sp>
+        <p:nvSpPr>
+          <p:cNvPr id="194" name="Rectangle 193"/>
+          <p:cNvSpPr/>
+          <p:nvPr/>
+        </p:nvSpPr>
+        <p:spPr>
+          <a:xfrm>
+            <a:off x="1121311" y="4121052"/>
+            <a:ext cx="1885167" cy="284448"/>
+          </a:xfrm>
+          <a:prstGeom prst="rect">
+            <a:avLst/>
+          </a:prstGeom>
+          <a:noFill/>
+        </p:spPr>
+        <p:style>
+          <a:lnRef idx="2">
+            <a:schemeClr val="accent1">
+              <a:shade val="50000"/>
+            </a:schemeClr>
+          </a:lnRef>
+          <a:fillRef idx="1">
+            <a:schemeClr val="accent1"/>
+          </a:fillRef>
+          <a:effectRef idx="0">
+            <a:schemeClr val="accent1"/>
+          </a:effectRef>
+          <a:fontRef idx="minor">
+            <a:schemeClr val="lt1"/>
+          </a:fontRef>
+        </p:style>
+        <p:txBody>
+          <a:bodyPr rtlCol="0" anchor="ctr"/>
+          <a:lstStyle/>
+          <a:p>
+            <a:pPr algn="ctr"/>
+            <a:endParaRPr lang="en-US"/>
+          </a:p>
+        </p:txBody>
+      </p:sp>
+      <p:cxnSp>
+        <p:nvCxnSpPr>
+          <p:cNvPr id="198" name="Elbow Connector 197"/>
+          <p:cNvCxnSpPr>
+            <a:stCxn id="190" idx="3"/>
+            <a:endCxn id="192" idx="1"/>
+          </p:cNvCxnSpPr>
+          <p:nvPr/>
+        </p:nvCxnSpPr>
+        <p:spPr>
+          <a:xfrm>
+            <a:off x="3006478" y="4642579"/>
+            <a:ext cx="2989322" cy="922226"/>
+          </a:xfrm>
+          <a:prstGeom prst="bentConnector3">
+            <a:avLst>
+              <a:gd name="adj1" fmla="val 18278"/>
+            </a:avLst>
+          </a:prstGeom>
+          <a:ln>
+            <a:solidFill>
+              <a:schemeClr val="tx1"/>
+            </a:solidFill>
+            <a:tailEnd type="triangle"/>
+          </a:ln>
+        </p:spPr>
+        <p:style>
+          <a:lnRef idx="1">
+            <a:schemeClr val="accent1"/>
+          </a:lnRef>
+          <a:fillRef idx="0">
+            <a:schemeClr val="accent1"/>
+          </a:fillRef>
+          <a:effectRef idx="0">
+            <a:schemeClr val="accent1"/>
+          </a:effectRef>
+          <a:fontRef idx="minor">
+            <a:schemeClr val="tx1"/>
+          </a:fontRef>
+        </p:style>
+      </p:cxnSp>
+      <p:sp>
+        <p:nvSpPr>
+          <p:cNvPr id="205" name="TextBox 204"/>
+          <p:cNvSpPr txBox="1"/>
+          <p:nvPr/>
+        </p:nvSpPr>
+        <p:spPr>
+          <a:xfrm>
+            <a:off x="9331860" y="5925322"/>
+            <a:ext cx="1466410" cy="646331"/>
+          </a:xfrm>
+          <a:prstGeom prst="rect">
+            <a:avLst/>
+          </a:prstGeom>
+          <a:solidFill>
+            <a:schemeClr val="accent1">
+              <a:lumMod val="40000"/>
+              <a:lumOff val="60000"/>
+            </a:schemeClr>
+          </a:solidFill>
+          <a:ln>
+            <a:noFill/>
+          </a:ln>
+        </p:spPr>
+        <p:txBody>
+          <a:bodyPr wrap="square" rtlCol="0">
+            <a:spAutoFit/>
+          </a:bodyPr>
+          <a:lstStyle/>
+          <a:p>
+            <a:r>
+              <a:rPr lang="en-US" dirty="0"/>
+              <a:t>5</a:t>
+            </a:r>
+            <a:r>
+              <a:rPr lang="en-US" dirty="0" smtClean="0"/>
+              <a:t>. Completed Component</a:t>
+            </a:r>
+            <a:endParaRPr lang="en-US" dirty="0"/>
+          </a:p>
+        </p:txBody>
+      </p:sp>
+      <p:cxnSp>
+        <p:nvCxnSpPr>
+          <p:cNvPr id="207" name="Elbow Connector 206"/>
+          <p:cNvCxnSpPr>
+            <a:stCxn id="192" idx="3"/>
+            <a:endCxn id="205" idx="0"/>
+          </p:cNvCxnSpPr>
+          <p:nvPr/>
+        </p:nvCxnSpPr>
+        <p:spPr>
+          <a:xfrm>
+            <a:off x="8611949" y="5564805"/>
+            <a:ext cx="1453116" cy="360517"/>
+          </a:xfrm>
+          <a:prstGeom prst="bentConnector2">
+            <a:avLst/>
+          </a:prstGeom>
+          <a:ln>
+            <a:solidFill>
+              <a:schemeClr val="tx1"/>
+            </a:solidFill>
+            <a:tailEnd type="triangle"/>
+          </a:ln>
+        </p:spPr>
+        <p:style>
+          <a:lnRef idx="1">
+            <a:schemeClr val="accent1"/>
+          </a:lnRef>
+          <a:fillRef idx="0">
+            <a:schemeClr val="accent1"/>
+          </a:fillRef>
+          <a:effectRef idx="0">
+            <a:schemeClr val="accent1"/>
+          </a:effectRef>
+          <a:fontRef idx="minor">
+            <a:schemeClr val="tx1"/>
+          </a:fontRef>
+        </p:style>
+      </p:cxnSp>
+      <p:cxnSp>
+        <p:nvCxnSpPr>
+          <p:cNvPr id="223" name="Elbow Connector 222"/>
+          <p:cNvCxnSpPr>
+            <a:stCxn id="205" idx="1"/>
+            <a:endCxn id="194" idx="1"/>
+          </p:cNvCxnSpPr>
+          <p:nvPr/>
+        </p:nvCxnSpPr>
+        <p:spPr>
+          <a:xfrm rot="10800000">
+            <a:off x="1121312" y="4263277"/>
+            <a:ext cx="8210549" cy="2074763"/>
+          </a:xfrm>
+          <a:prstGeom prst="bentConnector3">
+            <a:avLst>
+              <a:gd name="adj1" fmla="val 102784"/>
+            </a:avLst>
+          </a:prstGeom>
+          <a:ln>
+            <a:solidFill>
+              <a:schemeClr val="tx1"/>
+            </a:solidFill>
+            <a:tailEnd type="triangle"/>
+          </a:ln>
+        </p:spPr>
+        <p:style>
+          <a:lnRef idx="1">
+            <a:schemeClr val="accent1"/>
+          </a:lnRef>
+          <a:fillRef idx="0">
+            <a:schemeClr val="accent1"/>
+          </a:fillRef>
+          <a:effectRef idx="0">
+            <a:schemeClr val="accent1"/>
+          </a:effectRef>
+          <a:fontRef idx="minor">
+            <a:schemeClr val="tx1"/>
+          </a:fontRef>
+        </p:style>
+      </p:cxnSp>
+      <p:cxnSp>
+        <p:nvCxnSpPr>
+          <p:cNvPr id="236" name="Straight Arrow Connector 235"/>
+          <p:cNvCxnSpPr/>
+          <p:nvPr/>
+        </p:nvCxnSpPr>
+        <p:spPr>
+          <a:xfrm>
+            <a:off x="7112000" y="-1320800"/>
+            <a:ext cx="0" cy="0"/>
+          </a:xfrm>
+          <a:prstGeom prst="straightConnector1">
+            <a:avLst/>
+          </a:prstGeom>
+          <a:ln>
+            <a:tailEnd type="triangle"/>
+          </a:ln>
+        </p:spPr>
+        <p:style>
+          <a:lnRef idx="1">
+            <a:schemeClr val="accent1"/>
+          </a:lnRef>
+          <a:fillRef idx="0">
+            <a:schemeClr val="accent1"/>
+          </a:fillRef>
+          <a:effectRef idx="0">
+            <a:schemeClr val="accent1"/>
+          </a:effectRef>
+          <a:fontRef idx="minor">
+            <a:schemeClr val="tx1"/>
+          </a:fontRef>
+        </p:style>
+      </p:cxnSp>
     </p:spTree>
     <p:extLst>
       <p:ext uri="{BB962C8B-B14F-4D97-AF65-F5344CB8AC3E}">
-        <p14:creationId xmlns:p14="http://schemas.microsoft.com/office/powerpoint/2010/main" val="541559058"/>
+        <p14:creationId xmlns:p14="http://schemas.microsoft.com/office/powerpoint/2010/main" val="379149823"/>
       </p:ext>
     </p:extLst>
   </p:cSld>
@@ -4455,7 +5794,7 @@
             <a:spLocks noGrp="1"/>
           </p:cNvSpPr>
           <p:nvPr>
-            <p:ph type="ctrTitle"/>
+            <p:ph type="title"/>
           </p:nvPr>
         </p:nvSpPr>
         <p:spPr/>
@@ -4465,7 +5804,7 @@
           <a:p>
             <a:r>
               <a:rPr lang="en-US" dirty="0" smtClean="0"/>
-              <a:t>How Each Components are Linked</a:t>
+              <a:t>Initializing my To-Do app (MDN, 2020b).</a:t>
             </a:r>
             <a:endParaRPr lang="en-US" dirty="0"/>
           </a:p>
@@ -4473,12 +5812,12 @@
       </p:sp>
       <p:sp>
         <p:nvSpPr>
-          <p:cNvPr id="3" name="Subtitle 2"/>
+          <p:cNvPr id="3" name="Content Placeholder 2"/>
           <p:cNvSpPr>
             <a:spLocks noGrp="1"/>
           </p:cNvSpPr>
           <p:nvPr>
-            <p:ph type="subTitle" idx="1"/>
+            <p:ph idx="1"/>
           </p:nvPr>
         </p:nvSpPr>
         <p:spPr/>
@@ -4486,18 +5825,274 @@
           <a:bodyPr/>
           <a:lstStyle/>
           <a:p>
-            <a:r>
-              <a:rPr lang="en-US" dirty="0" smtClean="0"/>
-              <a:t>A visual description of a functioning To-Do application using arrows and pseudocode. </a:t>
-            </a:r>
-            <a:endParaRPr lang="en-US" dirty="0"/>
+            <a:pPr marL="514350" indent="-514350">
+              <a:buAutoNum type="arabicPeriod"/>
+            </a:pPr>
+            <a:r>
+              <a:rPr lang="en-US" sz="2000" dirty="0" smtClean="0"/>
+              <a:t>Install </a:t>
+            </a:r>
+            <a:r>
+              <a:rPr lang="en-US" sz="2000" dirty="0" err="1" smtClean="0"/>
+              <a:t>npm</a:t>
+            </a:r>
+            <a:r>
+              <a:rPr lang="en-US" sz="2000" dirty="0" smtClean="0"/>
+              <a:t> packages such as </a:t>
+            </a:r>
+            <a:r>
+              <a:rPr lang="en-US" sz="2000" dirty="0" err="1" smtClean="0">
+                <a:latin typeface="Courier New" panose="02070309020205020404" pitchFamily="49" charset="0"/>
+                <a:cs typeface="Courier New" panose="02070309020205020404" pitchFamily="49" charset="0"/>
+              </a:rPr>
+              <a:t>npx</a:t>
+            </a:r>
+            <a:r>
+              <a:rPr lang="en-US" sz="2000" dirty="0" smtClean="0">
+                <a:latin typeface="Courier New" panose="02070309020205020404" pitchFamily="49" charset="0"/>
+                <a:cs typeface="Courier New" panose="02070309020205020404" pitchFamily="49" charset="0"/>
+              </a:rPr>
+              <a:t> create-react-app </a:t>
+            </a:r>
+            <a:r>
+              <a:rPr lang="en-US" sz="2000" dirty="0" err="1" smtClean="0">
+                <a:latin typeface="Courier New" panose="02070309020205020404" pitchFamily="49" charset="0"/>
+                <a:cs typeface="Courier New" panose="02070309020205020404" pitchFamily="49" charset="0"/>
+              </a:rPr>
+              <a:t>moz</a:t>
+            </a:r>
+            <a:r>
+              <a:rPr lang="en-US" sz="2000" dirty="0" smtClean="0">
+                <a:latin typeface="Courier New" panose="02070309020205020404" pitchFamily="49" charset="0"/>
+                <a:cs typeface="Courier New" panose="02070309020205020404" pitchFamily="49" charset="0"/>
+              </a:rPr>
+              <a:t>-</a:t>
+            </a:r>
+            <a:r>
+              <a:rPr lang="en-US" sz="2000" dirty="0" err="1" smtClean="0">
+                <a:latin typeface="Courier New" panose="02070309020205020404" pitchFamily="49" charset="0"/>
+                <a:cs typeface="Courier New" panose="02070309020205020404" pitchFamily="49" charset="0"/>
+              </a:rPr>
+              <a:t>todo</a:t>
+            </a:r>
+            <a:r>
+              <a:rPr lang="en-US" sz="2000" dirty="0" smtClean="0">
+                <a:latin typeface="Courier New" panose="02070309020205020404" pitchFamily="49" charset="0"/>
+                <a:cs typeface="Courier New" panose="02070309020205020404" pitchFamily="49" charset="0"/>
+              </a:rPr>
+              <a:t>-react</a:t>
+            </a:r>
+            <a:r>
+              <a:rPr lang="en-US" sz="2000" dirty="0" smtClean="0"/>
+              <a:t>.</a:t>
+            </a:r>
+          </a:p>
+          <a:p>
+            <a:pPr marL="514350" indent="-514350">
+              <a:buAutoNum type="arabicPeriod"/>
+            </a:pPr>
+            <a:r>
+              <a:rPr lang="en-US" sz="2000" dirty="0" smtClean="0"/>
+              <a:t>Initialize </a:t>
+            </a:r>
+            <a:r>
+              <a:rPr lang="en-US" sz="2000" dirty="0" err="1" smtClean="0">
+                <a:latin typeface="Courier New" panose="02070309020205020404" pitchFamily="49" charset="0"/>
+                <a:cs typeface="Courier New" panose="02070309020205020404" pitchFamily="49" charset="0"/>
+              </a:rPr>
+              <a:t>npm</a:t>
+            </a:r>
+            <a:r>
+              <a:rPr lang="en-US" sz="2000" dirty="0" smtClean="0">
+                <a:latin typeface="Courier New" panose="02070309020205020404" pitchFamily="49" charset="0"/>
+                <a:cs typeface="Courier New" panose="02070309020205020404" pitchFamily="49" charset="0"/>
+              </a:rPr>
+              <a:t> start.</a:t>
+            </a:r>
+          </a:p>
+          <a:p>
+            <a:pPr marL="514350" indent="-514350">
+              <a:buAutoNum type="arabicPeriod"/>
+            </a:pPr>
+            <a:r>
+              <a:rPr lang="en-US" sz="2000" dirty="0" smtClean="0">
+                <a:cs typeface="Courier New" panose="02070309020205020404" pitchFamily="49" charset="0"/>
+              </a:rPr>
+              <a:t>Review app.js and understand </a:t>
+            </a:r>
+            <a:r>
+              <a:rPr lang="en-US" sz="2000" dirty="0" smtClean="0">
+                <a:latin typeface="Courier New" panose="02070309020205020404" pitchFamily="49" charset="0"/>
+                <a:cs typeface="Courier New" panose="02070309020205020404" pitchFamily="49" charset="0"/>
+              </a:rPr>
+              <a:t>import</a:t>
+            </a:r>
+            <a:r>
+              <a:rPr lang="en-US" sz="2000" dirty="0" smtClean="0">
+                <a:cs typeface="Courier New" panose="02070309020205020404" pitchFamily="49" charset="0"/>
+              </a:rPr>
+              <a:t> statements, app component in the middle, </a:t>
+            </a:r>
+            <a:r>
+              <a:rPr lang="en-US" sz="2000" dirty="0" smtClean="0">
+                <a:latin typeface="Courier New" panose="02070309020205020404" pitchFamily="49" charset="0"/>
+                <a:cs typeface="Courier New" panose="02070309020205020404" pitchFamily="49" charset="0"/>
+              </a:rPr>
+              <a:t>export</a:t>
+            </a:r>
+            <a:r>
+              <a:rPr lang="en-US" sz="2000" dirty="0" smtClean="0">
+                <a:cs typeface="Courier New" panose="02070309020205020404" pitchFamily="49" charset="0"/>
+              </a:rPr>
+              <a:t> statement at the bottom. </a:t>
+            </a:r>
+          </a:p>
+          <a:p>
+            <a:pPr marL="514350" indent="-514350">
+              <a:buAutoNum type="arabicPeriod"/>
+            </a:pPr>
+            <a:r>
+              <a:rPr lang="en-US" sz="2000" dirty="0" smtClean="0">
+                <a:cs typeface="Courier New" panose="02070309020205020404" pitchFamily="49" charset="0"/>
+              </a:rPr>
+              <a:t>Pre-project house keeping. </a:t>
+            </a:r>
+            <a:r>
+              <a:rPr lang="en-US" sz="2000" dirty="0" smtClean="0">
+                <a:cs typeface="Courier New" panose="02070309020205020404" pitchFamily="49" charset="0"/>
+              </a:rPr>
+              <a:t>Remove </a:t>
+            </a:r>
+            <a:r>
+              <a:rPr lang="en-US" sz="2000" dirty="0" smtClean="0">
+                <a:latin typeface="Courier New" panose="02070309020205020404" pitchFamily="49" charset="0"/>
+                <a:cs typeface="Courier New" panose="02070309020205020404" pitchFamily="49" charset="0"/>
+              </a:rPr>
+              <a:t>App.test.js </a:t>
+            </a:r>
+            <a:r>
+              <a:rPr lang="en-US" sz="2000" dirty="0" err="1">
+                <a:latin typeface="Courier New" panose="02070309020205020404" pitchFamily="49" charset="0"/>
+                <a:cs typeface="Courier New" panose="02070309020205020404" pitchFamily="49" charset="0"/>
+              </a:rPr>
+              <a:t>logo.svg</a:t>
+            </a:r>
+            <a:r>
+              <a:rPr lang="en-US" sz="2000" dirty="0">
+                <a:latin typeface="Courier New" panose="02070309020205020404" pitchFamily="49" charset="0"/>
+                <a:cs typeface="Courier New" panose="02070309020205020404" pitchFamily="49" charset="0"/>
+              </a:rPr>
+              <a:t> serviceWorker.js </a:t>
+            </a:r>
+            <a:r>
+              <a:rPr lang="en-US" sz="2000" dirty="0" smtClean="0">
+                <a:latin typeface="Courier New" panose="02070309020205020404" pitchFamily="49" charset="0"/>
+                <a:cs typeface="Courier New" panose="02070309020205020404" pitchFamily="49" charset="0"/>
+              </a:rPr>
+              <a:t>setupTests.js </a:t>
+            </a:r>
+            <a:r>
+              <a:rPr lang="en-US" sz="2000" dirty="0" smtClean="0">
+                <a:cs typeface="Courier New" panose="02070309020205020404" pitchFamily="49" charset="0"/>
+              </a:rPr>
+              <a:t>because we’re doing testing. </a:t>
+            </a:r>
+            <a:r>
+              <a:rPr lang="en-US" sz="2000" dirty="0" smtClean="0">
+                <a:cs typeface="Courier New" panose="02070309020205020404" pitchFamily="49" charset="0"/>
+              </a:rPr>
+              <a:t>Additionally, we also removed the unrelated links to styles sheet and script sheet</a:t>
+            </a:r>
+            <a:r>
+              <a:rPr lang="en-US" sz="2000" dirty="0" smtClean="0">
+                <a:cs typeface="Courier New" panose="02070309020205020404" pitchFamily="49" charset="0"/>
+              </a:rPr>
+              <a:t>.</a:t>
+            </a:r>
+          </a:p>
+          <a:p>
+            <a:pPr marL="514350" indent="-514350">
+              <a:buAutoNum type="arabicPeriod"/>
+            </a:pPr>
+            <a:r>
+              <a:rPr lang="en-US" sz="2000" dirty="0" smtClean="0">
+                <a:cs typeface="Courier New" panose="02070309020205020404" pitchFamily="49" charset="0"/>
+              </a:rPr>
+              <a:t>Assume the design department has handed in their stylesheet index.css sheet in time for me to append th</a:t>
+            </a:r>
+            <a:r>
+              <a:rPr lang="en-US" sz="2000" dirty="0" smtClean="0">
+                <a:cs typeface="Courier New" panose="02070309020205020404" pitchFamily="49" charset="0"/>
+              </a:rPr>
+              <a:t>e </a:t>
+            </a:r>
+            <a:r>
+              <a:rPr lang="en-US" sz="2000" dirty="0" smtClean="0">
+                <a:latin typeface="Courier New" panose="02070309020205020404" pitchFamily="49" charset="0"/>
+                <a:cs typeface="Courier New" panose="02070309020205020404" pitchFamily="49" charset="0"/>
+              </a:rPr>
+              <a:t>index.css </a:t>
+            </a:r>
+            <a:r>
+              <a:rPr lang="en-US" sz="2000" dirty="0" smtClean="0">
+                <a:cs typeface="Courier New" panose="02070309020205020404" pitchFamily="49" charset="0"/>
+              </a:rPr>
+              <a:t>to </a:t>
+            </a:r>
+            <a:r>
+              <a:rPr lang="en-US" sz="2000" dirty="0" smtClean="0">
+                <a:latin typeface="Courier New" panose="02070309020205020404" pitchFamily="49" charset="0"/>
+                <a:cs typeface="Courier New" panose="02070309020205020404" pitchFamily="49" charset="0"/>
+              </a:rPr>
+              <a:t>index.js</a:t>
+            </a:r>
+            <a:r>
+              <a:rPr lang="en-US" sz="2000" dirty="0" smtClean="0">
+                <a:cs typeface="Courier New" panose="02070309020205020404" pitchFamily="49" charset="0"/>
+              </a:rPr>
+              <a:t>. Review, react to find that we have a functional looking web that is pleasing to the eye. </a:t>
+            </a:r>
+            <a:endParaRPr lang="en-US" sz="2000" dirty="0" smtClean="0">
+              <a:cs typeface="Courier New" panose="02070309020205020404" pitchFamily="49" charset="0"/>
+            </a:endParaRPr>
+          </a:p>
+          <a:p>
+            <a:pPr marL="514350" indent="-514350">
+              <a:buAutoNum type="arabicPeriod"/>
+            </a:pPr>
+            <a:endParaRPr lang="en-US" sz="2000" dirty="0" smtClean="0">
+              <a:cs typeface="Courier New" panose="02070309020205020404" pitchFamily="49" charset="0"/>
+            </a:endParaRPr>
+          </a:p>
+          <a:p>
+            <a:pPr marL="514350" indent="-514350">
+              <a:buAutoNum type="arabicPeriod"/>
+            </a:pPr>
+            <a:endParaRPr lang="en-US" sz="2000" dirty="0" smtClean="0">
+              <a:cs typeface="Courier New" panose="02070309020205020404" pitchFamily="49" charset="0"/>
+            </a:endParaRPr>
+          </a:p>
+          <a:p>
+            <a:pPr marL="514350" indent="-514350">
+              <a:buAutoNum type="arabicPeriod"/>
+            </a:pPr>
+            <a:endParaRPr lang="en-US" sz="2000" dirty="0">
+              <a:latin typeface="Courier New" panose="02070309020205020404" pitchFamily="49" charset="0"/>
+              <a:cs typeface="Courier New" panose="02070309020205020404" pitchFamily="49" charset="0"/>
+            </a:endParaRPr>
+          </a:p>
+          <a:p>
+            <a:pPr marL="514350" indent="-514350">
+              <a:buAutoNum type="arabicPeriod"/>
+            </a:pPr>
+            <a:endParaRPr lang="en-US" sz="2000" dirty="0" smtClean="0"/>
           </a:p>
         </p:txBody>
       </p:sp>
     </p:spTree>
     <p:extLst>
       <p:ext uri="{BB962C8B-B14F-4D97-AF65-F5344CB8AC3E}">
-        <p14:creationId xmlns:p14="http://schemas.microsoft.com/office/powerpoint/2010/main" val="453486192"/>
+        <p14:creationId xmlns:p14="http://schemas.microsoft.com/office/powerpoint/2010/main" val="541559058"/>
       </p:ext>
     </p:extLst>
   </p:cSld>
@@ -4531,110 +6126,21 @@
             <a:spLocks noGrp="1"/>
           </p:cNvSpPr>
           <p:nvPr>
-            <p:ph type="title"/>
-          </p:nvPr>
-        </p:nvSpPr>
-        <p:spPr>
-          <a:xfrm>
-            <a:off x="5051897" y="360597"/>
-            <a:ext cx="6621294" cy="917057"/>
-          </a:xfrm>
-          <a:solidFill>
-            <a:schemeClr val="accent1">
-              <a:lumMod val="40000"/>
-              <a:lumOff val="60000"/>
-            </a:schemeClr>
-          </a:solidFill>
-        </p:spPr>
-        <p:txBody>
-          <a:bodyPr>
-            <a:normAutofit fontScale="90000"/>
-          </a:bodyPr>
-          <a:lstStyle/>
-          <a:p>
-            <a:r>
-              <a:rPr lang="en-US" sz="3600" dirty="0" smtClean="0"/>
-              <a:t>Step </a:t>
-            </a:r>
-            <a:r>
-              <a:rPr lang="en-US" sz="3600" dirty="0"/>
-              <a:t>1</a:t>
-            </a:r>
-            <a:r>
-              <a:rPr lang="en-US" sz="3600" dirty="0" smtClean="0"/>
-              <a:t>: </a:t>
-            </a:r>
-            <a:r>
-              <a:rPr lang="en-US" sz="3600" dirty="0"/>
-              <a:t>The Main Container of To-Do Task </a:t>
-            </a:r>
-            <a:r>
-              <a:rPr lang="en-US" sz="3600" dirty="0" smtClean="0"/>
-              <a:t>(MDN, 2020b).</a:t>
-            </a:r>
-            <a:endParaRPr lang="en-US" sz="3600" dirty="0"/>
-          </a:p>
-        </p:txBody>
-      </p:sp>
-      <p:pic>
-        <p:nvPicPr>
-          <p:cNvPr id="4" name="Content Placeholder 3"/>
-          <p:cNvPicPr>
-            <a:picLocks noGrp="1" noChangeAspect="1"/>
-          </p:cNvPicPr>
-          <p:nvPr>
-            <p:ph idx="1"/>
-          </p:nvPr>
-        </p:nvPicPr>
-        <p:blipFill>
-          <a:blip r:embed="rId2">
-            <a:extLst>
-              <a:ext uri="{28A0092B-C50C-407E-A947-70E740481C1C}">
-                <a14:useLocalDpi xmlns:a14="http://schemas.microsoft.com/office/drawing/2010/main" val="0"/>
-              </a:ext>
-            </a:extLst>
-          </a:blip>
-          <a:stretch>
-            <a:fillRect/>
-          </a:stretch>
-        </p:blipFill>
-        <p:spPr>
-          <a:xfrm>
-            <a:off x="488649" y="360597"/>
-            <a:ext cx="4290535" cy="5147215"/>
-          </a:xfrm>
-        </p:spPr>
-      </p:pic>
-      <p:sp>
-        <p:nvSpPr>
-          <p:cNvPr id="7" name="TextBox 6"/>
-          <p:cNvSpPr txBox="1"/>
-          <p:nvPr/>
-        </p:nvSpPr>
-        <p:spPr>
-          <a:xfrm>
-            <a:off x="4196219" y="631234"/>
-            <a:ext cx="375781" cy="375781"/>
-          </a:xfrm>
-          <a:prstGeom prst="rect">
-            <a:avLst/>
-          </a:prstGeom>
-          <a:solidFill>
-            <a:schemeClr val="accent1">
-              <a:lumMod val="40000"/>
-              <a:lumOff val="60000"/>
-            </a:schemeClr>
-          </a:solidFill>
-        </p:spPr>
-        <p:txBody>
-          <a:bodyPr wrap="square" rtlCol="0">
-            <a:spAutoFit/>
-          </a:bodyPr>
+            <p:ph type="ctrTitle"/>
+          </p:nvPr>
+        </p:nvSpPr>
+        <p:spPr/>
+        <p:txBody>
+          <a:bodyPr/>
           <a:lstStyle/>
           <a:p>
             <a:r>
               <a:rPr lang="en-US" dirty="0" smtClean="0"/>
-              <a:t>1</a:t>
+              <a:t>How Each </a:t>
+            </a:r>
+            <a:r>
+              <a:rPr lang="en-US" dirty="0" smtClean="0"/>
+              <a:t>Components will Function</a:t>
             </a:r>
             <a:endParaRPr lang="en-US" dirty="0"/>
           </a:p>
@@ -4642,307 +6148,31 @@
       </p:sp>
       <p:sp>
         <p:nvSpPr>
-          <p:cNvPr id="9" name="Rectangle 8"/>
-          <p:cNvSpPr/>
-          <p:nvPr/>
-        </p:nvSpPr>
-        <p:spPr>
-          <a:xfrm>
-            <a:off x="610962" y="475989"/>
-            <a:ext cx="4045907" cy="4614511"/>
-          </a:xfrm>
-          <a:prstGeom prst="rect">
-            <a:avLst/>
-          </a:prstGeom>
-          <a:noFill/>
-          <a:ln>
-            <a:solidFill>
-              <a:schemeClr val="accent1">
-                <a:lumMod val="75000"/>
-              </a:schemeClr>
-            </a:solidFill>
-          </a:ln>
-        </p:spPr>
-        <p:style>
-          <a:lnRef idx="2">
-            <a:schemeClr val="accent1">
-              <a:shade val="50000"/>
-            </a:schemeClr>
-          </a:lnRef>
-          <a:fillRef idx="1">
-            <a:schemeClr val="accent1"/>
-          </a:fillRef>
-          <a:effectRef idx="0">
-            <a:schemeClr val="accent1"/>
-          </a:effectRef>
-          <a:fontRef idx="minor">
-            <a:schemeClr val="lt1"/>
-          </a:fontRef>
-        </p:style>
-        <p:txBody>
-          <a:bodyPr rtlCol="0" anchor="ctr"/>
-          <a:lstStyle/>
-          <a:p>
-            <a:pPr algn="ctr"/>
-            <a:endParaRPr lang="en-US"/>
-          </a:p>
-        </p:txBody>
-      </p:sp>
-      <p:cxnSp>
-        <p:nvCxnSpPr>
-          <p:cNvPr id="13" name="Elbow Connector 12"/>
-          <p:cNvCxnSpPr/>
-          <p:nvPr/>
-        </p:nvCxnSpPr>
-        <p:spPr>
-          <a:xfrm flipV="1">
-            <a:off x="4624105" y="819124"/>
-            <a:ext cx="395028" cy="1964119"/>
-          </a:xfrm>
-          <a:prstGeom prst="bentConnector3">
-            <a:avLst/>
-          </a:prstGeom>
-          <a:ln>
-            <a:solidFill>
-              <a:schemeClr val="tx1"/>
-            </a:solidFill>
-            <a:tailEnd type="triangle"/>
-          </a:ln>
-        </p:spPr>
-        <p:style>
-          <a:lnRef idx="1">
-            <a:schemeClr val="accent1"/>
-          </a:lnRef>
-          <a:fillRef idx="0">
-            <a:schemeClr val="accent1"/>
-          </a:fillRef>
-          <a:effectRef idx="0">
-            <a:schemeClr val="accent1"/>
-          </a:effectRef>
-          <a:fontRef idx="minor">
-            <a:schemeClr val="tx1"/>
-          </a:fontRef>
-        </p:style>
-      </p:cxnSp>
-      <p:sp>
-        <p:nvSpPr>
-          <p:cNvPr id="14" name="TextBox 13"/>
-          <p:cNvSpPr txBox="1"/>
-          <p:nvPr/>
-        </p:nvSpPr>
-        <p:spPr>
-          <a:xfrm>
-            <a:off x="5051897" y="1578279"/>
-            <a:ext cx="6459522" cy="3693319"/>
-          </a:xfrm>
-          <a:prstGeom prst="rect">
-            <a:avLst/>
-          </a:prstGeom>
-          <a:noFill/>
-        </p:spPr>
-        <p:txBody>
-          <a:bodyPr wrap="square" rtlCol="0">
-            <a:spAutoFit/>
-          </a:bodyPr>
-          <a:lstStyle/>
-          <a:p>
-            <a:pPr marL="342900" indent="-342900">
-              <a:buAutoNum type="arabicPeriod"/>
-            </a:pPr>
+          <p:cNvPr id="3" name="Subtitle 2"/>
+          <p:cNvSpPr>
+            <a:spLocks noGrp="1"/>
+          </p:cNvSpPr>
+          <p:nvPr>
+            <p:ph type="subTitle" idx="1"/>
+          </p:nvPr>
+        </p:nvSpPr>
+        <p:spPr/>
+        <p:txBody>
+          <a:bodyPr/>
+          <a:lstStyle/>
+          <a:p>
             <a:r>
               <a:rPr lang="en-US" dirty="0" smtClean="0"/>
-              <a:t>Create a skeleton</a:t>
-            </a:r>
-            <a:r>
-              <a:rPr lang="en-US" dirty="0" smtClean="0">
-                <a:latin typeface="Courier New" panose="02070309020205020404" pitchFamily="49" charset="0"/>
-                <a:cs typeface="Courier New" panose="02070309020205020404" pitchFamily="49" charset="0"/>
-              </a:rPr>
-              <a:t> App(function</a:t>
-            </a:r>
-            <a:r>
-              <a:rPr lang="en-US" dirty="0" smtClean="0"/>
-              <a:t>)  and paste to the App.js that creates the:</a:t>
-            </a:r>
-          </a:p>
-          <a:p>
-            <a:pPr marL="800100" lvl="1" indent="-342900">
-              <a:buFont typeface="+mj-lt"/>
-              <a:buAutoNum type="alphaLcParenR"/>
-            </a:pPr>
-            <a:r>
-              <a:rPr lang="en-US" dirty="0" smtClean="0"/>
-              <a:t>Title: Parsley’s To Do List</a:t>
-            </a:r>
-          </a:p>
-          <a:p>
-            <a:pPr marL="800100" lvl="1" indent="-342900">
-              <a:buFont typeface="+mj-lt"/>
-              <a:buAutoNum type="alphaLcParenR"/>
-            </a:pPr>
-            <a:r>
-              <a:rPr lang="en-US" dirty="0" smtClean="0"/>
-              <a:t>Input Form:  create </a:t>
-            </a:r>
-            <a:r>
-              <a:rPr lang="en-US" dirty="0" smtClean="0">
-                <a:latin typeface="Courier New" panose="02070309020205020404" pitchFamily="49" charset="0"/>
-                <a:cs typeface="Courier New" panose="02070309020205020404" pitchFamily="49" charset="0"/>
-              </a:rPr>
-              <a:t>&lt;form&gt; </a:t>
-            </a:r>
-            <a:r>
-              <a:rPr lang="en-US" dirty="0" smtClean="0"/>
-              <a:t>element to make a skeleton of an input form user can type.</a:t>
-            </a:r>
-          </a:p>
-          <a:p>
-            <a:pPr marL="800100" lvl="1" indent="-342900">
-              <a:buFont typeface="+mj-lt"/>
-              <a:buAutoNum type="alphaLcParenR"/>
-            </a:pPr>
-            <a:r>
-              <a:rPr lang="en-US" dirty="0" smtClean="0"/>
-              <a:t>Button: create a button </a:t>
-            </a:r>
-            <a:r>
-              <a:rPr lang="en-US" dirty="0" smtClean="0">
-                <a:latin typeface="Courier New" panose="02070309020205020404" pitchFamily="49" charset="0"/>
-                <a:cs typeface="Courier New" panose="02070309020205020404" pitchFamily="49" charset="0"/>
-              </a:rPr>
-              <a:t>type=“submit”.</a:t>
-            </a:r>
-          </a:p>
-          <a:p>
-            <a:pPr marL="800100" lvl="1" indent="-342900">
-              <a:buFont typeface="+mj-lt"/>
-              <a:buAutoNum type="alphaLcParenR"/>
-            </a:pPr>
-            <a:r>
-              <a:rPr lang="en-US" dirty="0" smtClean="0">
-                <a:cs typeface="Arial" panose="020B0604020202020204" pitchFamily="34" charset="0"/>
-              </a:rPr>
-              <a:t>Create three unordered list </a:t>
-            </a:r>
-            <a:r>
-              <a:rPr lang="en-US" dirty="0" smtClean="0">
-                <a:latin typeface="Courier New" panose="02070309020205020404" pitchFamily="49" charset="0"/>
-                <a:cs typeface="Courier New" panose="02070309020205020404" pitchFamily="49" charset="0"/>
-              </a:rPr>
-              <a:t>&lt;</a:t>
-            </a:r>
-            <a:r>
-              <a:rPr lang="en-US" dirty="0" err="1" smtClean="0">
-                <a:latin typeface="Courier New" panose="02070309020205020404" pitchFamily="49" charset="0"/>
-                <a:cs typeface="Courier New" panose="02070309020205020404" pitchFamily="49" charset="0"/>
-              </a:rPr>
-              <a:t>ul</a:t>
-            </a:r>
-            <a:r>
-              <a:rPr lang="en-US" dirty="0" smtClean="0">
-                <a:latin typeface="Courier New" panose="02070309020205020404" pitchFamily="49" charset="0"/>
-                <a:cs typeface="Courier New" panose="02070309020205020404" pitchFamily="49" charset="0"/>
-              </a:rPr>
-              <a:t>&gt; </a:t>
-            </a:r>
-            <a:r>
-              <a:rPr lang="en-US" dirty="0" smtClean="0">
-                <a:cs typeface="Arial" panose="020B0604020202020204" pitchFamily="34" charset="0"/>
-              </a:rPr>
-              <a:t>and </a:t>
-            </a:r>
-            <a:r>
-              <a:rPr lang="en-US" dirty="0" smtClean="0">
-                <a:latin typeface="Courier New" panose="02070309020205020404" pitchFamily="49" charset="0"/>
-                <a:cs typeface="Courier New" panose="02070309020205020404" pitchFamily="49" charset="0"/>
-              </a:rPr>
-              <a:t>&lt;li&gt; </a:t>
-            </a:r>
-            <a:r>
-              <a:rPr lang="en-US" dirty="0" smtClean="0">
-                <a:cs typeface="Arial" panose="020B0604020202020204" pitchFamily="34" charset="0"/>
-              </a:rPr>
-              <a:t>as shown as eat, sleep, and watch birds</a:t>
-            </a:r>
-            <a:r>
-              <a:rPr lang="en-US" dirty="0" smtClean="0">
-                <a:latin typeface="Arial" panose="020B0604020202020204" pitchFamily="34" charset="0"/>
-                <a:cs typeface="Arial" panose="020B0604020202020204" pitchFamily="34" charset="0"/>
-              </a:rPr>
-              <a:t>. </a:t>
-            </a:r>
-          </a:p>
-          <a:p>
-            <a:pPr marL="800100" lvl="1" indent="-342900">
-              <a:buFont typeface="+mj-lt"/>
-              <a:buAutoNum type="alphaLcParenR"/>
-            </a:pPr>
-            <a:r>
-              <a:rPr lang="en-US" dirty="0" smtClean="0">
-                <a:cs typeface="Arial" panose="020B0604020202020204" pitchFamily="34" charset="0"/>
-              </a:rPr>
-              <a:t>Check box is represented by </a:t>
-            </a:r>
-            <a:r>
-              <a:rPr lang="en-US" dirty="0">
-                <a:cs typeface="Arial" panose="020B0604020202020204" pitchFamily="34" charset="0"/>
-              </a:rPr>
-              <a:t> </a:t>
-            </a:r>
-            <a:r>
-              <a:rPr lang="en-US" dirty="0">
-                <a:latin typeface="Courier New" panose="02070309020205020404" pitchFamily="49" charset="0"/>
-                <a:cs typeface="Courier New" panose="02070309020205020404" pitchFamily="49" charset="0"/>
-              </a:rPr>
-              <a:t>&lt;</a:t>
-            </a:r>
-            <a:r>
-              <a:rPr lang="en-US" dirty="0" smtClean="0">
-                <a:latin typeface="Courier New" panose="02070309020205020404" pitchFamily="49" charset="0"/>
-                <a:cs typeface="Courier New" panose="02070309020205020404" pitchFamily="49" charset="0"/>
-              </a:rPr>
-              <a:t>input</a:t>
-            </a:r>
-            <a:r>
-              <a:rPr lang="en-US" dirty="0">
-                <a:latin typeface="Courier New" panose="02070309020205020404" pitchFamily="49" charset="0"/>
-                <a:cs typeface="Courier New" panose="02070309020205020404" pitchFamily="49" charset="0"/>
-              </a:rPr>
-              <a:t> type="checkbox" </a:t>
-            </a:r>
-            <a:r>
-              <a:rPr lang="en-US" dirty="0" err="1">
-                <a:latin typeface="Courier New" panose="02070309020205020404" pitchFamily="49" charset="0"/>
-                <a:cs typeface="Courier New" panose="02070309020205020404" pitchFamily="49" charset="0"/>
-              </a:rPr>
-              <a:t>defaultChecked</a:t>
-            </a:r>
-            <a:r>
-              <a:rPr lang="en-US" dirty="0">
-                <a:latin typeface="Courier New" panose="02070309020205020404" pitchFamily="49" charset="0"/>
-                <a:cs typeface="Courier New" panose="02070309020205020404" pitchFamily="49" charset="0"/>
-              </a:rPr>
-              <a:t>={true} /&gt;</a:t>
-            </a:r>
-          </a:p>
-          <a:p>
-            <a:pPr marL="800100" lvl="1" indent="-342900">
-              <a:buFont typeface="+mj-lt"/>
-              <a:buAutoNum type="alphaLcParenR"/>
-            </a:pPr>
-            <a:r>
-              <a:rPr lang="en-US" dirty="0" smtClean="0">
-                <a:cs typeface="Arial" panose="020B0604020202020204" pitchFamily="34" charset="0"/>
-              </a:rPr>
-              <a:t>Delete button is represented with a button element to remove the specific listed task. </a:t>
-            </a:r>
+              <a:t>A visual description of a functioning To-Do application using arrows and pseudocode. </a:t>
+            </a:r>
+            <a:endParaRPr lang="en-US" dirty="0"/>
           </a:p>
         </p:txBody>
       </p:sp>
     </p:spTree>
     <p:extLst>
       <p:ext uri="{BB962C8B-B14F-4D97-AF65-F5344CB8AC3E}">
-        <p14:creationId xmlns:p14="http://schemas.microsoft.com/office/powerpoint/2010/main" val="116127418"/>
+        <p14:creationId xmlns:p14="http://schemas.microsoft.com/office/powerpoint/2010/main" val="453486192"/>
       </p:ext>
     </p:extLst>
   </p:cSld>
@@ -4981,8 +6211,8 @@
         </p:nvSpPr>
         <p:spPr>
           <a:xfrm>
-            <a:off x="5051897" y="360598"/>
-            <a:ext cx="6621294" cy="534348"/>
+            <a:off x="5051897" y="360597"/>
+            <a:ext cx="6621294" cy="917057"/>
           </a:xfrm>
           <a:solidFill>
             <a:schemeClr val="accent1">
@@ -5002,12 +6232,20 @@
               <a:t>Step </a:t>
             </a:r>
             <a:r>
+              <a:rPr lang="en-US" sz="3600" dirty="0"/>
+              <a:t>1</a:t>
+            </a:r>
+            <a:r>
               <a:rPr lang="en-US" sz="3600" dirty="0" smtClean="0"/>
-              <a:t>2: </a:t>
+              <a:t>: </a:t>
             </a:r>
             <a:r>
               <a:rPr lang="en-US" sz="3600" dirty="0"/>
               <a:t>The Main Container of To-Do Task </a:t>
+            </a:r>
+            <a:r>
+              <a:rPr lang="en-US" sz="3600" dirty="0" smtClean="0"/>
+              <a:t>(MDN, 2020b).</a:t>
             </a:r>
             <a:endParaRPr lang="en-US" sz="3600" dirty="0"/>
           </a:p>
@@ -5037,6 +6275,466 @@
         </p:blipFill>
         <p:spPr>
           <a:xfrm>
+            <a:off x="488649" y="360597"/>
+            <a:ext cx="4290535" cy="5147215"/>
+          </a:xfrm>
+        </p:spPr>
+      </p:pic>
+      <p:sp>
+        <p:nvSpPr>
+          <p:cNvPr id="9" name="Rectangle 8"/>
+          <p:cNvSpPr/>
+          <p:nvPr/>
+        </p:nvSpPr>
+        <p:spPr>
+          <a:xfrm>
+            <a:off x="610962" y="475989"/>
+            <a:ext cx="4045907" cy="4614511"/>
+          </a:xfrm>
+          <a:prstGeom prst="rect">
+            <a:avLst/>
+          </a:prstGeom>
+          <a:noFill/>
+          <a:ln>
+            <a:solidFill>
+              <a:schemeClr val="accent1">
+                <a:lumMod val="75000"/>
+              </a:schemeClr>
+            </a:solidFill>
+          </a:ln>
+        </p:spPr>
+        <p:style>
+          <a:lnRef idx="2">
+            <a:schemeClr val="accent1">
+              <a:shade val="50000"/>
+            </a:schemeClr>
+          </a:lnRef>
+          <a:fillRef idx="1">
+            <a:schemeClr val="accent1"/>
+          </a:fillRef>
+          <a:effectRef idx="0">
+            <a:schemeClr val="accent1"/>
+          </a:effectRef>
+          <a:fontRef idx="minor">
+            <a:schemeClr val="lt1"/>
+          </a:fontRef>
+        </p:style>
+        <p:txBody>
+          <a:bodyPr rtlCol="0" anchor="ctr"/>
+          <a:lstStyle/>
+          <a:p>
+            <a:pPr algn="ctr"/>
+            <a:endParaRPr lang="en-US"/>
+          </a:p>
+        </p:txBody>
+      </p:sp>
+      <p:cxnSp>
+        <p:nvCxnSpPr>
+          <p:cNvPr id="13" name="Elbow Connector 12"/>
+          <p:cNvCxnSpPr/>
+          <p:nvPr/>
+        </p:nvCxnSpPr>
+        <p:spPr>
+          <a:xfrm flipV="1">
+            <a:off x="4624105" y="819124"/>
+            <a:ext cx="395028" cy="1964119"/>
+          </a:xfrm>
+          <a:prstGeom prst="bentConnector3">
+            <a:avLst/>
+          </a:prstGeom>
+          <a:ln>
+            <a:solidFill>
+              <a:schemeClr val="tx1"/>
+            </a:solidFill>
+            <a:tailEnd type="triangle"/>
+          </a:ln>
+        </p:spPr>
+        <p:style>
+          <a:lnRef idx="1">
+            <a:schemeClr val="accent1"/>
+          </a:lnRef>
+          <a:fillRef idx="0">
+            <a:schemeClr val="accent1"/>
+          </a:fillRef>
+          <a:effectRef idx="0">
+            <a:schemeClr val="accent1"/>
+          </a:effectRef>
+          <a:fontRef idx="minor">
+            <a:schemeClr val="tx1"/>
+          </a:fontRef>
+        </p:style>
+      </p:cxnSp>
+      <p:sp>
+        <p:nvSpPr>
+          <p:cNvPr id="14" name="TextBox 13"/>
+          <p:cNvSpPr txBox="1"/>
+          <p:nvPr/>
+        </p:nvSpPr>
+        <p:spPr>
+          <a:xfrm>
+            <a:off x="5051897" y="1578279"/>
+            <a:ext cx="6459522" cy="5078313"/>
+          </a:xfrm>
+          <a:prstGeom prst="rect">
+            <a:avLst/>
+          </a:prstGeom>
+          <a:noFill/>
+        </p:spPr>
+        <p:txBody>
+          <a:bodyPr wrap="square" rtlCol="0">
+            <a:spAutoFit/>
+          </a:bodyPr>
+          <a:lstStyle/>
+          <a:p>
+            <a:r>
+              <a:rPr lang="en-US" dirty="0" smtClean="0"/>
+              <a:t>Create a skeleton</a:t>
+            </a:r>
+            <a:r>
+              <a:rPr lang="en-US" dirty="0" smtClean="0">
+                <a:latin typeface="Courier New" panose="02070309020205020404" pitchFamily="49" charset="0"/>
+                <a:cs typeface="Courier New" panose="02070309020205020404" pitchFamily="49" charset="0"/>
+              </a:rPr>
+              <a:t> App(function</a:t>
+            </a:r>
+            <a:r>
+              <a:rPr lang="en-US" dirty="0" smtClean="0"/>
+              <a:t>)  and paste to the App.js that creates the:</a:t>
+            </a:r>
+          </a:p>
+          <a:p>
+            <a:pPr marL="800100" lvl="1" indent="-342900">
+              <a:buFont typeface="+mj-lt"/>
+              <a:buAutoNum type="alphaLcParenR"/>
+            </a:pPr>
+            <a:r>
+              <a:rPr lang="en-US" dirty="0" smtClean="0"/>
+              <a:t>Title: Parsley’s To Do List</a:t>
+            </a:r>
+          </a:p>
+          <a:p>
+            <a:pPr marL="800100" lvl="1" indent="-342900">
+              <a:buFont typeface="+mj-lt"/>
+              <a:buAutoNum type="alphaLcParenR"/>
+            </a:pPr>
+            <a:r>
+              <a:rPr lang="en-US" dirty="0" smtClean="0"/>
+              <a:t>Input Form:  create </a:t>
+            </a:r>
+            <a:r>
+              <a:rPr lang="en-US" dirty="0" smtClean="0">
+                <a:latin typeface="Courier New" panose="02070309020205020404" pitchFamily="49" charset="0"/>
+                <a:cs typeface="Courier New" panose="02070309020205020404" pitchFamily="49" charset="0"/>
+              </a:rPr>
+              <a:t>&lt;form&gt; </a:t>
+            </a:r>
+            <a:r>
+              <a:rPr lang="en-US" dirty="0" smtClean="0"/>
+              <a:t>element to make a skeleton of an input form user can type.</a:t>
+            </a:r>
+          </a:p>
+          <a:p>
+            <a:pPr marL="800100" lvl="1" indent="-342900">
+              <a:buFont typeface="+mj-lt"/>
+              <a:buAutoNum type="alphaLcParenR"/>
+            </a:pPr>
+            <a:r>
+              <a:rPr lang="en-US" dirty="0" smtClean="0"/>
+              <a:t>Button: create a button </a:t>
+            </a:r>
+            <a:r>
+              <a:rPr lang="en-US" dirty="0" smtClean="0">
+                <a:latin typeface="Courier New" panose="02070309020205020404" pitchFamily="49" charset="0"/>
+                <a:cs typeface="Courier New" panose="02070309020205020404" pitchFamily="49" charset="0"/>
+              </a:rPr>
+              <a:t>type=“submit”.</a:t>
+            </a:r>
+          </a:p>
+          <a:p>
+            <a:pPr marL="800100" lvl="1" indent="-342900">
+              <a:buFont typeface="+mj-lt"/>
+              <a:buAutoNum type="alphaLcParenR"/>
+            </a:pPr>
+            <a:r>
+              <a:rPr lang="en-US" dirty="0" smtClean="0">
+                <a:cs typeface="Arial" panose="020B0604020202020204" pitchFamily="34" charset="0"/>
+              </a:rPr>
+              <a:t>Create three unordered list </a:t>
+            </a:r>
+            <a:r>
+              <a:rPr lang="en-US" dirty="0" smtClean="0">
+                <a:latin typeface="Courier New" panose="02070309020205020404" pitchFamily="49" charset="0"/>
+                <a:cs typeface="Courier New" panose="02070309020205020404" pitchFamily="49" charset="0"/>
+              </a:rPr>
+              <a:t>&lt;</a:t>
+            </a:r>
+            <a:r>
+              <a:rPr lang="en-US" dirty="0" err="1" smtClean="0">
+                <a:latin typeface="Courier New" panose="02070309020205020404" pitchFamily="49" charset="0"/>
+                <a:cs typeface="Courier New" panose="02070309020205020404" pitchFamily="49" charset="0"/>
+              </a:rPr>
+              <a:t>ul</a:t>
+            </a:r>
+            <a:r>
+              <a:rPr lang="en-US" dirty="0" smtClean="0">
+                <a:latin typeface="Courier New" panose="02070309020205020404" pitchFamily="49" charset="0"/>
+                <a:cs typeface="Courier New" panose="02070309020205020404" pitchFamily="49" charset="0"/>
+              </a:rPr>
+              <a:t>&gt; </a:t>
+            </a:r>
+            <a:r>
+              <a:rPr lang="en-US" dirty="0" smtClean="0">
+                <a:cs typeface="Arial" panose="020B0604020202020204" pitchFamily="34" charset="0"/>
+              </a:rPr>
+              <a:t>and </a:t>
+            </a:r>
+            <a:r>
+              <a:rPr lang="en-US" dirty="0" smtClean="0">
+                <a:latin typeface="Courier New" panose="02070309020205020404" pitchFamily="49" charset="0"/>
+                <a:cs typeface="Courier New" panose="02070309020205020404" pitchFamily="49" charset="0"/>
+              </a:rPr>
+              <a:t>&lt;li&gt; </a:t>
+            </a:r>
+            <a:r>
+              <a:rPr lang="en-US" dirty="0" smtClean="0">
+                <a:cs typeface="Arial" panose="020B0604020202020204" pitchFamily="34" charset="0"/>
+              </a:rPr>
+              <a:t>as shown as eat, sleep, and watch birds</a:t>
+            </a:r>
+            <a:r>
+              <a:rPr lang="en-US" dirty="0" smtClean="0">
+                <a:latin typeface="Arial" panose="020B0604020202020204" pitchFamily="34" charset="0"/>
+                <a:cs typeface="Arial" panose="020B0604020202020204" pitchFamily="34" charset="0"/>
+              </a:rPr>
+              <a:t>. </a:t>
+            </a:r>
+          </a:p>
+          <a:p>
+            <a:pPr marL="800100" lvl="1" indent="-342900">
+              <a:buFont typeface="+mj-lt"/>
+              <a:buAutoNum type="alphaLcParenR"/>
+            </a:pPr>
+            <a:r>
+              <a:rPr lang="en-US" dirty="0" smtClean="0">
+                <a:cs typeface="Arial" panose="020B0604020202020204" pitchFamily="34" charset="0"/>
+              </a:rPr>
+              <a:t>Check box is represented by </a:t>
+            </a:r>
+            <a:r>
+              <a:rPr lang="en-US" dirty="0">
+                <a:cs typeface="Arial" panose="020B0604020202020204" pitchFamily="34" charset="0"/>
+              </a:rPr>
+              <a:t> </a:t>
+            </a:r>
+            <a:r>
+              <a:rPr lang="en-US" dirty="0">
+                <a:latin typeface="Courier New" panose="02070309020205020404" pitchFamily="49" charset="0"/>
+                <a:cs typeface="Courier New" panose="02070309020205020404" pitchFamily="49" charset="0"/>
+              </a:rPr>
+              <a:t>&lt;</a:t>
+            </a:r>
+            <a:r>
+              <a:rPr lang="en-US" dirty="0" smtClean="0">
+                <a:latin typeface="Courier New" panose="02070309020205020404" pitchFamily="49" charset="0"/>
+                <a:cs typeface="Courier New" panose="02070309020205020404" pitchFamily="49" charset="0"/>
+              </a:rPr>
+              <a:t>input</a:t>
+            </a:r>
+            <a:r>
+              <a:rPr lang="en-US" dirty="0">
+                <a:latin typeface="Courier New" panose="02070309020205020404" pitchFamily="49" charset="0"/>
+                <a:cs typeface="Courier New" panose="02070309020205020404" pitchFamily="49" charset="0"/>
+              </a:rPr>
+              <a:t> type="checkbox" </a:t>
+            </a:r>
+            <a:r>
+              <a:rPr lang="en-US" dirty="0" err="1">
+                <a:latin typeface="Courier New" panose="02070309020205020404" pitchFamily="49" charset="0"/>
+                <a:cs typeface="Courier New" panose="02070309020205020404" pitchFamily="49" charset="0"/>
+              </a:rPr>
+              <a:t>defaultChecked</a:t>
+            </a:r>
+            <a:r>
+              <a:rPr lang="en-US" dirty="0">
+                <a:latin typeface="Courier New" panose="02070309020205020404" pitchFamily="49" charset="0"/>
+                <a:cs typeface="Courier New" panose="02070309020205020404" pitchFamily="49" charset="0"/>
+              </a:rPr>
+              <a:t>={true} /&gt;</a:t>
+            </a:r>
+          </a:p>
+          <a:p>
+            <a:pPr marL="800100" lvl="1" indent="-342900">
+              <a:buFont typeface="+mj-lt"/>
+              <a:buAutoNum type="alphaLcParenR"/>
+            </a:pPr>
+            <a:r>
+              <a:rPr lang="en-US" dirty="0" smtClean="0">
+                <a:cs typeface="Arial" panose="020B0604020202020204" pitchFamily="34" charset="0"/>
+              </a:rPr>
+              <a:t>Delete button is represented with a button element to remove the specific listed task. </a:t>
+            </a:r>
+            <a:endParaRPr lang="en-US" dirty="0">
+              <a:cs typeface="Arial" panose="020B0604020202020204" pitchFamily="34" charset="0"/>
+            </a:endParaRPr>
+          </a:p>
+          <a:p>
+            <a:pPr lvl="1"/>
+            <a:endParaRPr lang="en-US" dirty="0">
+              <a:cs typeface="Arial" panose="020B0604020202020204" pitchFamily="34" charset="0"/>
+            </a:endParaRPr>
+          </a:p>
+          <a:p>
+            <a:r>
+              <a:rPr lang="en-US" dirty="0" smtClean="0">
+                <a:cs typeface="Arial" panose="020B0604020202020204" pitchFamily="34" charset="0"/>
+              </a:rPr>
+              <a:t>Now App.js component is completed and can be re-used by changing the JSX.</a:t>
+            </a:r>
+          </a:p>
+          <a:p>
+            <a:r>
+              <a:rPr lang="en-US" i="1" dirty="0" smtClean="0">
+                <a:solidFill>
+                  <a:schemeClr val="bg1">
+                    <a:lumMod val="50000"/>
+                  </a:schemeClr>
+                </a:solidFill>
+                <a:cs typeface="Arial" panose="020B0604020202020204" pitchFamily="34" charset="0"/>
+              </a:rPr>
+              <a:t>*Special note, there is accessibility features available for JSX and it starts with</a:t>
+            </a:r>
+            <a:r>
+              <a:rPr lang="en-US" i="1" dirty="0" smtClean="0">
+                <a:solidFill>
+                  <a:schemeClr val="bg1">
+                    <a:lumMod val="50000"/>
+                  </a:schemeClr>
+                </a:solidFill>
+                <a:latin typeface="Courier New" panose="02070309020205020404" pitchFamily="49" charset="0"/>
+                <a:cs typeface="Courier New" panose="02070309020205020404" pitchFamily="49" charset="0"/>
+              </a:rPr>
+              <a:t> aria </a:t>
+            </a:r>
+            <a:r>
+              <a:rPr lang="en-US" i="1" dirty="0" smtClean="0">
+                <a:solidFill>
+                  <a:schemeClr val="bg1">
+                    <a:lumMod val="50000"/>
+                  </a:schemeClr>
+                </a:solidFill>
+                <a:cs typeface="Arial" panose="020B0604020202020204" pitchFamily="34" charset="0"/>
+              </a:rPr>
+              <a:t>(MDN, 2020b)</a:t>
+            </a:r>
+            <a:endParaRPr lang="en-US" i="1" dirty="0">
+              <a:solidFill>
+                <a:schemeClr val="bg1">
+                  <a:lumMod val="50000"/>
+                </a:schemeClr>
+              </a:solidFill>
+              <a:cs typeface="Arial" panose="020B0604020202020204" pitchFamily="34" charset="0"/>
+            </a:endParaRPr>
+          </a:p>
+        </p:txBody>
+      </p:sp>
+    </p:spTree>
+    <p:extLst>
+      <p:ext uri="{BB962C8B-B14F-4D97-AF65-F5344CB8AC3E}">
+        <p14:creationId xmlns:p14="http://schemas.microsoft.com/office/powerpoint/2010/main" val="116127418"/>
+      </p:ext>
+    </p:extLst>
+  </p:cSld>
+  <p:clrMapOvr>
+    <a:masterClrMapping/>
+  </p:clrMapOvr>
+</p:sld>
+</file>
+
+<file path=ppt/slides/slide7.xml><?xml version="1.0" encoding="utf-8"?>
+<p:sld xmlns:a="http://schemas.openxmlformats.org/drawingml/2006/main" xmlns:r="http://schemas.openxmlformats.org/officeDocument/2006/relationships" xmlns:p="http://schemas.openxmlformats.org/presentationml/2006/main">
+  <p:cSld>
+    <p:spTree>
+      <p:nvGrpSpPr>
+        <p:cNvPr id="1" name=""/>
+        <p:cNvGrpSpPr/>
+        <p:nvPr/>
+      </p:nvGrpSpPr>
+      <p:grpSpPr>
+        <a:xfrm>
+          <a:off x="0" y="0"/>
+          <a:ext cx="0" cy="0"/>
+          <a:chOff x="0" y="0"/>
+          <a:chExt cx="0" cy="0"/>
+        </a:xfrm>
+      </p:grpSpPr>
+      <p:sp>
+        <p:nvSpPr>
+          <p:cNvPr id="2" name="Title 1"/>
+          <p:cNvSpPr>
+            <a:spLocks noGrp="1"/>
+          </p:cNvSpPr>
+          <p:nvPr>
+            <p:ph type="title"/>
+          </p:nvPr>
+        </p:nvSpPr>
+        <p:spPr>
+          <a:xfrm>
+            <a:off x="5051897" y="360598"/>
+            <a:ext cx="6621294" cy="534348"/>
+          </a:xfrm>
+          <a:solidFill>
+            <a:schemeClr val="accent1">
+              <a:lumMod val="40000"/>
+              <a:lumOff val="60000"/>
+            </a:schemeClr>
+          </a:solidFill>
+        </p:spPr>
+        <p:txBody>
+          <a:bodyPr>
+            <a:normAutofit fontScale="90000"/>
+          </a:bodyPr>
+          <a:lstStyle/>
+          <a:p>
+            <a:r>
+              <a:rPr lang="en-US" sz="3600" dirty="0" smtClean="0"/>
+              <a:t>Step 2: </a:t>
+            </a:r>
+            <a:r>
+              <a:rPr lang="en-US" sz="3600" b="1" dirty="0"/>
+              <a:t>Input Form Component</a:t>
+            </a:r>
+            <a:r>
+              <a:rPr lang="en-US" sz="3600" dirty="0" smtClean="0"/>
+              <a:t> </a:t>
+            </a:r>
+            <a:endParaRPr lang="en-US" sz="3600" dirty="0"/>
+          </a:p>
+        </p:txBody>
+      </p:sp>
+      <p:pic>
+        <p:nvPicPr>
+          <p:cNvPr id="4" name="Content Placeholder 3"/>
+          <p:cNvPicPr>
+            <a:picLocks noGrp="1" noChangeAspect="1"/>
+          </p:cNvPicPr>
+          <p:nvPr>
+            <p:ph idx="1"/>
+          </p:nvPr>
+        </p:nvPicPr>
+        <p:blipFill>
+          <a:blip r:embed="rId2">
+            <a:extLst>
+              <a:ext uri="{28A0092B-C50C-407E-A947-70E740481C1C}">
+                <a14:useLocalDpi xmlns:a14="http://schemas.microsoft.com/office/drawing/2010/main" val="0"/>
+              </a:ext>
+            </a:extLst>
+          </a:blip>
+          <a:stretch>
+            <a:fillRect/>
+          </a:stretch>
+        </p:blipFill>
+        <p:spPr>
+          <a:xfrm>
             <a:off x="488651" y="365124"/>
             <a:ext cx="4290535" cy="5147215"/>
           </a:xfrm>
@@ -5050,7 +6748,7 @@
         </p:nvSpPr>
         <p:spPr>
           <a:xfrm>
-            <a:off x="5069711" y="1177366"/>
+            <a:off x="5051897" y="985736"/>
             <a:ext cx="6603480" cy="646331"/>
           </a:xfrm>
           <a:prstGeom prst="rect">
@@ -5069,7 +6767,19 @@
             </a:pPr>
             <a:r>
               <a:rPr lang="en-US" dirty="0" smtClean="0"/>
-              <a:t>User input task such as “eat”, “sleep”, “grooming”, etc. </a:t>
+              <a:t>User </a:t>
+            </a:r>
+            <a:r>
+              <a:rPr lang="en-US" dirty="0" err="1" smtClean="0"/>
+              <a:t>nput</a:t>
+            </a:r>
+            <a:r>
+              <a:rPr lang="en-US" dirty="0" smtClean="0"/>
+              <a:t> </a:t>
+            </a:r>
+            <a:r>
+              <a:rPr lang="en-US" dirty="0" smtClean="0"/>
+              <a:t>task such as “eat”, “sleep”, “grooming”, etc. </a:t>
             </a:r>
           </a:p>
           <a:p>
@@ -5185,7 +6895,7 @@
 </p:sld>
 </file>
 
-<file path=ppt/slides/slide7.xml><?xml version="1.0" encoding="utf-8"?>
+<file path=ppt/slides/slide8.xml><?xml version="1.0" encoding="utf-8"?>
 <p:sld xmlns:a="http://schemas.openxmlformats.org/drawingml/2006/main" xmlns:r="http://schemas.openxmlformats.org/officeDocument/2006/relationships" xmlns:p="http://schemas.openxmlformats.org/presentationml/2006/main">
   <p:cSld>
     <p:spTree>

</xml_diff>

<commit_message>
removed wanted README.md and replaced it with references
</commit_message>
<xml_diff>
--- a/To-Do-App-Illustrations/React To-Do Planning Assignment.pptx
+++ b/To-Do-App-Illustrations/React To-Do Planning Assignment.pptx
@@ -3324,19 +3324,15 @@
             <a:pPr algn="just"/>
             <a:r>
               <a:rPr lang="en-US" sz="1600" b="1" dirty="0" smtClean="0"/>
-              <a:t>The Main Container of To-Do Task </a:t>
+              <a:t>1. The </a:t>
             </a:r>
             <a:r>
               <a:rPr lang="en-US" sz="1600" b="1" dirty="0" smtClean="0"/>
-              <a:t>Component –</a:t>
+              <a:t>Main Container of To-Do Task Component –</a:t>
             </a:r>
             <a:r>
               <a:rPr lang="en-US" sz="1600" dirty="0" smtClean="0"/>
-              <a:t>  </a:t>
-            </a:r>
-            <a:r>
-              <a:rPr lang="en-US" sz="1600" dirty="0" smtClean="0"/>
-              <a:t>This container component will show page for the user. This container include components: input task form, add task button, task list, delete buttons (</a:t>
+              <a:t>  This container component will show page for the user. This container include components: input task form, add task button, task list, delete buttons (</a:t>
             </a:r>
             <a:r>
               <a:rPr lang="en-US" sz="1600" dirty="0" err="1" smtClean="0"/>
@@ -3415,7 +3411,11 @@
             <a:pPr algn="just"/>
             <a:r>
               <a:rPr lang="en-US" sz="1600" b="1" dirty="0" smtClean="0"/>
-              <a:t>Input Form Component – </a:t>
+              <a:t>2. Input </a:t>
+            </a:r>
+            <a:r>
+              <a:rPr lang="en-US" sz="1600" b="1" dirty="0" smtClean="0"/>
+              <a:t>Form Component – </a:t>
             </a:r>
             <a:r>
               <a:rPr lang="en-US" sz="1600" dirty="0" smtClean="0"/>
@@ -3710,7 +3710,11 @@
             <a:pPr algn="just"/>
             <a:r>
               <a:rPr lang="en-US" sz="1600" b="1" dirty="0" smtClean="0"/>
-              <a:t>To-Do Component – </a:t>
+              <a:t>3. To-Do </a:t>
+            </a:r>
+            <a:r>
+              <a:rPr lang="en-US" sz="1600" b="1" dirty="0" smtClean="0"/>
+              <a:t>Component – </a:t>
             </a:r>
             <a:r>
               <a:rPr lang="en-US" sz="1600" dirty="0" smtClean="0"/>
@@ -3885,7 +3889,11 @@
             <a:pPr algn="just"/>
             <a:r>
               <a:rPr lang="en-US" sz="1600" b="1" dirty="0" smtClean="0"/>
-              <a:t>To-Do List Component: </a:t>
+              <a:t>4. To-Do </a:t>
+            </a:r>
+            <a:r>
+              <a:rPr lang="en-US" sz="1600" b="1" dirty="0" smtClean="0"/>
+              <a:t>List Component: </a:t>
             </a:r>
           </a:p>
           <a:p>
@@ -3895,11 +3903,7 @@
             </a:pPr>
             <a:r>
               <a:rPr lang="en-US" sz="1600" dirty="0" smtClean="0"/>
-              <a:t>The “Delete” property is an event handler that will be called when the item is clicked. The purpose is to delete a task when it is click</a:t>
-            </a:r>
-            <a:r>
-              <a:rPr lang="en-US" sz="1600" dirty="0" smtClean="0"/>
-              <a:t>. (</a:t>
+              <a:t>The “Delete” property is an event handler that will be called when the item is clicked. The purpose is to delete a task when it is click. (</a:t>
             </a:r>
             <a:r>
               <a:rPr lang="en-US" sz="1600" dirty="0" err="1" smtClean="0"/>
@@ -4057,7 +4061,11 @@
           <a:p>
             <a:r>
               <a:rPr lang="en-US" sz="1600" b="1" dirty="0" smtClean="0"/>
-              <a:t>Completed Component </a:t>
+              <a:t>5. Completed </a:t>
+            </a:r>
+            <a:r>
+              <a:rPr lang="en-US" sz="1600" b="1" dirty="0" smtClean="0"/>
+              <a:t>Component </a:t>
             </a:r>
             <a:r>
               <a:rPr lang="en-US" sz="1600" dirty="0" smtClean="0"/>
@@ -5955,13 +5963,7 @@
               <a:rPr lang="en-US" sz="2000" dirty="0" smtClean="0">
                 <a:cs typeface="Courier New" panose="02070309020205020404" pitchFamily="49" charset="0"/>
               </a:rPr>
-              <a:t>Pre-project house keeping. </a:t>
-            </a:r>
-            <a:r>
-              <a:rPr lang="en-US" sz="2000" dirty="0" smtClean="0">
-                <a:cs typeface="Courier New" panose="02070309020205020404" pitchFamily="49" charset="0"/>
-              </a:rPr>
-              <a:t>Remove </a:t>
+              <a:t>Pre-project house keeping. Remove </a:t>
             </a:r>
             <a:r>
               <a:rPr lang="en-US" sz="2000" dirty="0" smtClean="0">
@@ -5995,19 +5997,19 @@
               <a:rPr lang="en-US" sz="2000" dirty="0" smtClean="0">
                 <a:cs typeface="Courier New" panose="02070309020205020404" pitchFamily="49" charset="0"/>
               </a:rPr>
-              <a:t>because we’re doing testing. </a:t>
+              <a:t>because </a:t>
             </a:r>
             <a:r>
               <a:rPr lang="en-US" sz="2000" dirty="0" smtClean="0">
                 <a:cs typeface="Courier New" panose="02070309020205020404" pitchFamily="49" charset="0"/>
               </a:rPr>
-              <a:t>Additionally, we also removed the unrelated links to styles sheet and script sheet</a:t>
+              <a:t>we are not doing any </a:t>
             </a:r>
             <a:r>
               <a:rPr lang="en-US" sz="2000" dirty="0" smtClean="0">
                 <a:cs typeface="Courier New" panose="02070309020205020404" pitchFamily="49" charset="0"/>
               </a:rPr>
-              <a:t>.</a:t>
+              <a:t>testing. Additionally, we also removed the unrelated links to styles sheet and script sheet.</a:t>
             </a:r>
           </a:p>
           <a:p>
@@ -6018,13 +6020,7 @@
               <a:rPr lang="en-US" sz="2000" dirty="0" smtClean="0">
                 <a:cs typeface="Courier New" panose="02070309020205020404" pitchFamily="49" charset="0"/>
               </a:rPr>
-              <a:t>Assume the design department has handed in their stylesheet index.css sheet in time for me to append th</a:t>
-            </a:r>
-            <a:r>
-              <a:rPr lang="en-US" sz="2000" dirty="0" smtClean="0">
-                <a:cs typeface="Courier New" panose="02070309020205020404" pitchFamily="49" charset="0"/>
-              </a:rPr>
-              <a:t>e </a:t>
+              <a:t>Assume the design department has handed in their stylesheet index.css sheet in time for me to append the </a:t>
             </a:r>
             <a:r>
               <a:rPr lang="en-US" sz="2000" dirty="0" smtClean="0">
@@ -6050,7 +6046,69 @@
               <a:rPr lang="en-US" sz="2000" dirty="0" smtClean="0">
                 <a:cs typeface="Courier New" panose="02070309020205020404" pitchFamily="49" charset="0"/>
               </a:rPr>
-              <a:t>. Review, react to find that we have a functional looking web that is pleasing to the eye. </a:t>
+              <a:t>. </a:t>
+            </a:r>
+            <a:endParaRPr lang="en-US" sz="2000" dirty="0" smtClean="0">
+              <a:cs typeface="Courier New" panose="02070309020205020404" pitchFamily="49" charset="0"/>
+            </a:endParaRPr>
+          </a:p>
+          <a:p>
+            <a:pPr marL="514350" indent="-514350">
+              <a:buAutoNum type="arabicPeriod"/>
+            </a:pPr>
+            <a:r>
+              <a:rPr lang="en-US" sz="2000" dirty="0" smtClean="0">
+                <a:cs typeface="Courier New" panose="02070309020205020404" pitchFamily="49" charset="0"/>
+              </a:rPr>
+              <a:t>Make component folder to store all the components we are making for </a:t>
+            </a:r>
+            <a:r>
+              <a:rPr lang="en-US" sz="2000" b="1" dirty="0"/>
+              <a:t>1. The Main Container of To-Do Task </a:t>
+            </a:r>
+            <a:r>
+              <a:rPr lang="en-US" sz="2000" b="1" dirty="0" smtClean="0"/>
+              <a:t>Component, </a:t>
+            </a:r>
+            <a:r>
+              <a:rPr lang="en-US" sz="2000" b="1" dirty="0"/>
+              <a:t>2. Input Form </a:t>
+            </a:r>
+            <a:r>
+              <a:rPr lang="en-US" sz="2000" b="1" dirty="0" smtClean="0"/>
+              <a:t>Component, </a:t>
+            </a:r>
+            <a:r>
+              <a:rPr lang="en-US" sz="2000" b="1" dirty="0"/>
+              <a:t>3. To-Do </a:t>
+            </a:r>
+            <a:r>
+              <a:rPr lang="en-US" sz="2000" b="1" dirty="0" smtClean="0"/>
+              <a:t>Component, </a:t>
+            </a:r>
+            <a:r>
+              <a:rPr lang="en-US" sz="2000" b="1" dirty="0"/>
+              <a:t>4. To-Do List </a:t>
+            </a:r>
+            <a:r>
+              <a:rPr lang="en-US" sz="2000" b="1" dirty="0" smtClean="0"/>
+              <a:t>Component, </a:t>
+            </a:r>
+            <a:r>
+              <a:rPr lang="en-US" sz="2000" dirty="0" smtClean="0"/>
+              <a:t>and</a:t>
+            </a:r>
+            <a:r>
+              <a:rPr lang="en-US" sz="2000" b="1" dirty="0" smtClean="0"/>
+              <a:t> </a:t>
+            </a:r>
+            <a:r>
+              <a:rPr lang="en-US" sz="2000" b="1" dirty="0"/>
+              <a:t>5. Completed </a:t>
+            </a:r>
+            <a:r>
+              <a:rPr lang="en-US" sz="2000" b="1" dirty="0" smtClean="0"/>
+              <a:t>Component. </a:t>
             </a:r>
             <a:endParaRPr lang="en-US" sz="2000" dirty="0" smtClean="0">
               <a:cs typeface="Courier New" panose="02070309020205020404" pitchFamily="49" charset="0"/>
@@ -6136,11 +6194,7 @@
           <a:p>
             <a:r>
               <a:rPr lang="en-US" dirty="0" smtClean="0"/>
-              <a:t>How Each </a:t>
-            </a:r>
-            <a:r>
-              <a:rPr lang="en-US" dirty="0" smtClean="0"/>
-              <a:t>Components will Function</a:t>
+              <a:t>How Each Components will Function</a:t>
             </a:r>
             <a:endParaRPr lang="en-US" dirty="0"/>
           </a:p>
@@ -6680,7 +6734,7 @@
         <p:spPr>
           <a:xfrm>
             <a:off x="5051897" y="360598"/>
-            <a:ext cx="6621294" cy="534348"/>
+            <a:ext cx="6621294" cy="928706"/>
           </a:xfrm>
           <a:solidFill>
             <a:schemeClr val="accent1">
@@ -6700,12 +6754,12 @@
               <a:t>Step 2: </a:t>
             </a:r>
             <a:r>
-              <a:rPr lang="en-US" sz="3600" b="1" dirty="0"/>
-              <a:t>Input Form Component</a:t>
+              <a:rPr lang="en-US" sz="3600" dirty="0"/>
+              <a:t>Input Form </a:t>
             </a:r>
             <a:r>
               <a:rPr lang="en-US" sz="3600" dirty="0" smtClean="0"/>
-              <a:t> </a:t>
+              <a:t>Component (MDN, 2020b) </a:t>
             </a:r>
             <a:endParaRPr lang="en-US" sz="3600" dirty="0"/>
           </a:p>
@@ -6748,7 +6802,7 @@
         </p:nvSpPr>
         <p:spPr>
           <a:xfrm>
-            <a:off x="5051897" y="985736"/>
+            <a:off x="5069711" y="1461329"/>
             <a:ext cx="6603480" cy="646331"/>
           </a:xfrm>
           <a:prstGeom prst="rect">
@@ -6775,11 +6829,7 @@
             </a:r>
             <a:r>
               <a:rPr lang="en-US" dirty="0" smtClean="0"/>
-              <a:t> </a:t>
-            </a:r>
-            <a:r>
-              <a:rPr lang="en-US" dirty="0" smtClean="0"/>
-              <a:t>task such as “eat”, “sleep”, “grooming”, etc. </a:t>
+              <a:t> task such as “eat”, “sleep”, “grooming”, etc. </a:t>
             </a:r>
           </a:p>
           <a:p>

</xml_diff>

<commit_message>
added class for component ToDo
</commit_message>
<xml_diff>
--- a/To-Do-App-Illustrations/React To-Do Planning Assignment.pptx
+++ b/To-Do-App-Illustrations/React To-Do Planning Assignment.pptx
@@ -250,7 +250,7 @@
           <a:p>
             <a:fld id="{7A40D1A2-F279-4CFB-A54D-D545C0507DCD}" type="datetimeFigureOut">
               <a:rPr lang="en-US" smtClean="0"/>
-              <a:t>7/25/2020</a:t>
+              <a:t>7/26/2020</a:t>
             </a:fld>
             <a:endParaRPr lang="en-US"/>
           </a:p>
@@ -420,7 +420,7 @@
           <a:p>
             <a:fld id="{7A40D1A2-F279-4CFB-A54D-D545C0507DCD}" type="datetimeFigureOut">
               <a:rPr lang="en-US" smtClean="0"/>
-              <a:t>7/25/2020</a:t>
+              <a:t>7/26/2020</a:t>
             </a:fld>
             <a:endParaRPr lang="en-US"/>
           </a:p>
@@ -600,7 +600,7 @@
           <a:p>
             <a:fld id="{7A40D1A2-F279-4CFB-A54D-D545C0507DCD}" type="datetimeFigureOut">
               <a:rPr lang="en-US" smtClean="0"/>
-              <a:t>7/25/2020</a:t>
+              <a:t>7/26/2020</a:t>
             </a:fld>
             <a:endParaRPr lang="en-US"/>
           </a:p>
@@ -770,7 +770,7 @@
           <a:p>
             <a:fld id="{7A40D1A2-F279-4CFB-A54D-D545C0507DCD}" type="datetimeFigureOut">
               <a:rPr lang="en-US" smtClean="0"/>
-              <a:t>7/25/2020</a:t>
+              <a:t>7/26/2020</a:t>
             </a:fld>
             <a:endParaRPr lang="en-US"/>
           </a:p>
@@ -1016,7 +1016,7 @@
           <a:p>
             <a:fld id="{7A40D1A2-F279-4CFB-A54D-D545C0507DCD}" type="datetimeFigureOut">
               <a:rPr lang="en-US" smtClean="0"/>
-              <a:t>7/25/2020</a:t>
+              <a:t>7/26/2020</a:t>
             </a:fld>
             <a:endParaRPr lang="en-US"/>
           </a:p>
@@ -1248,7 +1248,7 @@
           <a:p>
             <a:fld id="{7A40D1A2-F279-4CFB-A54D-D545C0507DCD}" type="datetimeFigureOut">
               <a:rPr lang="en-US" smtClean="0"/>
-              <a:t>7/25/2020</a:t>
+              <a:t>7/26/2020</a:t>
             </a:fld>
             <a:endParaRPr lang="en-US"/>
           </a:p>
@@ -1615,7 +1615,7 @@
           <a:p>
             <a:fld id="{7A40D1A2-F279-4CFB-A54D-D545C0507DCD}" type="datetimeFigureOut">
               <a:rPr lang="en-US" smtClean="0"/>
-              <a:t>7/25/2020</a:t>
+              <a:t>7/26/2020</a:t>
             </a:fld>
             <a:endParaRPr lang="en-US"/>
           </a:p>
@@ -1733,7 +1733,7 @@
           <a:p>
             <a:fld id="{7A40D1A2-F279-4CFB-A54D-D545C0507DCD}" type="datetimeFigureOut">
               <a:rPr lang="en-US" smtClean="0"/>
-              <a:t>7/25/2020</a:t>
+              <a:t>7/26/2020</a:t>
             </a:fld>
             <a:endParaRPr lang="en-US"/>
           </a:p>
@@ -1828,7 +1828,7 @@
           <a:p>
             <a:fld id="{7A40D1A2-F279-4CFB-A54D-D545C0507DCD}" type="datetimeFigureOut">
               <a:rPr lang="en-US" smtClean="0"/>
-              <a:t>7/25/2020</a:t>
+              <a:t>7/26/2020</a:t>
             </a:fld>
             <a:endParaRPr lang="en-US"/>
           </a:p>
@@ -2105,7 +2105,7 @@
           <a:p>
             <a:fld id="{7A40D1A2-F279-4CFB-A54D-D545C0507DCD}" type="datetimeFigureOut">
               <a:rPr lang="en-US" smtClean="0"/>
-              <a:t>7/25/2020</a:t>
+              <a:t>7/26/2020</a:t>
             </a:fld>
             <a:endParaRPr lang="en-US"/>
           </a:p>
@@ -2358,7 +2358,7 @@
           <a:p>
             <a:fld id="{7A40D1A2-F279-4CFB-A54D-D545C0507DCD}" type="datetimeFigureOut">
               <a:rPr lang="en-US" smtClean="0"/>
-              <a:t>7/25/2020</a:t>
+              <a:t>7/26/2020</a:t>
             </a:fld>
             <a:endParaRPr lang="en-US"/>
           </a:p>
@@ -2571,7 +2571,7 @@
           <a:p>
             <a:fld id="{7A40D1A2-F279-4CFB-A54D-D545C0507DCD}" type="datetimeFigureOut">
               <a:rPr lang="en-US" smtClean="0"/>
-              <a:t>7/25/2020</a:t>
+              <a:t>7/26/2020</a:t>
             </a:fld>
             <a:endParaRPr lang="en-US"/>
           </a:p>
@@ -3045,7 +3045,7 @@
         <p:spPr>
           <a:xfrm>
             <a:off x="5512280" y="1199570"/>
-            <a:ext cx="5753817" cy="3416320"/>
+            <a:ext cx="5753817" cy="4801314"/>
           </a:xfrm>
           <a:prstGeom prst="rect">
             <a:avLst/>
@@ -3189,6 +3189,48 @@
               </a:rPr>
               <a:t>delete any task using mouse/keyboard. </a:t>
             </a:r>
+            <a:endParaRPr lang="en-US" dirty="0">
+              <a:cs typeface="Courier New" panose="02070309020205020404" pitchFamily="49" charset="0"/>
+            </a:endParaRPr>
+          </a:p>
+          <a:p>
+            <a:pPr marL="285750" indent="-285750">
+              <a:buFont typeface="Arial" panose="020B0604020202020204" pitchFamily="34" charset="0"/>
+              <a:buChar char="•"/>
+            </a:pPr>
+            <a:r>
+              <a:rPr lang="en-US" dirty="0" smtClean="0">
+                <a:cs typeface="Courier New" panose="02070309020205020404" pitchFamily="49" charset="0"/>
+              </a:rPr>
+              <a:t>It is important to consider that </a:t>
+            </a:r>
+            <a:r>
+              <a:rPr lang="en-US" i="1" dirty="0" smtClean="0">
+                <a:cs typeface="Courier New" panose="02070309020205020404" pitchFamily="49" charset="0"/>
+              </a:rPr>
+              <a:t>React is beginning to move away from classes, instead using functions to construct components</a:t>
+            </a:r>
+            <a:r>
+              <a:rPr lang="en-US" dirty="0" smtClean="0">
+                <a:cs typeface="Courier New" panose="02070309020205020404" pitchFamily="49" charset="0"/>
+              </a:rPr>
+              <a:t> (Banks, 2020).</a:t>
+            </a:r>
+          </a:p>
+          <a:p>
+            <a:pPr marL="742950" lvl="1" indent="-285750">
+              <a:buFont typeface="Arial" panose="020B0604020202020204" pitchFamily="34" charset="0"/>
+              <a:buChar char="•"/>
+            </a:pPr>
+            <a:r>
+              <a:rPr lang="en-US" dirty="0" smtClean="0">
+                <a:cs typeface="Courier New" panose="02070309020205020404" pitchFamily="49" charset="0"/>
+              </a:rPr>
+              <a:t>Therefore for this assignment, I will only focus on classes based on Ulrich teaching (Ulrich, 2020).</a:t>
+            </a:r>
+            <a:endParaRPr lang="en-US" dirty="0" smtClean="0">
+              <a:cs typeface="Courier New" panose="02070309020205020404" pitchFamily="49" charset="0"/>
+            </a:endParaRPr>
           </a:p>
         </p:txBody>
       </p:sp>
@@ -3275,7 +3317,10 @@
               <a:t>Install </a:t>
             </a:r>
             <a:r>
-              <a:rPr lang="en-US" sz="2000" dirty="0" err="1" smtClean="0"/>
+              <a:rPr lang="en-US" sz="2000" dirty="0" err="1" smtClean="0">
+                <a:latin typeface="Courier New" panose="02070309020205020404" pitchFamily="49" charset="0"/>
+                <a:cs typeface="Courier New" panose="02070309020205020404" pitchFamily="49" charset="0"/>
+              </a:rPr>
               <a:t>npm</a:t>
             </a:r>
             <a:r>
@@ -3334,33 +3379,16 @@
               <a:buAutoNum type="arabicPeriod"/>
             </a:pPr>
             <a:r>
-              <a:rPr lang="en-US" sz="2000" dirty="0" smtClean="0"/>
-              <a:t>Initialize </a:t>
-            </a:r>
-            <a:r>
-              <a:rPr lang="en-US" sz="2000" dirty="0" err="1" smtClean="0">
-                <a:latin typeface="Courier New" panose="02070309020205020404" pitchFamily="49" charset="0"/>
-                <a:cs typeface="Courier New" panose="02070309020205020404" pitchFamily="49" charset="0"/>
-              </a:rPr>
-              <a:t>npm</a:t>
-            </a:r>
-            <a:r>
-              <a:rPr lang="en-US" sz="2000" dirty="0" smtClean="0">
-                <a:latin typeface="Courier New" panose="02070309020205020404" pitchFamily="49" charset="0"/>
-                <a:cs typeface="Courier New" panose="02070309020205020404" pitchFamily="49" charset="0"/>
-              </a:rPr>
-              <a:t> start.</a:t>
-            </a:r>
-          </a:p>
-          <a:p>
-            <a:pPr marL="514350" indent="-514350">
-              <a:buAutoNum type="arabicPeriod"/>
-            </a:pPr>
-            <a:r>
               <a:rPr lang="en-US" sz="2000" dirty="0" smtClean="0">
                 <a:cs typeface="Courier New" panose="02070309020205020404" pitchFamily="49" charset="0"/>
               </a:rPr>
-              <a:t>Review app.js and understand </a:t>
+              <a:t>Review </a:t>
+            </a:r>
+            <a:r>
+              <a:rPr lang="en-US" sz="2000" dirty="0" smtClean="0">
+                <a:cs typeface="Courier New" panose="02070309020205020404" pitchFamily="49" charset="0"/>
+              </a:rPr>
+              <a:t>app.js and understand </a:t>
             </a:r>
             <a:r>
               <a:rPr lang="en-US" sz="2000" dirty="0" smtClean="0">
@@ -3479,7 +3507,13 @@
               <a:rPr lang="en-US" sz="2000" dirty="0" smtClean="0">
                 <a:cs typeface="Courier New" panose="02070309020205020404" pitchFamily="49" charset="0"/>
               </a:rPr>
-              <a:t>Make component folder to store all the components we are making for </a:t>
+              <a:t>Make component folder to store all the components we are </a:t>
+            </a:r>
+            <a:r>
+              <a:rPr lang="en-US" sz="2000" dirty="0" smtClean="0">
+                <a:cs typeface="Courier New" panose="02070309020205020404" pitchFamily="49" charset="0"/>
+              </a:rPr>
+              <a:t>making: </a:t>
             </a:r>
             <a:r>
               <a:rPr lang="en-US" sz="2000" b="1" dirty="0"/>
@@ -3529,14 +3563,6 @@
               <a:rPr lang="en-US" sz="2000" b="1" dirty="0" smtClean="0"/>
               <a:t>Component. </a:t>
             </a:r>
-            <a:endParaRPr lang="en-US" sz="2000" dirty="0" smtClean="0">
-              <a:cs typeface="Courier New" panose="02070309020205020404" pitchFamily="49" charset="0"/>
-            </a:endParaRPr>
-          </a:p>
-          <a:p>
-            <a:pPr marL="514350" indent="-514350">
-              <a:buAutoNum type="arabicPeriod"/>
-            </a:pPr>
             <a:endParaRPr lang="en-US" sz="2000" dirty="0" smtClean="0">
               <a:cs typeface="Courier New" panose="02070309020205020404" pitchFamily="49" charset="0"/>
             </a:endParaRPr>
@@ -3778,7 +3804,27 @@
             </a:r>
             <a:r>
               <a:rPr lang="en-US" sz="1600" dirty="0" smtClean="0"/>
-              <a:t>This should allow user to input task. This contain functional components to just receive props as arguments and return JSX to be rendered. This component will only have one prop to handle the click event for adding a new to-do  (</a:t>
+              <a:t>This should allow user to input task. This contain </a:t>
+            </a:r>
+            <a:r>
+              <a:rPr lang="en-US" sz="1600" dirty="0" smtClean="0"/>
+              <a:t>class component</a:t>
+            </a:r>
+            <a:r>
+              <a:rPr lang="en-US" sz="1600" dirty="0" smtClean="0"/>
+              <a:t> </a:t>
+            </a:r>
+            <a:r>
+              <a:rPr lang="en-US" sz="1600" dirty="0" smtClean="0"/>
+              <a:t>to just receive </a:t>
+            </a:r>
+            <a:r>
+              <a:rPr lang="en-US" sz="1600" dirty="0" smtClean="0"/>
+              <a:t>props </a:t>
+            </a:r>
+            <a:r>
+              <a:rPr lang="en-US" sz="1600" dirty="0" smtClean="0"/>
+              <a:t>and return JSX to be rendered. This component will only have one prop to handle the click event for adding a new to-do  (</a:t>
             </a:r>
             <a:r>
               <a:rPr lang="en-US" sz="1600" dirty="0" err="1" smtClean="0"/>
@@ -4047,7 +4093,7 @@
         </p:nvSpPr>
         <p:spPr>
           <a:xfrm>
-            <a:off x="5823623" y="2857093"/>
+            <a:off x="5823623" y="2893016"/>
             <a:ext cx="6186791" cy="584775"/>
           </a:xfrm>
           <a:prstGeom prst="rect">
@@ -4106,8 +4152,8 @@
         </p:nvCxnSpPr>
         <p:spPr>
           <a:xfrm flipV="1">
-            <a:off x="5155660" y="3149481"/>
-            <a:ext cx="667963" cy="738341"/>
+            <a:off x="5155660" y="3185404"/>
+            <a:ext cx="667963" cy="702418"/>
           </a:xfrm>
           <a:prstGeom prst="bentConnector3">
             <a:avLst/>
@@ -6716,15 +6762,15 @@
           <a:p>
             <a:r>
               <a:rPr lang="en-US" sz="3600" dirty="0" smtClean="0"/>
-              <a:t>Step 2: </a:t>
-            </a:r>
-            <a:r>
-              <a:rPr lang="en-US" sz="3600" dirty="0"/>
-              <a:t>Input Form </a:t>
+              <a:t>Step </a:t>
             </a:r>
             <a:r>
               <a:rPr lang="en-US" sz="3600" dirty="0" smtClean="0"/>
-              <a:t>Component (MDN, 2020b) </a:t>
+              <a:t>3: To-Do Component (MDN</a:t>
+            </a:r>
+            <a:r>
+              <a:rPr lang="en-US" sz="3600" dirty="0" smtClean="0"/>
+              <a:t>, 2020b) </a:t>
             </a:r>
             <a:endParaRPr lang="en-US" sz="3600" dirty="0"/>
           </a:p>
@@ -6768,7 +6814,7 @@
         <p:spPr>
           <a:xfrm>
             <a:off x="5069711" y="1461329"/>
-            <a:ext cx="6603480" cy="646331"/>
+            <a:ext cx="6603480" cy="1477328"/>
           </a:xfrm>
           <a:prstGeom prst="rect">
             <a:avLst/>
@@ -6786,21 +6832,27 @@
             </a:pPr>
             <a:r>
               <a:rPr lang="en-US" dirty="0" smtClean="0"/>
-              <a:t>User </a:t>
-            </a:r>
-            <a:r>
-              <a:rPr lang="en-US" dirty="0" err="1" smtClean="0"/>
-              <a:t>nput</a:t>
-            </a:r>
-            <a:r>
-              <a:rPr lang="en-US" dirty="0" smtClean="0"/>
-              <a:t> task such as “eat”, “sleep”, “grooming”, etc. </a:t>
+              <a:t>All components are required to use import React from “react” in the global or at the top most line in the code. </a:t>
             </a:r>
           </a:p>
           <a:p>
             <a:pPr marL="342900" indent="-342900">
               <a:buAutoNum type="arabicPeriod"/>
             </a:pPr>
+            <a:r>
+              <a:rPr lang="en-US" dirty="0" smtClean="0"/>
+              <a:t>Create a component called ToDo.js. Within ToDo.js, we will create a class to generate a To-Do list component. </a:t>
+            </a:r>
+            <a:endParaRPr lang="en-US" dirty="0"/>
+          </a:p>
+          <a:p>
+            <a:pPr marL="342900" indent="-342900">
+              <a:buAutoNum type="arabicPeriod"/>
+            </a:pPr>
+            <a:r>
+              <a:rPr lang="en-US" dirty="0" smtClean="0"/>
+              <a:t>Pseudocode as follows:</a:t>
+            </a:r>
             <a:endParaRPr lang="en-US" dirty="0" smtClean="0"/>
           </a:p>
         </p:txBody>
@@ -6813,8 +6865,8 @@
         </p:nvSpPr>
         <p:spPr>
           <a:xfrm>
-            <a:off x="779177" y="1546698"/>
-            <a:ext cx="3709481" cy="560962"/>
+            <a:off x="642939" y="2728912"/>
+            <a:ext cx="3900486" cy="1214437"/>
           </a:xfrm>
           <a:prstGeom prst="rect">
             <a:avLst/>
@@ -6851,52 +6903,47 @@
           </a:p>
         </p:txBody>
       </p:sp>
-      <p:sp>
-        <p:nvSpPr>
-          <p:cNvPr id="8" name="Rectangle 7"/>
-          <p:cNvSpPr/>
+      <p:cxnSp>
+        <p:nvCxnSpPr>
+          <p:cNvPr id="7" name="Elbow Connector 6"/>
+          <p:cNvCxnSpPr>
+            <a:stCxn id="6" idx="3"/>
+            <a:endCxn id="2" idx="1"/>
+          </p:cNvCxnSpPr>
           <p:nvPr/>
-        </p:nvSpPr>
-        <p:spPr>
-          <a:xfrm>
-            <a:off x="779176" y="985736"/>
-            <a:ext cx="3709481" cy="560962"/>
-          </a:xfrm>
-          <a:prstGeom prst="rect">
-            <a:avLst/>
-          </a:prstGeom>
-          <a:noFill/>
+        </p:nvCxnSpPr>
+        <p:spPr>
+          <a:xfrm flipV="1">
+            <a:off x="4543425" y="824951"/>
+            <a:ext cx="508472" cy="2511180"/>
+          </a:xfrm>
+          <a:prstGeom prst="bentConnector3">
+            <a:avLst>
+              <a:gd name="adj1" fmla="val 50000"/>
+            </a:avLst>
+          </a:prstGeom>
           <a:ln>
             <a:solidFill>
-              <a:schemeClr val="accent1"/>
+              <a:schemeClr val="tx1"/>
             </a:solidFill>
+            <a:tailEnd type="triangle"/>
           </a:ln>
         </p:spPr>
         <p:style>
-          <a:lnRef idx="2">
-            <a:schemeClr val="accent1">
-              <a:shade val="50000"/>
-            </a:schemeClr>
+          <a:lnRef idx="1">
+            <a:schemeClr val="accent1"/>
           </a:lnRef>
-          <a:fillRef idx="1">
+          <a:fillRef idx="0">
             <a:schemeClr val="accent1"/>
           </a:fillRef>
           <a:effectRef idx="0">
             <a:schemeClr val="accent1"/>
           </a:effectRef>
           <a:fontRef idx="minor">
-            <a:schemeClr val="lt1"/>
+            <a:schemeClr val="tx1"/>
           </a:fontRef>
         </p:style>
-        <p:txBody>
-          <a:bodyPr rtlCol="0" anchor="ctr"/>
-          <a:lstStyle/>
-          <a:p>
-            <a:pPr algn="ctr"/>
-            <a:endParaRPr lang="en-US"/>
-          </a:p>
-        </p:txBody>
-      </p:sp>
+      </p:cxnSp>
     </p:spTree>
     <p:extLst>
       <p:ext uri="{BB962C8B-B14F-4D97-AF65-F5344CB8AC3E}">

</xml_diff>

<commit_message>
final for instructor to review
</commit_message>
<xml_diff>
--- a/To-Do-App-Illustrations/React To-Do Planning Assignment.pptx
+++ b/To-Do-App-Illustrations/React To-Do Planning Assignment.pptx
@@ -11,8 +11,11 @@
     <p:sldId id="260" r:id="rId5"/>
     <p:sldId id="263" r:id="rId6"/>
     <p:sldId id="259" r:id="rId7"/>
-    <p:sldId id="262" r:id="rId8"/>
-    <p:sldId id="258" r:id="rId9"/>
+    <p:sldId id="266" r:id="rId8"/>
+    <p:sldId id="265" r:id="rId9"/>
+    <p:sldId id="262" r:id="rId10"/>
+    <p:sldId id="264" r:id="rId11"/>
+    <p:sldId id="267" r:id="rId12"/>
   </p:sldIdLst>
   <p:sldSz cx="12192000" cy="6858000"/>
   <p:notesSz cx="6858000" cy="9144000"/>
@@ -3228,9 +3231,6 @@
               </a:rPr>
               <a:t>Therefore for this assignment, I will only focus on classes based on Ulrich teaching (Ulrich, 2020).</a:t>
             </a:r>
-            <a:endParaRPr lang="en-US" dirty="0" smtClean="0">
-              <a:cs typeface="Courier New" panose="02070309020205020404" pitchFamily="49" charset="0"/>
-            </a:endParaRPr>
           </a:p>
         </p:txBody>
       </p:sp>
@@ -3254,6 +3254,485 @@
 </p:sld>
 </file>
 
+<file path=ppt/slides/slide10.xml><?xml version="1.0" encoding="utf-8"?>
+<p:sld xmlns:a="http://schemas.openxmlformats.org/drawingml/2006/main" xmlns:r="http://schemas.openxmlformats.org/officeDocument/2006/relationships" xmlns:p="http://schemas.openxmlformats.org/presentationml/2006/main">
+  <p:cSld>
+    <p:spTree>
+      <p:nvGrpSpPr>
+        <p:cNvPr id="1" name=""/>
+        <p:cNvGrpSpPr/>
+        <p:nvPr/>
+      </p:nvGrpSpPr>
+      <p:grpSpPr>
+        <a:xfrm>
+          <a:off x="0" y="0"/>
+          <a:ext cx="0" cy="0"/>
+          <a:chOff x="0" y="0"/>
+          <a:chExt cx="0" cy="0"/>
+        </a:xfrm>
+      </p:grpSpPr>
+      <p:sp>
+        <p:nvSpPr>
+          <p:cNvPr id="2" name="Title 1"/>
+          <p:cNvSpPr>
+            <a:spLocks noGrp="1"/>
+          </p:cNvSpPr>
+          <p:nvPr>
+            <p:ph type="title"/>
+          </p:nvPr>
+        </p:nvSpPr>
+        <p:spPr>
+          <a:xfrm>
+            <a:off x="5051897" y="360598"/>
+            <a:ext cx="6621294" cy="928706"/>
+          </a:xfrm>
+          <a:solidFill>
+            <a:schemeClr val="accent1">
+              <a:lumMod val="40000"/>
+              <a:lumOff val="60000"/>
+            </a:schemeClr>
+          </a:solidFill>
+        </p:spPr>
+        <p:txBody>
+          <a:bodyPr>
+            <a:normAutofit fontScale="90000"/>
+          </a:bodyPr>
+          <a:lstStyle/>
+          <a:p>
+            <a:r>
+              <a:rPr lang="en-US" sz="3600" dirty="0" smtClean="0"/>
+              <a:t>Step </a:t>
+            </a:r>
+            <a:r>
+              <a:rPr lang="en-US" sz="3600" dirty="0"/>
+              <a:t>5</a:t>
+            </a:r>
+            <a:r>
+              <a:rPr lang="en-US" sz="3600" dirty="0" smtClean="0"/>
+              <a:t>: Completed Component </a:t>
+            </a:r>
+            <a:r>
+              <a:rPr lang="en-US" sz="3600" dirty="0"/>
+              <a:t>(</a:t>
+            </a:r>
+            <a:r>
+              <a:rPr lang="en-US" sz="3600" dirty="0" smtClean="0"/>
+              <a:t>MDN, 2020b) </a:t>
+            </a:r>
+            <a:endParaRPr lang="en-US" sz="3600" dirty="0"/>
+          </a:p>
+        </p:txBody>
+      </p:sp>
+      <p:pic>
+        <p:nvPicPr>
+          <p:cNvPr id="4" name="Content Placeholder 3"/>
+          <p:cNvPicPr>
+            <a:picLocks noGrp="1" noChangeAspect="1"/>
+          </p:cNvPicPr>
+          <p:nvPr>
+            <p:ph idx="1"/>
+          </p:nvPr>
+        </p:nvPicPr>
+        <p:blipFill>
+          <a:blip r:embed="rId2">
+            <a:extLst>
+              <a:ext uri="{28A0092B-C50C-407E-A947-70E740481C1C}">
+                <a14:useLocalDpi xmlns:a14="http://schemas.microsoft.com/office/drawing/2010/main" val="0"/>
+              </a:ext>
+            </a:extLst>
+          </a:blip>
+          <a:stretch>
+            <a:fillRect/>
+          </a:stretch>
+        </p:blipFill>
+        <p:spPr>
+          <a:xfrm>
+            <a:off x="488651" y="365124"/>
+            <a:ext cx="4290535" cy="5147215"/>
+          </a:xfrm>
+        </p:spPr>
+      </p:pic>
+      <p:sp>
+        <p:nvSpPr>
+          <p:cNvPr id="6" name="Rectangle 5"/>
+          <p:cNvSpPr/>
+          <p:nvPr/>
+        </p:nvSpPr>
+        <p:spPr>
+          <a:xfrm>
+            <a:off x="642939" y="2728912"/>
+            <a:ext cx="1158565" cy="437369"/>
+          </a:xfrm>
+          <a:prstGeom prst="rect">
+            <a:avLst/>
+          </a:prstGeom>
+          <a:noFill/>
+          <a:ln>
+            <a:solidFill>
+              <a:schemeClr val="accent1"/>
+            </a:solidFill>
+          </a:ln>
+        </p:spPr>
+        <p:style>
+          <a:lnRef idx="2">
+            <a:schemeClr val="accent1">
+              <a:shade val="50000"/>
+            </a:schemeClr>
+          </a:lnRef>
+          <a:fillRef idx="1">
+            <a:schemeClr val="accent1"/>
+          </a:fillRef>
+          <a:effectRef idx="0">
+            <a:schemeClr val="accent1"/>
+          </a:effectRef>
+          <a:fontRef idx="minor">
+            <a:schemeClr val="lt1"/>
+          </a:fontRef>
+        </p:style>
+        <p:txBody>
+          <a:bodyPr rtlCol="0" anchor="ctr"/>
+          <a:lstStyle/>
+          <a:p>
+            <a:pPr algn="ctr"/>
+            <a:endParaRPr lang="en-US"/>
+          </a:p>
+        </p:txBody>
+      </p:sp>
+      <p:cxnSp>
+        <p:nvCxnSpPr>
+          <p:cNvPr id="7" name="Elbow Connector 6"/>
+          <p:cNvCxnSpPr>
+            <a:endCxn id="2" idx="1"/>
+          </p:cNvCxnSpPr>
+          <p:nvPr/>
+        </p:nvCxnSpPr>
+        <p:spPr>
+          <a:xfrm flipV="1">
+            <a:off x="1801504" y="824951"/>
+            <a:ext cx="3250393" cy="1979664"/>
+          </a:xfrm>
+          <a:prstGeom prst="bentConnector3">
+            <a:avLst>
+              <a:gd name="adj1" fmla="val 83590"/>
+            </a:avLst>
+          </a:prstGeom>
+          <a:ln>
+            <a:solidFill>
+              <a:schemeClr val="tx1"/>
+            </a:solidFill>
+            <a:tailEnd type="triangle"/>
+          </a:ln>
+        </p:spPr>
+        <p:style>
+          <a:lnRef idx="1">
+            <a:schemeClr val="accent1"/>
+          </a:lnRef>
+          <a:fillRef idx="0">
+            <a:schemeClr val="accent1"/>
+          </a:fillRef>
+          <a:effectRef idx="0">
+            <a:schemeClr val="accent1"/>
+          </a:effectRef>
+          <a:fontRef idx="minor">
+            <a:schemeClr val="tx1"/>
+          </a:fontRef>
+        </p:style>
+      </p:cxnSp>
+      <p:sp>
+        <p:nvSpPr>
+          <p:cNvPr id="8" name="Rectangle 1"/>
+          <p:cNvSpPr>
+            <a:spLocks noChangeArrowheads="1"/>
+          </p:cNvSpPr>
+          <p:nvPr/>
+        </p:nvSpPr>
+        <p:spPr bwMode="auto">
+          <a:xfrm>
+            <a:off x="0" y="-107722"/>
+            <a:ext cx="232756" cy="215444"/>
+          </a:xfrm>
+          <a:prstGeom prst="rect">
+            <a:avLst/>
+          </a:prstGeom>
+          <a:noFill/>
+          <a:ln>
+            <a:noFill/>
+          </a:ln>
+          <a:effectLst/>
+          <a:extLst>
+            <a:ext uri="{909E8E84-426E-40DD-AFC4-6F175D3DCCD1}">
+              <a14:hiddenFill xmlns:a14="http://schemas.microsoft.com/office/drawing/2010/main">
+                <a:solidFill>
+                  <a:schemeClr val="accent1"/>
+                </a:solidFill>
+              </a14:hiddenFill>
+            </a:ext>
+            <a:ext uri="{91240B29-F687-4F45-9708-019B960494DF}">
+              <a14:hiddenLine xmlns:a14="http://schemas.microsoft.com/office/drawing/2010/main" w="9525">
+                <a:solidFill>
+                  <a:schemeClr val="tx1"/>
+                </a:solidFill>
+                <a:miter lim="800000"/>
+                <a:headEnd/>
+                <a:tailEnd/>
+              </a14:hiddenLine>
+            </a:ext>
+            <a:ext uri="{AF507438-7753-43E0-B8FC-AC1667EBCBE1}">
+              <a14:hiddenEffects xmlns:a14="http://schemas.microsoft.com/office/drawing/2010/main">
+                <a:effectLst>
+                  <a:outerShdw dist="35921" dir="2700000" algn="ctr" rotWithShape="0">
+                    <a:schemeClr val="bg2"/>
+                  </a:outerShdw>
+                </a:effectLst>
+              </a14:hiddenEffects>
+            </a:ext>
+          </a:extLst>
+        </p:spPr>
+        <p:txBody>
+          <a:bodyPr vert="horz" wrap="none" lIns="91440" tIns="45720" rIns="91440" bIns="45720" numCol="1" anchor="ctr" anchorCtr="0" compatLnSpc="1">
+            <a:prstTxWarp prst="textNoShape">
+              <a:avLst/>
+            </a:prstTxWarp>
+            <a:spAutoFit/>
+          </a:bodyPr>
+          <a:lstStyle/>
+          <a:p>
+            <a:pPr marL="0" marR="0" lvl="0" indent="0" algn="l" defTabSz="914400" rtl="0" eaLnBrk="0" fontAlgn="base" latinLnBrk="0" hangingPunct="0">
+              <a:lnSpc>
+                <a:spcPct val="100000"/>
+              </a:lnSpc>
+              <a:spcBef>
+                <a:spcPct val="0"/>
+              </a:spcBef>
+              <a:spcAft>
+                <a:spcPct val="0"/>
+              </a:spcAft>
+              <a:buClrTx/>
+              <a:buSzTx/>
+              <a:buFontTx/>
+              <a:buNone/>
+              <a:tabLst/>
+            </a:pPr>
+            <a:r>
+              <a:rPr kumimoji="0" lang="en-US" altLang="en-US" sz="800" b="0" i="0" u="none" strike="noStrike" cap="none" normalizeH="0" baseline="0" dirty="0" smtClean="0">
+                <a:ln>
+                  <a:noFill/>
+                </a:ln>
+                <a:solidFill>
+                  <a:schemeClr val="tx1"/>
+                </a:solidFill>
+                <a:effectLst/>
+              </a:rPr>
+              <a:t>. </a:t>
+            </a:r>
+            <a:endParaRPr kumimoji="0" lang="en-US" altLang="en-US" sz="1800" b="0" i="0" u="none" strike="noStrike" cap="none" normalizeH="0" baseline="0" dirty="0" smtClean="0">
+              <a:ln>
+                <a:noFill/>
+              </a:ln>
+              <a:solidFill>
+                <a:schemeClr val="tx1"/>
+              </a:solidFill>
+              <a:effectLst/>
+              <a:latin typeface="Arial" panose="020B0604020202020204" pitchFamily="34" charset="0"/>
+            </a:endParaRPr>
+          </a:p>
+        </p:txBody>
+      </p:sp>
+      <p:sp>
+        <p:nvSpPr>
+          <p:cNvPr id="9" name="TextBox 8"/>
+          <p:cNvSpPr txBox="1"/>
+          <p:nvPr/>
+        </p:nvSpPr>
+        <p:spPr>
+          <a:xfrm>
+            <a:off x="5051897" y="1467134"/>
+            <a:ext cx="6621294" cy="1477328"/>
+          </a:xfrm>
+          <a:prstGeom prst="rect">
+            <a:avLst/>
+          </a:prstGeom>
+          <a:noFill/>
+        </p:spPr>
+        <p:txBody>
+          <a:bodyPr wrap="square" rtlCol="0">
+            <a:spAutoFit/>
+          </a:bodyPr>
+          <a:lstStyle/>
+          <a:p>
+            <a:pPr marL="342900" indent="-342900">
+              <a:buFont typeface="+mj-lt"/>
+              <a:buAutoNum type="arabicPeriod"/>
+            </a:pPr>
+            <a:r>
+              <a:rPr lang="en-US" dirty="0" smtClean="0"/>
+              <a:t>The JSX check box was created in ToDo.js and currently only work for the browser.</a:t>
+            </a:r>
+          </a:p>
+          <a:p>
+            <a:pPr marL="342900" indent="-342900">
+              <a:buFont typeface="+mj-lt"/>
+              <a:buAutoNum type="arabicPeriod"/>
+            </a:pPr>
+            <a:r>
+              <a:rPr lang="en-US" dirty="0"/>
+              <a:t>T</a:t>
+            </a:r>
+            <a:r>
+              <a:rPr lang="en-US" dirty="0" smtClean="0"/>
+              <a:t>his will be based on Boolean true or false statement</a:t>
+            </a:r>
+          </a:p>
+          <a:p>
+            <a:pPr marL="800100" lvl="1" indent="-342900">
+              <a:buFont typeface="+mj-lt"/>
+              <a:buAutoNum type="alphaLcParenR"/>
+            </a:pPr>
+            <a:r>
+              <a:rPr lang="en-US" dirty="0" smtClean="0"/>
+              <a:t>If (checkbox == true) {task completed} else {task not completed.</a:t>
+            </a:r>
+          </a:p>
+        </p:txBody>
+      </p:sp>
+    </p:spTree>
+    <p:extLst>
+      <p:ext uri="{BB962C8B-B14F-4D97-AF65-F5344CB8AC3E}">
+        <p14:creationId xmlns:p14="http://schemas.microsoft.com/office/powerpoint/2010/main" val="1984557404"/>
+      </p:ext>
+    </p:extLst>
+  </p:cSld>
+  <p:clrMapOvr>
+    <a:masterClrMapping/>
+  </p:clrMapOvr>
+</p:sld>
+</file>
+
+<file path=ppt/slides/slide11.xml><?xml version="1.0" encoding="utf-8"?>
+<p:sld xmlns:a="http://schemas.openxmlformats.org/drawingml/2006/main" xmlns:r="http://schemas.openxmlformats.org/officeDocument/2006/relationships" xmlns:p="http://schemas.openxmlformats.org/presentationml/2006/main">
+  <p:cSld>
+    <p:spTree>
+      <p:nvGrpSpPr>
+        <p:cNvPr id="1" name=""/>
+        <p:cNvGrpSpPr/>
+        <p:nvPr/>
+      </p:nvGrpSpPr>
+      <p:grpSpPr>
+        <a:xfrm>
+          <a:off x="0" y="0"/>
+          <a:ext cx="0" cy="0"/>
+          <a:chOff x="0" y="0"/>
+          <a:chExt cx="0" cy="0"/>
+        </a:xfrm>
+      </p:grpSpPr>
+      <p:sp>
+        <p:nvSpPr>
+          <p:cNvPr id="2" name="Title 1"/>
+          <p:cNvSpPr>
+            <a:spLocks noGrp="1"/>
+          </p:cNvSpPr>
+          <p:nvPr>
+            <p:ph type="title"/>
+          </p:nvPr>
+        </p:nvSpPr>
+        <p:spPr/>
+        <p:txBody>
+          <a:bodyPr/>
+          <a:lstStyle/>
+          <a:p>
+            <a:r>
+              <a:rPr lang="en-US" dirty="0" smtClean="0"/>
+              <a:t>Discussion/Thoughts</a:t>
+            </a:r>
+            <a:endParaRPr lang="en-US" dirty="0"/>
+          </a:p>
+        </p:txBody>
+      </p:sp>
+      <p:sp>
+        <p:nvSpPr>
+          <p:cNvPr id="3" name="Content Placeholder 2"/>
+          <p:cNvSpPr>
+            <a:spLocks noGrp="1"/>
+          </p:cNvSpPr>
+          <p:nvPr>
+            <p:ph idx="1"/>
+          </p:nvPr>
+        </p:nvSpPr>
+        <p:spPr/>
+        <p:txBody>
+          <a:bodyPr/>
+          <a:lstStyle/>
+          <a:p>
+            <a:r>
+              <a:rPr lang="en-US" dirty="0" smtClean="0"/>
+              <a:t>I had learnt a lot, my assignment is made up of a bunch of pseudocodes for </a:t>
+            </a:r>
+            <a:r>
+              <a:rPr lang="en-US" b="1" dirty="0" smtClean="0"/>
+              <a:t>Step 1, Step 2, Step 3 and Step 5 components.</a:t>
+            </a:r>
+            <a:r>
+              <a:rPr lang="en-US" dirty="0" smtClean="0"/>
+              <a:t> As these components I feel requires additional teachings on </a:t>
+            </a:r>
+            <a:r>
+              <a:rPr lang="en-US" dirty="0" smtClean="0">
+                <a:latin typeface="Courier New" panose="02070309020205020404" pitchFamily="49" charset="0"/>
+                <a:cs typeface="Courier New" panose="02070309020205020404" pitchFamily="49" charset="0"/>
+              </a:rPr>
+              <a:t>map</a:t>
+            </a:r>
+            <a:r>
+              <a:rPr lang="en-US" dirty="0" smtClean="0"/>
+              <a:t> from the class or further reading about React.</a:t>
+            </a:r>
+          </a:p>
+          <a:p>
+            <a:r>
+              <a:rPr lang="en-US" dirty="0" smtClean="0"/>
+              <a:t>I have managed to do a JSX code for </a:t>
+            </a:r>
+            <a:r>
+              <a:rPr lang="en-US" b="1" dirty="0" smtClean="0"/>
+              <a:t>Step 4 </a:t>
+            </a:r>
+            <a:r>
+              <a:rPr lang="en-US" dirty="0" smtClean="0"/>
+              <a:t>components because it only requires concepts taught by Ulrich, 2020. </a:t>
+            </a:r>
+          </a:p>
+          <a:p>
+            <a:r>
+              <a:rPr lang="en-US" dirty="0" smtClean="0"/>
+              <a:t>I realized while </a:t>
+            </a:r>
+            <a:r>
+              <a:rPr lang="en-US" dirty="0" err="1" smtClean="0"/>
+              <a:t>pseudocoding</a:t>
+            </a:r>
+            <a:r>
+              <a:rPr lang="en-US" dirty="0" smtClean="0"/>
+              <a:t>, both functions and classes can be used together and simultaneously, however it is the best to stick to one based on Ulrich, 2020 at this time. </a:t>
+            </a:r>
+          </a:p>
+          <a:p>
+            <a:endParaRPr lang="en-US" b="1" dirty="0" smtClean="0"/>
+          </a:p>
+        </p:txBody>
+      </p:sp>
+    </p:spTree>
+    <p:extLst>
+      <p:ext uri="{BB962C8B-B14F-4D97-AF65-F5344CB8AC3E}">
+        <p14:creationId xmlns:p14="http://schemas.microsoft.com/office/powerpoint/2010/main" val="1808793208"/>
+      </p:ext>
+    </p:extLst>
+  </p:cSld>
+  <p:clrMapOvr>
+    <a:masterClrMapping/>
+  </p:clrMapOvr>
+</p:sld>
+</file>
+
 <file path=ppt/slides/slide2.xml><?xml version="1.0" encoding="utf-8"?>
 <p:sld xmlns:a="http://schemas.openxmlformats.org/drawingml/2006/main" xmlns:r="http://schemas.openxmlformats.org/officeDocument/2006/relationships" xmlns:p="http://schemas.openxmlformats.org/presentationml/2006/main">
   <p:cSld>
@@ -3382,13 +3861,7 @@
               <a:rPr lang="en-US" sz="2000" dirty="0" smtClean="0">
                 <a:cs typeface="Courier New" panose="02070309020205020404" pitchFamily="49" charset="0"/>
               </a:rPr>
-              <a:t>Review </a:t>
-            </a:r>
-            <a:r>
-              <a:rPr lang="en-US" sz="2000" dirty="0" smtClean="0">
-                <a:cs typeface="Courier New" panose="02070309020205020404" pitchFamily="49" charset="0"/>
-              </a:rPr>
-              <a:t>app.js and understand </a:t>
+              <a:t>Review app.js and understand </a:t>
             </a:r>
             <a:r>
               <a:rPr lang="en-US" sz="2000" dirty="0" smtClean="0">
@@ -3507,13 +3980,7 @@
               <a:rPr lang="en-US" sz="2000" dirty="0" smtClean="0">
                 <a:cs typeface="Courier New" panose="02070309020205020404" pitchFamily="49" charset="0"/>
               </a:rPr>
-              <a:t>Make component folder to store all the components we are </a:t>
-            </a:r>
-            <a:r>
-              <a:rPr lang="en-US" sz="2000" dirty="0" smtClean="0">
-                <a:cs typeface="Courier New" panose="02070309020205020404" pitchFamily="49" charset="0"/>
-              </a:rPr>
-              <a:t>making: </a:t>
+              <a:t>Make component folder to store all the components we are making: </a:t>
             </a:r>
             <a:r>
               <a:rPr lang="en-US" sz="2000" b="1" dirty="0"/>
@@ -3563,6 +4030,32 @@
               <a:rPr lang="en-US" sz="2000" b="1" dirty="0" smtClean="0"/>
               <a:t>Component. </a:t>
             </a:r>
+          </a:p>
+          <a:p>
+            <a:pPr marL="514350" indent="-514350">
+              <a:buFont typeface="Arial" panose="020B0604020202020204" pitchFamily="34" charset="0"/>
+              <a:buAutoNum type="arabicPeriod"/>
+            </a:pPr>
+            <a:r>
+              <a:rPr lang="en-US" sz="2000" dirty="0"/>
+              <a:t>All components are required to use </a:t>
+            </a:r>
+            <a:r>
+              <a:rPr lang="en-US" sz="2000" dirty="0">
+                <a:latin typeface="Courier New" panose="02070309020205020404" pitchFamily="49" charset="0"/>
+                <a:cs typeface="Courier New" panose="02070309020205020404" pitchFamily="49" charset="0"/>
+              </a:rPr>
+              <a:t>import React from “react” </a:t>
+            </a:r>
+            <a:r>
+              <a:rPr lang="en-US" sz="2000" dirty="0"/>
+              <a:t>in the global or at the top most line in the code. </a:t>
+            </a:r>
+          </a:p>
+          <a:p>
+            <a:pPr marL="0" indent="0">
+              <a:buNone/>
+            </a:pPr>
             <a:endParaRPr lang="en-US" sz="2000" dirty="0" smtClean="0">
               <a:cs typeface="Courier New" panose="02070309020205020404" pitchFamily="49" charset="0"/>
             </a:endParaRPr>
@@ -3804,27 +4297,7 @@
             </a:r>
             <a:r>
               <a:rPr lang="en-US" sz="1600" dirty="0" smtClean="0"/>
-              <a:t>This should allow user to input task. This contain </a:t>
-            </a:r>
-            <a:r>
-              <a:rPr lang="en-US" sz="1600" dirty="0" smtClean="0"/>
-              <a:t>class component</a:t>
-            </a:r>
-            <a:r>
-              <a:rPr lang="en-US" sz="1600" dirty="0" smtClean="0"/>
-              <a:t> </a:t>
-            </a:r>
-            <a:r>
-              <a:rPr lang="en-US" sz="1600" dirty="0" smtClean="0"/>
-              <a:t>to just receive </a:t>
-            </a:r>
-            <a:r>
-              <a:rPr lang="en-US" sz="1600" dirty="0" smtClean="0"/>
-              <a:t>props </a:t>
-            </a:r>
-            <a:r>
-              <a:rPr lang="en-US" sz="1600" dirty="0" smtClean="0"/>
-              <a:t>and return JSX to be rendered. This component will only have one prop to handle the click event for adding a new to-do  (</a:t>
+              <a:t>This should allow user to input task. This contain class component to just receive props and return JSX to be rendered. This component will only have one prop to handle the click event for adding a new to-do  (</a:t>
             </a:r>
             <a:r>
               <a:rPr lang="en-US" sz="1600" dirty="0" err="1" smtClean="0"/>
@@ -6438,7 +6911,7 @@
         <p:spPr>
           <a:xfrm>
             <a:off x="5051897" y="1578279"/>
-            <a:ext cx="6459522" cy="5078313"/>
+            <a:ext cx="6459522" cy="4801314"/>
           </a:xfrm>
           <a:prstGeom prst="rect">
             <a:avLst/>
@@ -6456,15 +6929,21 @@
               <a:t>Create a skeleton</a:t>
             </a:r>
             <a:r>
-              <a:rPr lang="en-US" dirty="0" smtClean="0">
+              <a:rPr lang="en-US" dirty="0">
                 <a:latin typeface="Courier New" panose="02070309020205020404" pitchFamily="49" charset="0"/>
                 <a:cs typeface="Courier New" panose="02070309020205020404" pitchFamily="49" charset="0"/>
               </a:rPr>
-              <a:t> App(function</a:t>
+              <a:t> </a:t>
+            </a:r>
+            <a:r>
+              <a:rPr lang="en-US" dirty="0" smtClean="0">
+                <a:cs typeface="Courier New" panose="02070309020205020404" pitchFamily="49" charset="0"/>
+              </a:rPr>
+              <a:t>of an app</a:t>
             </a:r>
             <a:r>
               <a:rPr lang="en-US" dirty="0" smtClean="0"/>
-              <a:t>)  and paste to the App.js that creates the:</a:t>
+              <a:t>  and paste to the App.js that creates the:</a:t>
             </a:r>
           </a:p>
           <a:p>
@@ -6610,22 +7089,19 @@
                 <a:latin typeface="Courier New" panose="02070309020205020404" pitchFamily="49" charset="0"/>
                 <a:cs typeface="Courier New" panose="02070309020205020404" pitchFamily="49" charset="0"/>
               </a:rPr>
-              <a:t> type="checkbox" </a:t>
-            </a:r>
-            <a:r>
-              <a:rPr lang="en-US" dirty="0" err="1">
+              <a:t> type="checkbox</a:t>
+            </a:r>
+            <a:r>
+              <a:rPr lang="en-US" dirty="0" smtClean="0">
                 <a:latin typeface="Courier New" panose="02070309020205020404" pitchFamily="49" charset="0"/>
                 <a:cs typeface="Courier New" panose="02070309020205020404" pitchFamily="49" charset="0"/>
               </a:rPr>
-              <a:t>defaultChecked</a:t>
-            </a:r>
-            <a:r>
-              <a:rPr lang="en-US" dirty="0">
-                <a:latin typeface="Courier New" panose="02070309020205020404" pitchFamily="49" charset="0"/>
-                <a:cs typeface="Courier New" panose="02070309020205020404" pitchFamily="49" charset="0"/>
-              </a:rPr>
-              <a:t>={true} /&gt;</a:t>
-            </a:r>
+              <a:t>"/&gt;</a:t>
+            </a:r>
+            <a:endParaRPr lang="en-US" dirty="0">
+              <a:latin typeface="Courier New" panose="02070309020205020404" pitchFamily="49" charset="0"/>
+              <a:cs typeface="Courier New" panose="02070309020205020404" pitchFamily="49" charset="0"/>
+            </a:endParaRPr>
           </a:p>
           <a:p>
             <a:pPr marL="800100" lvl="1" indent="-342900">
@@ -6744,8 +7220,8 @@
         </p:nvSpPr>
         <p:spPr>
           <a:xfrm>
-            <a:off x="5051897" y="360598"/>
-            <a:ext cx="6621294" cy="928706"/>
+            <a:off x="5051897" y="360597"/>
+            <a:ext cx="6621294" cy="917057"/>
           </a:xfrm>
           <a:solidFill>
             <a:schemeClr val="accent1">
@@ -6765,12 +7241,24 @@
               <a:t>Step </a:t>
             </a:r>
             <a:r>
+              <a:rPr lang="en-US" sz="3600" dirty="0"/>
+              <a:t>2</a:t>
+            </a:r>
+            <a:r>
               <a:rPr lang="en-US" sz="3600" dirty="0" smtClean="0"/>
-              <a:t>3: To-Do Component (MDN</a:t>
+              <a:t>: </a:t>
+            </a:r>
+            <a:r>
+              <a:rPr lang="en-US" sz="3200" dirty="0"/>
+              <a:t>Input Form </a:t>
+            </a:r>
+            <a:r>
+              <a:rPr lang="en-US" sz="3200" dirty="0" smtClean="0"/>
+              <a:t>Component </a:t>
             </a:r>
             <a:r>
               <a:rPr lang="en-US" sz="3600" dirty="0" smtClean="0"/>
-              <a:t>, 2020b) </a:t>
+              <a:t>(MDN, 2020b).</a:t>
             </a:r>
             <a:endParaRPr lang="en-US" sz="3600" dirty="0"/>
           </a:p>
@@ -6800,73 +7288,21 @@
         </p:blipFill>
         <p:spPr>
           <a:xfrm>
-            <a:off x="488651" y="365124"/>
+            <a:off x="488649" y="360597"/>
             <a:ext cx="4290535" cy="5147215"/>
           </a:xfrm>
         </p:spPr>
       </p:pic>
       <p:sp>
         <p:nvSpPr>
-          <p:cNvPr id="5" name="TextBox 4"/>
-          <p:cNvSpPr txBox="1"/>
-          <p:nvPr/>
-        </p:nvSpPr>
-        <p:spPr>
-          <a:xfrm>
-            <a:off x="5069711" y="1461329"/>
-            <a:ext cx="6603480" cy="1477328"/>
-          </a:xfrm>
-          <a:prstGeom prst="rect">
-            <a:avLst/>
-          </a:prstGeom>
-          <a:noFill/>
-        </p:spPr>
-        <p:txBody>
-          <a:bodyPr wrap="square" rtlCol="0">
-            <a:spAutoFit/>
-          </a:bodyPr>
-          <a:lstStyle/>
-          <a:p>
-            <a:pPr marL="342900" indent="-342900">
-              <a:buAutoNum type="arabicPeriod"/>
-            </a:pPr>
-            <a:r>
-              <a:rPr lang="en-US" dirty="0" smtClean="0"/>
-              <a:t>All components are required to use import React from “react” in the global or at the top most line in the code. </a:t>
-            </a:r>
-          </a:p>
-          <a:p>
-            <a:pPr marL="342900" indent="-342900">
-              <a:buAutoNum type="arabicPeriod"/>
-            </a:pPr>
-            <a:r>
-              <a:rPr lang="en-US" dirty="0" smtClean="0"/>
-              <a:t>Create a component called ToDo.js. Within ToDo.js, we will create a class to generate a To-Do list component. </a:t>
-            </a:r>
-            <a:endParaRPr lang="en-US" dirty="0"/>
-          </a:p>
-          <a:p>
-            <a:pPr marL="342900" indent="-342900">
-              <a:buAutoNum type="arabicPeriod"/>
-            </a:pPr>
-            <a:r>
-              <a:rPr lang="en-US" dirty="0" smtClean="0"/>
-              <a:t>Pseudocode as follows:</a:t>
-            </a:r>
-            <a:endParaRPr lang="en-US" dirty="0" smtClean="0"/>
-          </a:p>
-        </p:txBody>
-      </p:sp>
-      <p:sp>
-        <p:nvSpPr>
-          <p:cNvPr id="6" name="Rectangle 5"/>
+          <p:cNvPr id="9" name="Rectangle 8"/>
           <p:cNvSpPr/>
           <p:nvPr/>
         </p:nvSpPr>
         <p:spPr>
           <a:xfrm>
-            <a:off x="642939" y="2728912"/>
-            <a:ext cx="3900486" cy="1214437"/>
+            <a:off x="603008" y="989462"/>
+            <a:ext cx="3988333" cy="1125941"/>
           </a:xfrm>
           <a:prstGeom prst="rect">
             <a:avLst/>
@@ -6874,7 +7310,9 @@
           <a:noFill/>
           <a:ln>
             <a:solidFill>
-              <a:schemeClr val="accent1"/>
+              <a:schemeClr val="accent1">
+                <a:lumMod val="75000"/>
+              </a:schemeClr>
             </a:solidFill>
           </a:ln>
         </p:spPr>
@@ -6905,22 +7343,20 @@
       </p:sp>
       <p:cxnSp>
         <p:nvCxnSpPr>
-          <p:cNvPr id="7" name="Elbow Connector 6"/>
+          <p:cNvPr id="13" name="Elbow Connector 12"/>
           <p:cNvCxnSpPr>
-            <a:stCxn id="6" idx="3"/>
+            <a:stCxn id="9" idx="3"/>
             <a:endCxn id="2" idx="1"/>
           </p:cNvCxnSpPr>
           <p:nvPr/>
         </p:nvCxnSpPr>
         <p:spPr>
           <a:xfrm flipV="1">
-            <a:off x="4543425" y="824951"/>
-            <a:ext cx="508472" cy="2511180"/>
+            <a:off x="4591341" y="819126"/>
+            <a:ext cx="460556" cy="733307"/>
           </a:xfrm>
           <a:prstGeom prst="bentConnector3">
-            <a:avLst>
-              <a:gd name="adj1" fmla="val 50000"/>
-            </a:avLst>
+            <a:avLst/>
           </a:prstGeom>
           <a:ln>
             <a:solidFill>
@@ -6944,10 +7380,175 @@
           </a:fontRef>
         </p:style>
       </p:cxnSp>
+      <p:sp>
+        <p:nvSpPr>
+          <p:cNvPr id="8" name="TextBox 7"/>
+          <p:cNvSpPr txBox="1"/>
+          <p:nvPr/>
+        </p:nvSpPr>
+        <p:spPr>
+          <a:xfrm>
+            <a:off x="5051897" y="1551517"/>
+            <a:ext cx="6621294" cy="4247317"/>
+          </a:xfrm>
+          <a:prstGeom prst="rect">
+            <a:avLst/>
+          </a:prstGeom>
+          <a:noFill/>
+        </p:spPr>
+        <p:txBody>
+          <a:bodyPr wrap="square" rtlCol="0">
+            <a:spAutoFit/>
+          </a:bodyPr>
+          <a:lstStyle/>
+          <a:p>
+            <a:pPr marL="342900" indent="-342900">
+              <a:buFont typeface="+mj-lt"/>
+              <a:buAutoNum type="arabicPeriod"/>
+            </a:pPr>
+            <a:r>
+              <a:rPr lang="en-US" dirty="0" smtClean="0"/>
+              <a:t>Input form is created to accept user input typed into the blank text area of the form.</a:t>
+            </a:r>
+          </a:p>
+          <a:p>
+            <a:pPr marL="342900" indent="-342900">
+              <a:buFont typeface="+mj-lt"/>
+              <a:buAutoNum type="arabicPeriod"/>
+            </a:pPr>
+            <a:r>
+              <a:rPr lang="en-US" dirty="0" smtClean="0"/>
+              <a:t>“Add Task” is an event listener with a </a:t>
+            </a:r>
+            <a:r>
+              <a:rPr lang="en-US" dirty="0" err="1" smtClean="0"/>
+              <a:t>onClick</a:t>
+            </a:r>
+            <a:r>
+              <a:rPr lang="en-US" dirty="0" smtClean="0"/>
+              <a:t> that will trigger components </a:t>
+            </a:r>
+            <a:r>
+              <a:rPr lang="en-US" b="1" dirty="0" smtClean="0"/>
+              <a:t>Step 3: To-Do Component, Step 4: To-Do List Component, and Step 5: Completed Component </a:t>
+            </a:r>
+            <a:r>
+              <a:rPr lang="en-US" dirty="0" smtClean="0"/>
+              <a:t>sequentially.</a:t>
+            </a:r>
+          </a:p>
+          <a:p>
+            <a:pPr marL="342900" indent="-342900">
+              <a:buFont typeface="+mj-lt"/>
+              <a:buAutoNum type="arabicPeriod"/>
+            </a:pPr>
+            <a:r>
+              <a:rPr lang="en-US" dirty="0" smtClean="0"/>
+              <a:t>Pseudocode for class in the </a:t>
+            </a:r>
+            <a:r>
+              <a:rPr lang="en-US" b="1" dirty="0" smtClean="0"/>
+              <a:t>Step 2: Input Form Component </a:t>
+            </a:r>
+            <a:r>
+              <a:rPr lang="en-US" dirty="0" smtClean="0"/>
+              <a:t>includes: </a:t>
+            </a:r>
+          </a:p>
+          <a:p>
+            <a:pPr marL="800100" lvl="1" indent="-342900">
+              <a:buFont typeface="+mj-lt"/>
+              <a:buAutoNum type="alphaLcParenR"/>
+            </a:pPr>
+            <a:r>
+              <a:rPr lang="en-US" dirty="0" smtClean="0"/>
+              <a:t>Create </a:t>
+            </a:r>
+            <a:r>
+              <a:rPr lang="en-US" dirty="0" smtClean="0">
+                <a:latin typeface="Courier New" panose="02070309020205020404" pitchFamily="49" charset="0"/>
+                <a:cs typeface="Courier New" panose="02070309020205020404" pitchFamily="49" charset="0"/>
+              </a:rPr>
+              <a:t>class Form extends </a:t>
+            </a:r>
+            <a:r>
+              <a:rPr lang="en-US" dirty="0" err="1" smtClean="0">
+                <a:latin typeface="Courier New" panose="02070309020205020404" pitchFamily="49" charset="0"/>
+                <a:cs typeface="Courier New" panose="02070309020205020404" pitchFamily="49" charset="0"/>
+              </a:rPr>
+              <a:t>React.Component</a:t>
+            </a:r>
+            <a:r>
+              <a:rPr lang="en-US" dirty="0" smtClean="0">
+                <a:latin typeface="Courier New" panose="02070309020205020404" pitchFamily="49" charset="0"/>
+                <a:cs typeface="Courier New" panose="02070309020205020404" pitchFamily="49" charset="0"/>
+              </a:rPr>
+              <a:t> {}.</a:t>
+            </a:r>
+          </a:p>
+          <a:p>
+            <a:pPr marL="800100" lvl="1" indent="-342900">
+              <a:buFont typeface="+mj-lt"/>
+              <a:buAutoNum type="alphaLcParenR"/>
+            </a:pPr>
+            <a:r>
+              <a:rPr lang="en-US" dirty="0" smtClean="0">
+                <a:cs typeface="Courier New" panose="02070309020205020404" pitchFamily="49" charset="0"/>
+              </a:rPr>
+              <a:t>Within the class mentioned in a), the button “Add Task” will have an event listener that prompt the input text in </a:t>
+            </a:r>
+            <a:r>
+              <a:rPr lang="en-US" dirty="0" smtClean="0">
+                <a:latin typeface="Courier New" panose="02070309020205020404" pitchFamily="49" charset="0"/>
+                <a:cs typeface="Courier New" panose="02070309020205020404" pitchFamily="49" charset="0"/>
+              </a:rPr>
+              <a:t>&lt;form&gt; </a:t>
+            </a:r>
+            <a:r>
+              <a:rPr lang="en-US" dirty="0" smtClean="0">
+                <a:cs typeface="Courier New" panose="02070309020205020404" pitchFamily="49" charset="0"/>
+              </a:rPr>
+              <a:t>to be rendered in </a:t>
+            </a:r>
+            <a:r>
+              <a:rPr lang="en-US" b="1" dirty="0" smtClean="0">
+                <a:cs typeface="Courier New" panose="02070309020205020404" pitchFamily="49" charset="0"/>
+              </a:rPr>
+              <a:t>Step 3: To-Do Component</a:t>
+            </a:r>
+            <a:r>
+              <a:rPr lang="en-US" dirty="0" smtClean="0">
+                <a:cs typeface="Courier New" panose="02070309020205020404" pitchFamily="49" charset="0"/>
+              </a:rPr>
+              <a:t> and </a:t>
+            </a:r>
+            <a:r>
+              <a:rPr lang="en-US" b="1" dirty="0" smtClean="0">
+                <a:cs typeface="Courier New" panose="02070309020205020404" pitchFamily="49" charset="0"/>
+              </a:rPr>
+              <a:t>Step 4: To-Do List. </a:t>
+            </a:r>
+          </a:p>
+          <a:p>
+            <a:pPr marL="342900" indent="-342900">
+              <a:buFont typeface="+mj-lt"/>
+              <a:buAutoNum type="arabicPeriod"/>
+            </a:pPr>
+            <a:endParaRPr lang="en-US" dirty="0" smtClean="0"/>
+          </a:p>
+          <a:p>
+            <a:pPr marL="342900" indent="-342900">
+              <a:buFont typeface="+mj-lt"/>
+              <a:buAutoNum type="arabicPeriod"/>
+            </a:pPr>
+            <a:endParaRPr lang="en-US" dirty="0"/>
+          </a:p>
+        </p:txBody>
+      </p:sp>
     </p:spTree>
     <p:extLst>
       <p:ext uri="{BB962C8B-B14F-4D97-AF65-F5344CB8AC3E}">
-        <p14:creationId xmlns:p14="http://schemas.microsoft.com/office/powerpoint/2010/main" val="345095300"/>
+        <p14:creationId xmlns:p14="http://schemas.microsoft.com/office/powerpoint/2010/main" val="3711896489"/>
       </p:ext>
     </p:extLst>
   </p:cSld>
@@ -6984,42 +7585,671 @@
             <p:ph type="title"/>
           </p:nvPr>
         </p:nvSpPr>
-        <p:spPr/>
-        <p:txBody>
-          <a:bodyPr/>
-          <a:lstStyle/>
-          <a:p>
+        <p:spPr>
+          <a:xfrm>
+            <a:off x="5051897" y="360598"/>
+            <a:ext cx="6621294" cy="928706"/>
+          </a:xfrm>
+          <a:solidFill>
+            <a:schemeClr val="accent1">
+              <a:lumMod val="40000"/>
+              <a:lumOff val="60000"/>
+            </a:schemeClr>
+          </a:solidFill>
+        </p:spPr>
+        <p:txBody>
+          <a:bodyPr>
+            <a:normAutofit fontScale="90000"/>
+          </a:bodyPr>
+          <a:lstStyle/>
+          <a:p>
+            <a:r>
+              <a:rPr lang="en-US" sz="3600" dirty="0" smtClean="0"/>
+              <a:t>Step 3: To-Do </a:t>
+            </a:r>
+            <a:r>
+              <a:rPr lang="en-US" sz="3600" dirty="0"/>
+              <a:t>Component (</a:t>
+            </a:r>
+            <a:r>
+              <a:rPr lang="en-US" sz="3600" dirty="0" smtClean="0"/>
+              <a:t>MDN, 2020b) </a:t>
+            </a:r>
+            <a:endParaRPr lang="en-US" sz="3600" dirty="0"/>
+          </a:p>
+        </p:txBody>
+      </p:sp>
+      <p:pic>
+        <p:nvPicPr>
+          <p:cNvPr id="4" name="Content Placeholder 3"/>
+          <p:cNvPicPr>
+            <a:picLocks noGrp="1" noChangeAspect="1"/>
+          </p:cNvPicPr>
+          <p:nvPr>
+            <p:ph idx="1"/>
+          </p:nvPr>
+        </p:nvPicPr>
+        <p:blipFill>
+          <a:blip r:embed="rId2">
+            <a:extLst>
+              <a:ext uri="{28A0092B-C50C-407E-A947-70E740481C1C}">
+                <a14:useLocalDpi xmlns:a14="http://schemas.microsoft.com/office/drawing/2010/main" val="0"/>
+              </a:ext>
+            </a:extLst>
+          </a:blip>
+          <a:stretch>
+            <a:fillRect/>
+          </a:stretch>
+        </p:blipFill>
+        <p:spPr>
+          <a:xfrm>
+            <a:off x="488651" y="368189"/>
+            <a:ext cx="4290535" cy="5147215"/>
+          </a:xfrm>
+        </p:spPr>
+      </p:pic>
+      <p:sp>
+        <p:nvSpPr>
+          <p:cNvPr id="6" name="Rectangle 5"/>
+          <p:cNvSpPr/>
+          <p:nvPr/>
+        </p:nvSpPr>
+        <p:spPr>
+          <a:xfrm>
+            <a:off x="642939" y="2728913"/>
+            <a:ext cx="3828477" cy="425768"/>
+          </a:xfrm>
+          <a:prstGeom prst="rect">
+            <a:avLst/>
+          </a:prstGeom>
+          <a:noFill/>
+          <a:ln>
+            <a:solidFill>
+              <a:schemeClr val="accent1"/>
+            </a:solidFill>
+          </a:ln>
+        </p:spPr>
+        <p:style>
+          <a:lnRef idx="2">
+            <a:schemeClr val="accent1">
+              <a:shade val="50000"/>
+            </a:schemeClr>
+          </a:lnRef>
+          <a:fillRef idx="1">
+            <a:schemeClr val="accent1"/>
+          </a:fillRef>
+          <a:effectRef idx="0">
+            <a:schemeClr val="accent1"/>
+          </a:effectRef>
+          <a:fontRef idx="minor">
+            <a:schemeClr val="lt1"/>
+          </a:fontRef>
+        </p:style>
+        <p:txBody>
+          <a:bodyPr rtlCol="0" anchor="ctr"/>
+          <a:lstStyle/>
+          <a:p>
+            <a:pPr algn="ctr"/>
+            <a:endParaRPr lang="en-US"/>
+          </a:p>
+        </p:txBody>
+      </p:sp>
+      <p:cxnSp>
+        <p:nvCxnSpPr>
+          <p:cNvPr id="7" name="Elbow Connector 6"/>
+          <p:cNvCxnSpPr>
+            <a:stCxn id="6" idx="3"/>
+            <a:endCxn id="2" idx="1"/>
+          </p:cNvCxnSpPr>
+          <p:nvPr/>
+        </p:nvCxnSpPr>
+        <p:spPr>
+          <a:xfrm flipV="1">
+            <a:off x="4471416" y="824951"/>
+            <a:ext cx="580481" cy="2116846"/>
+          </a:xfrm>
+          <a:prstGeom prst="bentConnector3">
+            <a:avLst>
+              <a:gd name="adj1" fmla="val 50000"/>
+            </a:avLst>
+          </a:prstGeom>
+          <a:ln>
+            <a:solidFill>
+              <a:schemeClr val="tx1"/>
+            </a:solidFill>
+            <a:tailEnd type="triangle"/>
+          </a:ln>
+        </p:spPr>
+        <p:style>
+          <a:lnRef idx="1">
+            <a:schemeClr val="accent1"/>
+          </a:lnRef>
+          <a:fillRef idx="0">
+            <a:schemeClr val="accent1"/>
+          </a:fillRef>
+          <a:effectRef idx="0">
+            <a:schemeClr val="accent1"/>
+          </a:effectRef>
+          <a:fontRef idx="minor">
+            <a:schemeClr val="tx1"/>
+          </a:fontRef>
+        </p:style>
+      </p:cxnSp>
+      <p:sp>
+        <p:nvSpPr>
+          <p:cNvPr id="12" name="TextBox 11"/>
+          <p:cNvSpPr txBox="1"/>
+          <p:nvPr/>
+        </p:nvSpPr>
+        <p:spPr>
+          <a:xfrm>
+            <a:off x="5051897" y="1422900"/>
+            <a:ext cx="6621294" cy="4801314"/>
+          </a:xfrm>
+          <a:prstGeom prst="rect">
+            <a:avLst/>
+          </a:prstGeom>
+          <a:noFill/>
+        </p:spPr>
+        <p:txBody>
+          <a:bodyPr wrap="square" rtlCol="0">
+            <a:spAutoFit/>
+          </a:bodyPr>
+          <a:lstStyle/>
+          <a:p>
+            <a:pPr marL="342900" indent="-342900">
+              <a:buFont typeface="+mj-lt"/>
+              <a:buAutoNum type="arabicPeriod"/>
+            </a:pPr>
             <a:r>
               <a:rPr lang="en-US" dirty="0" smtClean="0"/>
-              <a:t>Breakdowns (Pseudocode)</a:t>
-            </a:r>
+              <a:t>For this component we need to render iterations to produce a list of tasks.</a:t>
+            </a:r>
+          </a:p>
+          <a:p>
+            <a:pPr marL="342900" indent="-342900">
+              <a:buFont typeface="+mj-lt"/>
+              <a:buAutoNum type="arabicPeriod"/>
+            </a:pPr>
+            <a:r>
+              <a:rPr lang="en-US" dirty="0">
+                <a:cs typeface="Courier New" panose="02070309020205020404" pitchFamily="49" charset="0"/>
+              </a:rPr>
+              <a:t>Once a new “task” is received, we will render the data with a component in </a:t>
+            </a:r>
+            <a:r>
+              <a:rPr lang="en-US" b="1" dirty="0" smtClean="0">
+                <a:cs typeface="Courier New" panose="02070309020205020404" pitchFamily="49" charset="0"/>
+              </a:rPr>
+              <a:t>Step </a:t>
+            </a:r>
+            <a:r>
+              <a:rPr lang="en-US" b="1" dirty="0">
+                <a:cs typeface="Courier New" panose="02070309020205020404" pitchFamily="49" charset="0"/>
+              </a:rPr>
+              <a:t>4: To-Do List Component</a:t>
+            </a:r>
+            <a:r>
+              <a:rPr lang="en-US" dirty="0" smtClean="0">
+                <a:cs typeface="Courier New" panose="02070309020205020404" pitchFamily="49" charset="0"/>
+              </a:rPr>
+              <a:t>.</a:t>
+            </a:r>
+            <a:endParaRPr lang="en-US" dirty="0" smtClean="0"/>
+          </a:p>
+          <a:p>
+            <a:pPr marL="342900" indent="-342900">
+              <a:buFont typeface="+mj-lt"/>
+              <a:buAutoNum type="arabicPeriod"/>
+            </a:pPr>
+            <a:r>
+              <a:rPr lang="en-US" dirty="0" smtClean="0"/>
+              <a:t>Pseudocode described below:</a:t>
+            </a:r>
+          </a:p>
+          <a:p>
+            <a:pPr marL="800100" lvl="1" indent="-342900">
+              <a:buFont typeface="+mj-lt"/>
+              <a:buAutoNum type="alphaLcParenR"/>
+            </a:pPr>
+            <a:r>
+              <a:rPr lang="en-US" dirty="0" smtClean="0"/>
+              <a:t>Now </a:t>
+            </a:r>
+            <a:r>
+              <a:rPr lang="en-US" dirty="0"/>
+              <a:t>we have to store </a:t>
+            </a:r>
+            <a:r>
+              <a:rPr lang="en-US" dirty="0" smtClean="0"/>
+              <a:t>data called “tasks</a:t>
+            </a:r>
+            <a:r>
+              <a:rPr lang="en-US" dirty="0"/>
+              <a:t>” entered by user into an </a:t>
+            </a:r>
+            <a:r>
+              <a:rPr lang="en-US" dirty="0" smtClean="0"/>
+              <a:t>array.</a:t>
+            </a:r>
+          </a:p>
+          <a:p>
+            <a:pPr marL="800100" lvl="1" indent="-342900">
+              <a:buFont typeface="+mj-lt"/>
+              <a:buAutoNum type="alphaLcParenR"/>
+            </a:pPr>
+            <a:r>
+              <a:rPr lang="en-US" dirty="0" smtClean="0"/>
+              <a:t>Create </a:t>
+            </a:r>
+            <a:r>
+              <a:rPr lang="en-US" dirty="0"/>
+              <a:t>an array to </a:t>
+            </a:r>
+            <a:r>
+              <a:rPr lang="en-US" dirty="0" smtClean="0"/>
+              <a:t>store “tasks”</a:t>
+            </a:r>
+            <a:r>
+              <a:rPr lang="en-US" dirty="0" smtClean="0">
+                <a:latin typeface="Courier New" panose="02070309020205020404" pitchFamily="49" charset="0"/>
+                <a:cs typeface="Courier New" panose="02070309020205020404" pitchFamily="49" charset="0"/>
+              </a:rPr>
+              <a:t>.</a:t>
+            </a:r>
+          </a:p>
+          <a:p>
+            <a:pPr marL="800100" lvl="1" indent="-342900">
+              <a:buFont typeface="+mj-lt"/>
+              <a:buAutoNum type="alphaLcParenR"/>
+            </a:pPr>
+            <a:r>
+              <a:rPr lang="en-US" dirty="0" smtClean="0">
+                <a:cs typeface="Courier New" panose="02070309020205020404" pitchFamily="49" charset="0"/>
+              </a:rPr>
+              <a:t>The “tasks” entered by user will be stored in the above array described in b). </a:t>
+            </a:r>
+          </a:p>
+          <a:p>
+            <a:pPr marL="342900" indent="-342900">
+              <a:buFont typeface="+mj-lt"/>
+              <a:buAutoNum type="arabicPeriod"/>
+            </a:pPr>
+            <a:r>
+              <a:rPr lang="en-US" dirty="0" smtClean="0">
+                <a:cs typeface="Courier New" panose="02070309020205020404" pitchFamily="49" charset="0"/>
+              </a:rPr>
+              <a:t>Rendering an iteration of the array will produce the list </a:t>
+            </a:r>
+            <a:r>
+              <a:rPr lang="en-US" dirty="0">
+                <a:cs typeface="Courier New" panose="02070309020205020404" pitchFamily="49" charset="0"/>
+              </a:rPr>
+              <a:t> </a:t>
+            </a:r>
+            <a:r>
+              <a:rPr lang="en-US" dirty="0" smtClean="0">
+                <a:cs typeface="Courier New" panose="02070309020205020404" pitchFamily="49" charset="0"/>
+              </a:rPr>
+              <a:t>that can be appended to the Apps.js. </a:t>
+            </a:r>
+          </a:p>
+          <a:p>
+            <a:pPr marL="342900" indent="-342900">
+              <a:buFont typeface="+mj-lt"/>
+              <a:buAutoNum type="arabicPeriod"/>
+            </a:pPr>
+            <a:r>
+              <a:rPr lang="en-US" dirty="0" smtClean="0">
+                <a:cs typeface="Courier New" panose="02070309020205020404" pitchFamily="49" charset="0"/>
+              </a:rPr>
+              <a:t>“Delete” button is an event listener button, when it is click it will remove the “task” from array within ToDo.js. </a:t>
+            </a:r>
+            <a:endParaRPr lang="en-US" dirty="0" smtClean="0"/>
+          </a:p>
+          <a:p>
+            <a:pPr lvl="1"/>
+            <a:endParaRPr lang="en-US" dirty="0" smtClean="0"/>
+          </a:p>
+          <a:p>
+            <a:endParaRPr lang="en-US" dirty="0" smtClean="0"/>
+          </a:p>
+          <a:p>
+            <a:pPr marL="342900" indent="-342900">
+              <a:buFont typeface="+mj-lt"/>
+              <a:buAutoNum type="arabicPeriod"/>
+            </a:pPr>
             <a:endParaRPr lang="en-US" dirty="0"/>
           </a:p>
         </p:txBody>
       </p:sp>
-      <p:sp>
-        <p:nvSpPr>
-          <p:cNvPr id="3" name="Content Placeholder 2"/>
+    </p:spTree>
+    <p:extLst>
+      <p:ext uri="{BB962C8B-B14F-4D97-AF65-F5344CB8AC3E}">
+        <p14:creationId xmlns:p14="http://schemas.microsoft.com/office/powerpoint/2010/main" val="77494517"/>
+      </p:ext>
+    </p:extLst>
+  </p:cSld>
+  <p:clrMapOvr>
+    <a:masterClrMapping/>
+  </p:clrMapOvr>
+</p:sld>
+</file>
+
+<file path=ppt/slides/slide9.xml><?xml version="1.0" encoding="utf-8"?>
+<p:sld xmlns:a="http://schemas.openxmlformats.org/drawingml/2006/main" xmlns:r="http://schemas.openxmlformats.org/officeDocument/2006/relationships" xmlns:p="http://schemas.openxmlformats.org/presentationml/2006/main">
+  <p:cSld>
+    <p:spTree>
+      <p:nvGrpSpPr>
+        <p:cNvPr id="1" name=""/>
+        <p:cNvGrpSpPr/>
+        <p:nvPr/>
+      </p:nvGrpSpPr>
+      <p:grpSpPr>
+        <a:xfrm>
+          <a:off x="0" y="0"/>
+          <a:ext cx="0" cy="0"/>
+          <a:chOff x="0" y="0"/>
+          <a:chExt cx="0" cy="0"/>
+        </a:xfrm>
+      </p:grpSpPr>
+      <p:sp>
+        <p:nvSpPr>
+          <p:cNvPr id="2" name="Title 1"/>
           <p:cNvSpPr>
             <a:spLocks noGrp="1"/>
           </p:cNvSpPr>
           <p:nvPr>
+            <p:ph type="title"/>
+          </p:nvPr>
+        </p:nvSpPr>
+        <p:spPr>
+          <a:xfrm>
+            <a:off x="5051897" y="360598"/>
+            <a:ext cx="6621294" cy="928706"/>
+          </a:xfrm>
+          <a:solidFill>
+            <a:schemeClr val="accent1">
+              <a:lumMod val="40000"/>
+              <a:lumOff val="60000"/>
+            </a:schemeClr>
+          </a:solidFill>
+        </p:spPr>
+        <p:txBody>
+          <a:bodyPr>
+            <a:normAutofit fontScale="90000"/>
+          </a:bodyPr>
+          <a:lstStyle/>
+          <a:p>
+            <a:r>
+              <a:rPr lang="en-US" sz="3600" dirty="0" smtClean="0"/>
+              <a:t>Step 4</a:t>
+            </a:r>
+            <a:r>
+              <a:rPr lang="en-US" sz="3600" dirty="0"/>
+              <a:t>: </a:t>
+            </a:r>
+            <a:r>
+              <a:rPr lang="en-US" sz="3600" dirty="0" smtClean="0"/>
+              <a:t>To-Do List Component </a:t>
+            </a:r>
+            <a:r>
+              <a:rPr lang="en-US" sz="3600" dirty="0"/>
+              <a:t>(</a:t>
+            </a:r>
+            <a:r>
+              <a:rPr lang="en-US" sz="3600" dirty="0" smtClean="0"/>
+              <a:t>MDN, 2020b) </a:t>
+            </a:r>
+            <a:endParaRPr lang="en-US" sz="3600" dirty="0"/>
+          </a:p>
+        </p:txBody>
+      </p:sp>
+      <p:pic>
+        <p:nvPicPr>
+          <p:cNvPr id="4" name="Content Placeholder 3"/>
+          <p:cNvPicPr>
+            <a:picLocks noGrp="1" noChangeAspect="1"/>
+          </p:cNvPicPr>
+          <p:nvPr>
             <p:ph idx="1"/>
           </p:nvPr>
-        </p:nvSpPr>
-        <p:spPr/>
-        <p:txBody>
-          <a:bodyPr/>
-          <a:lstStyle/>
-          <a:p>
+        </p:nvPicPr>
+        <p:blipFill>
+          <a:blip r:embed="rId2">
+            <a:extLst>
+              <a:ext uri="{28A0092B-C50C-407E-A947-70E740481C1C}">
+                <a14:useLocalDpi xmlns:a14="http://schemas.microsoft.com/office/drawing/2010/main" val="0"/>
+              </a:ext>
+            </a:extLst>
+          </a:blip>
+          <a:stretch>
+            <a:fillRect/>
+          </a:stretch>
+        </p:blipFill>
+        <p:spPr>
+          <a:xfrm>
+            <a:off x="488651" y="365124"/>
+            <a:ext cx="4290535" cy="5147215"/>
+          </a:xfrm>
+        </p:spPr>
+      </p:pic>
+      <p:sp>
+        <p:nvSpPr>
+          <p:cNvPr id="5" name="TextBox 4"/>
+          <p:cNvSpPr txBox="1"/>
+          <p:nvPr/>
+        </p:nvSpPr>
+        <p:spPr>
+          <a:xfrm>
+            <a:off x="5069711" y="1461329"/>
+            <a:ext cx="6603480" cy="1477328"/>
+          </a:xfrm>
+          <a:prstGeom prst="rect">
+            <a:avLst/>
+          </a:prstGeom>
+          <a:noFill/>
+        </p:spPr>
+        <p:txBody>
+          <a:bodyPr wrap="square" rtlCol="0">
+            <a:spAutoFit/>
+          </a:bodyPr>
+          <a:lstStyle/>
+          <a:p>
+            <a:pPr marL="342900" indent="-342900">
+              <a:buAutoNum type="arabicPeriod"/>
+            </a:pPr>
+            <a:r>
+              <a:rPr lang="en-US" dirty="0" smtClean="0"/>
+              <a:t>Create a component called ToDo.js. Within ToDo.js, we will create a class to generate a To-Do list component. </a:t>
+            </a:r>
+            <a:endParaRPr lang="en-US" dirty="0"/>
+          </a:p>
+          <a:p>
+            <a:pPr marL="342900" indent="-342900">
+              <a:buAutoNum type="arabicPeriod"/>
+            </a:pPr>
+            <a:r>
+              <a:rPr lang="en-US" dirty="0" smtClean="0"/>
+              <a:t>Pseudocode as follows from </a:t>
+            </a:r>
+            <a:r>
+              <a:rPr lang="en-US" dirty="0" smtClean="0">
+                <a:latin typeface="Courier New" panose="02070309020205020404" pitchFamily="49" charset="0"/>
+                <a:cs typeface="Courier New" panose="02070309020205020404" pitchFamily="49" charset="0"/>
+              </a:rPr>
+              <a:t>./</a:t>
+            </a:r>
+            <a:r>
+              <a:rPr lang="en-US" dirty="0" err="1" smtClean="0">
+                <a:latin typeface="Courier New" panose="02070309020205020404" pitchFamily="49" charset="0"/>
+                <a:cs typeface="Courier New" panose="02070309020205020404" pitchFamily="49" charset="0"/>
+              </a:rPr>
+              <a:t>moz</a:t>
+            </a:r>
+            <a:r>
+              <a:rPr lang="en-US" dirty="0" smtClean="0">
+                <a:latin typeface="Courier New" panose="02070309020205020404" pitchFamily="49" charset="0"/>
+                <a:cs typeface="Courier New" panose="02070309020205020404" pitchFamily="49" charset="0"/>
+              </a:rPr>
+              <a:t>-</a:t>
+            </a:r>
+            <a:r>
+              <a:rPr lang="en-US" dirty="0" err="1" smtClean="0">
+                <a:latin typeface="Courier New" panose="02070309020205020404" pitchFamily="49" charset="0"/>
+                <a:cs typeface="Courier New" panose="02070309020205020404" pitchFamily="49" charset="0"/>
+              </a:rPr>
+              <a:t>todo</a:t>
+            </a:r>
+            <a:r>
+              <a:rPr lang="en-US" dirty="0" smtClean="0">
+                <a:latin typeface="Courier New" panose="02070309020205020404" pitchFamily="49" charset="0"/>
+                <a:cs typeface="Courier New" panose="02070309020205020404" pitchFamily="49" charset="0"/>
+              </a:rPr>
+              <a:t>-react/</a:t>
+            </a:r>
+            <a:r>
+              <a:rPr lang="en-US" dirty="0" err="1" smtClean="0">
+                <a:latin typeface="Courier New" panose="02070309020205020404" pitchFamily="49" charset="0"/>
+                <a:cs typeface="Courier New" panose="02070309020205020404" pitchFamily="49" charset="0"/>
+              </a:rPr>
+              <a:t>src</a:t>
+            </a:r>
+            <a:r>
+              <a:rPr lang="en-US" dirty="0" smtClean="0">
+                <a:latin typeface="Courier New" panose="02070309020205020404" pitchFamily="49" charset="0"/>
+                <a:cs typeface="Courier New" panose="02070309020205020404" pitchFamily="49" charset="0"/>
+              </a:rPr>
+              <a:t>/components/ToDo.js </a:t>
+            </a:r>
+            <a:r>
+              <a:rPr lang="en-US" dirty="0" smtClean="0">
+                <a:cs typeface="Courier New" panose="02070309020205020404" pitchFamily="49" charset="0"/>
+              </a:rPr>
+              <a:t>which can be found in my assignment</a:t>
+            </a:r>
+            <a:r>
+              <a:rPr lang="en-US" dirty="0" smtClean="0"/>
+              <a:t>:</a:t>
+            </a:r>
+          </a:p>
+        </p:txBody>
+      </p:sp>
+      <p:sp>
+        <p:nvSpPr>
+          <p:cNvPr id="6" name="Rectangle 5"/>
+          <p:cNvSpPr/>
+          <p:nvPr/>
+        </p:nvSpPr>
+        <p:spPr>
+          <a:xfrm>
+            <a:off x="642939" y="2728912"/>
+            <a:ext cx="3900486" cy="1214437"/>
+          </a:xfrm>
+          <a:prstGeom prst="rect">
+            <a:avLst/>
+          </a:prstGeom>
+          <a:noFill/>
+          <a:ln>
+            <a:solidFill>
+              <a:schemeClr val="accent1"/>
+            </a:solidFill>
+          </a:ln>
+        </p:spPr>
+        <p:style>
+          <a:lnRef idx="2">
+            <a:schemeClr val="accent1">
+              <a:shade val="50000"/>
+            </a:schemeClr>
+          </a:lnRef>
+          <a:fillRef idx="1">
+            <a:schemeClr val="accent1"/>
+          </a:fillRef>
+          <a:effectRef idx="0">
+            <a:schemeClr val="accent1"/>
+          </a:effectRef>
+          <a:fontRef idx="minor">
+            <a:schemeClr val="lt1"/>
+          </a:fontRef>
+        </p:style>
+        <p:txBody>
+          <a:bodyPr rtlCol="0" anchor="ctr"/>
+          <a:lstStyle/>
+          <a:p>
+            <a:pPr algn="ctr"/>
             <a:endParaRPr lang="en-US"/>
           </a:p>
         </p:txBody>
       </p:sp>
+      <p:cxnSp>
+        <p:nvCxnSpPr>
+          <p:cNvPr id="7" name="Elbow Connector 6"/>
+          <p:cNvCxnSpPr>
+            <a:stCxn id="6" idx="3"/>
+            <a:endCxn id="2" idx="1"/>
+          </p:cNvCxnSpPr>
+          <p:nvPr/>
+        </p:nvCxnSpPr>
+        <p:spPr>
+          <a:xfrm flipV="1">
+            <a:off x="4543425" y="824951"/>
+            <a:ext cx="508472" cy="2511180"/>
+          </a:xfrm>
+          <a:prstGeom prst="bentConnector3">
+            <a:avLst>
+              <a:gd name="adj1" fmla="val 50000"/>
+            </a:avLst>
+          </a:prstGeom>
+          <a:ln>
+            <a:solidFill>
+              <a:schemeClr val="tx1"/>
+            </a:solidFill>
+            <a:tailEnd type="triangle"/>
+          </a:ln>
+        </p:spPr>
+        <p:style>
+          <a:lnRef idx="1">
+            <a:schemeClr val="accent1"/>
+          </a:lnRef>
+          <a:fillRef idx="0">
+            <a:schemeClr val="accent1"/>
+          </a:fillRef>
+          <a:effectRef idx="0">
+            <a:schemeClr val="accent1"/>
+          </a:effectRef>
+          <a:fontRef idx="minor">
+            <a:schemeClr val="tx1"/>
+          </a:fontRef>
+        </p:style>
+      </p:cxnSp>
+      <p:pic>
+        <p:nvPicPr>
+          <p:cNvPr id="3" name="Picture 2"/>
+          <p:cNvPicPr>
+            <a:picLocks noChangeAspect="1"/>
+          </p:cNvPicPr>
+          <p:nvPr/>
+        </p:nvPicPr>
+        <p:blipFill>
+          <a:blip r:embed="rId3"/>
+          <a:stretch>
+            <a:fillRect/>
+          </a:stretch>
+        </p:blipFill>
+        <p:spPr>
+          <a:xfrm>
+            <a:off x="5450796" y="2938657"/>
+            <a:ext cx="5467413" cy="3755014"/>
+          </a:xfrm>
+          <a:prstGeom prst="rect">
+            <a:avLst/>
+          </a:prstGeom>
+        </p:spPr>
+      </p:pic>
     </p:spTree>
     <p:extLst>
       <p:ext uri="{BB962C8B-B14F-4D97-AF65-F5344CB8AC3E}">
-        <p14:creationId xmlns:p14="http://schemas.microsoft.com/office/powerpoint/2010/main" val="3966638509"/>
+        <p14:creationId xmlns:p14="http://schemas.microsoft.com/office/powerpoint/2010/main" val="345095300"/>
       </p:ext>
     </p:extLst>
   </p:cSld>

</xml_diff>